<commit_message>
fixing homepage resolution issue
</commit_message>
<xml_diff>
--- a/menu/bg.pptx
+++ b/menu/bg.pptx
@@ -2,18 +2,20 @@
 <file path=ppt/presentation.xml><?xml version="1.0" encoding="utf-8"?>
 <p:presentation xmlns:a="http://schemas.openxmlformats.org/drawingml/2006/main" xmlns:r="http://schemas.openxmlformats.org/officeDocument/2006/relationships" xmlns:p="http://schemas.openxmlformats.org/presentationml/2006/main" saveSubsetFonts="1">
   <p:sldMasterIdLst>
-    <p:sldMasterId id="2147483660" r:id="rId1"/>
+    <p:sldMasterId id="2147483684" r:id="rId1"/>
   </p:sldMasterIdLst>
   <p:sldIdLst>
     <p:sldId id="256" r:id="rId2"/>
     <p:sldId id="258" r:id="rId3"/>
     <p:sldId id="259" r:id="rId4"/>
-    <p:sldId id="260" r:id="rId5"/>
-    <p:sldId id="261" r:id="rId6"/>
-    <p:sldId id="262" r:id="rId7"/>
-    <p:sldId id="257" r:id="rId8"/>
+    <p:sldId id="264" r:id="rId5"/>
+    <p:sldId id="266" r:id="rId6"/>
+    <p:sldId id="265" r:id="rId7"/>
+    <p:sldId id="261" r:id="rId8"/>
+    <p:sldId id="262" r:id="rId9"/>
+    <p:sldId id="257" r:id="rId10"/>
   </p:sldIdLst>
-  <p:sldSz cx="15240000" cy="9144000"/>
+  <p:sldSz cx="12192000" cy="6858000"/>
   <p:notesSz cx="6858000" cy="9144000"/>
   <p:defaultTextStyle>
     <a:defPPr>
@@ -147,15 +149,15 @@
         </p:nvSpPr>
         <p:spPr>
           <a:xfrm>
-            <a:off x="1905000" y="1496484"/>
-            <a:ext cx="11430000" cy="3183467"/>
+            <a:off x="1524000" y="1122363"/>
+            <a:ext cx="9144000" cy="2387600"/>
           </a:xfrm>
         </p:spPr>
         <p:txBody>
           <a:bodyPr anchor="b"/>
           <a:lstStyle>
             <a:lvl1pPr algn="ctr">
-              <a:defRPr sz="7500"/>
+              <a:defRPr sz="6000"/>
             </a:lvl1pPr>
           </a:lstStyle>
           <a:p>
@@ -179,8 +181,8 @@
         </p:nvSpPr>
         <p:spPr>
           <a:xfrm>
-            <a:off x="1905000" y="4802717"/>
-            <a:ext cx="11430000" cy="2207683"/>
+            <a:off x="1524000" y="3602038"/>
+            <a:ext cx="9144000" cy="1655762"/>
           </a:xfrm>
         </p:spPr>
         <p:txBody>
@@ -188,39 +190,39 @@
           <a:lstStyle>
             <a:lvl1pPr marL="0" indent="0" algn="ctr">
               <a:buNone/>
-              <a:defRPr sz="3000"/>
+              <a:defRPr sz="2400"/>
             </a:lvl1pPr>
-            <a:lvl2pPr marL="571500" indent="0" algn="ctr">
-              <a:buNone/>
-              <a:defRPr sz="2500"/>
-            </a:lvl2pPr>
-            <a:lvl3pPr marL="1143000" indent="0" algn="ctr">
-              <a:buNone/>
-              <a:defRPr sz="2250"/>
-            </a:lvl3pPr>
-            <a:lvl4pPr marL="1714500" indent="0" algn="ctr">
+            <a:lvl2pPr marL="457200" indent="0" algn="ctr">
               <a:buNone/>
               <a:defRPr sz="2000"/>
+            </a:lvl2pPr>
+            <a:lvl3pPr marL="914400" indent="0" algn="ctr">
+              <a:buNone/>
+              <a:defRPr sz="1800"/>
+            </a:lvl3pPr>
+            <a:lvl4pPr marL="1371600" indent="0" algn="ctr">
+              <a:buNone/>
+              <a:defRPr sz="1600"/>
             </a:lvl4pPr>
-            <a:lvl5pPr marL="2286000" indent="0" algn="ctr">
+            <a:lvl5pPr marL="1828800" indent="0" algn="ctr">
               <a:buNone/>
-              <a:defRPr sz="2000"/>
+              <a:defRPr sz="1600"/>
             </a:lvl5pPr>
-            <a:lvl6pPr marL="2857500" indent="0" algn="ctr">
+            <a:lvl6pPr marL="2286000" indent="0" algn="ctr">
               <a:buNone/>
-              <a:defRPr sz="2000"/>
+              <a:defRPr sz="1600"/>
             </a:lvl6pPr>
-            <a:lvl7pPr marL="3429000" indent="0" algn="ctr">
+            <a:lvl7pPr marL="2743200" indent="0" algn="ctr">
               <a:buNone/>
-              <a:defRPr sz="2000"/>
+              <a:defRPr sz="1600"/>
             </a:lvl7pPr>
-            <a:lvl8pPr marL="4000500" indent="0" algn="ctr">
+            <a:lvl8pPr marL="3200400" indent="0" algn="ctr">
               <a:buNone/>
-              <a:defRPr sz="2000"/>
+              <a:defRPr sz="1600"/>
             </a:lvl8pPr>
-            <a:lvl9pPr marL="4572000" indent="0" algn="ctr">
+            <a:lvl9pPr marL="3657600" indent="0" algn="ctr">
               <a:buNone/>
-              <a:defRPr sz="2000"/>
+              <a:defRPr sz="1600"/>
             </a:lvl9pPr>
           </a:lstStyle>
           <a:p>
@@ -249,7 +251,7 @@
           <a:p>
             <a:fld id="{86D1F84C-FAEE-43AD-A0DD-C7A92FE74B12}" type="datetimeFigureOut">
               <a:rPr lang="en-US" smtClean="0"/>
-              <a:t>2/18/2023</a:t>
+              <a:t>2/20/2023</a:t>
             </a:fld>
             <a:endParaRPr lang="en-US"/>
           </a:p>
@@ -300,7 +302,7 @@
     </p:spTree>
     <p:extLst>
       <p:ext uri="{BB962C8B-B14F-4D97-AF65-F5344CB8AC3E}">
-        <p14:creationId xmlns:p14="http://schemas.microsoft.com/office/powerpoint/2010/main" val="1713668019"/>
+        <p14:creationId xmlns:p14="http://schemas.microsoft.com/office/powerpoint/2010/main" val="4013141303"/>
       </p:ext>
     </p:extLst>
   </p:cSld>
@@ -419,7 +421,7 @@
           <a:p>
             <a:fld id="{86D1F84C-FAEE-43AD-A0DD-C7A92FE74B12}" type="datetimeFigureOut">
               <a:rPr lang="en-US" smtClean="0"/>
-              <a:t>2/18/2023</a:t>
+              <a:t>2/20/2023</a:t>
             </a:fld>
             <a:endParaRPr lang="en-US"/>
           </a:p>
@@ -470,7 +472,7 @@
     </p:spTree>
     <p:extLst>
       <p:ext uri="{BB962C8B-B14F-4D97-AF65-F5344CB8AC3E}">
-        <p14:creationId xmlns:p14="http://schemas.microsoft.com/office/powerpoint/2010/main" val="3234784645"/>
+        <p14:creationId xmlns:p14="http://schemas.microsoft.com/office/powerpoint/2010/main" val="2450007523"/>
       </p:ext>
     </p:extLst>
   </p:cSld>
@@ -509,8 +511,8 @@
         </p:nvSpPr>
         <p:spPr>
           <a:xfrm>
-            <a:off x="10906125" y="486834"/>
-            <a:ext cx="3286125" cy="7749117"/>
+            <a:off x="8724900" y="365125"/>
+            <a:ext cx="2628900" cy="5811838"/>
           </a:xfrm>
         </p:spPr>
         <p:txBody>
@@ -537,8 +539,8 @@
         </p:nvSpPr>
         <p:spPr>
           <a:xfrm>
-            <a:off x="1047750" y="486834"/>
-            <a:ext cx="9667875" cy="7749117"/>
+            <a:off x="838200" y="365125"/>
+            <a:ext cx="7734300" cy="5811838"/>
           </a:xfrm>
         </p:spPr>
         <p:txBody>
@@ -599,7 +601,7 @@
           <a:p>
             <a:fld id="{86D1F84C-FAEE-43AD-A0DD-C7A92FE74B12}" type="datetimeFigureOut">
               <a:rPr lang="en-US" smtClean="0"/>
-              <a:t>2/18/2023</a:t>
+              <a:t>2/20/2023</a:t>
             </a:fld>
             <a:endParaRPr lang="en-US"/>
           </a:p>
@@ -650,7 +652,7 @@
     </p:spTree>
     <p:extLst>
       <p:ext uri="{BB962C8B-B14F-4D97-AF65-F5344CB8AC3E}">
-        <p14:creationId xmlns:p14="http://schemas.microsoft.com/office/powerpoint/2010/main" val="2701635839"/>
+        <p14:creationId xmlns:p14="http://schemas.microsoft.com/office/powerpoint/2010/main" val="3945731384"/>
       </p:ext>
     </p:extLst>
   </p:cSld>
@@ -769,7 +771,7 @@
           <a:p>
             <a:fld id="{86D1F84C-FAEE-43AD-A0DD-C7A92FE74B12}" type="datetimeFigureOut">
               <a:rPr lang="en-US" smtClean="0"/>
-              <a:t>2/18/2023</a:t>
+              <a:t>2/20/2023</a:t>
             </a:fld>
             <a:endParaRPr lang="en-US"/>
           </a:p>
@@ -820,7 +822,7 @@
     </p:spTree>
     <p:extLst>
       <p:ext uri="{BB962C8B-B14F-4D97-AF65-F5344CB8AC3E}">
-        <p14:creationId xmlns:p14="http://schemas.microsoft.com/office/powerpoint/2010/main" val="3125023716"/>
+        <p14:creationId xmlns:p14="http://schemas.microsoft.com/office/powerpoint/2010/main" val="1628991454"/>
       </p:ext>
     </p:extLst>
   </p:cSld>
@@ -859,15 +861,15 @@
         </p:nvSpPr>
         <p:spPr>
           <a:xfrm>
-            <a:off x="1039813" y="2279652"/>
-            <a:ext cx="13144500" cy="3803649"/>
+            <a:off x="831850" y="1709738"/>
+            <a:ext cx="10515600" cy="2852737"/>
           </a:xfrm>
         </p:spPr>
         <p:txBody>
           <a:bodyPr anchor="b"/>
           <a:lstStyle>
             <a:lvl1pPr>
-              <a:defRPr sz="7500"/>
+              <a:defRPr sz="6000"/>
             </a:lvl1pPr>
           </a:lstStyle>
           <a:p>
@@ -891,8 +893,8 @@
         </p:nvSpPr>
         <p:spPr>
           <a:xfrm>
-            <a:off x="1039813" y="6119285"/>
-            <a:ext cx="13144500" cy="2000249"/>
+            <a:off x="831850" y="4589463"/>
+            <a:ext cx="10515600" cy="1500187"/>
           </a:xfrm>
         </p:spPr>
         <p:txBody>
@@ -900,7 +902,7 @@
           <a:lstStyle>
             <a:lvl1pPr marL="0" indent="0">
               <a:buNone/>
-              <a:defRPr sz="3000">
+              <a:defRPr sz="2400">
                 <a:solidFill>
                   <a:schemeClr val="tx1">
                     <a:tint val="75000"/>
@@ -908,27 +910,7 @@
                 </a:solidFill>
               </a:defRPr>
             </a:lvl1pPr>
-            <a:lvl2pPr marL="571500" indent="0">
-              <a:buNone/>
-              <a:defRPr sz="2500">
-                <a:solidFill>
-                  <a:schemeClr val="tx1">
-                    <a:tint val="75000"/>
-                  </a:schemeClr>
-                </a:solidFill>
-              </a:defRPr>
-            </a:lvl2pPr>
-            <a:lvl3pPr marL="1143000" indent="0">
-              <a:buNone/>
-              <a:defRPr sz="2250">
-                <a:solidFill>
-                  <a:schemeClr val="tx1">
-                    <a:tint val="75000"/>
-                  </a:schemeClr>
-                </a:solidFill>
-              </a:defRPr>
-            </a:lvl3pPr>
-            <a:lvl4pPr marL="1714500" indent="0">
+            <a:lvl2pPr marL="457200" indent="0">
               <a:buNone/>
               <a:defRPr sz="2000">
                 <a:solidFill>
@@ -937,10 +919,30 @@
                   </a:schemeClr>
                 </a:solidFill>
               </a:defRPr>
+            </a:lvl2pPr>
+            <a:lvl3pPr marL="914400" indent="0">
+              <a:buNone/>
+              <a:defRPr sz="1800">
+                <a:solidFill>
+                  <a:schemeClr val="tx1">
+                    <a:tint val="75000"/>
+                  </a:schemeClr>
+                </a:solidFill>
+              </a:defRPr>
+            </a:lvl3pPr>
+            <a:lvl4pPr marL="1371600" indent="0">
+              <a:buNone/>
+              <a:defRPr sz="1600">
+                <a:solidFill>
+                  <a:schemeClr val="tx1">
+                    <a:tint val="75000"/>
+                  </a:schemeClr>
+                </a:solidFill>
+              </a:defRPr>
             </a:lvl4pPr>
-            <a:lvl5pPr marL="2286000" indent="0">
+            <a:lvl5pPr marL="1828800" indent="0">
               <a:buNone/>
-              <a:defRPr sz="2000">
+              <a:defRPr sz="1600">
                 <a:solidFill>
                   <a:schemeClr val="tx1">
                     <a:tint val="75000"/>
@@ -948,9 +950,9 @@
                 </a:solidFill>
               </a:defRPr>
             </a:lvl5pPr>
-            <a:lvl6pPr marL="2857500" indent="0">
+            <a:lvl6pPr marL="2286000" indent="0">
               <a:buNone/>
-              <a:defRPr sz="2000">
+              <a:defRPr sz="1600">
                 <a:solidFill>
                   <a:schemeClr val="tx1">
                     <a:tint val="75000"/>
@@ -958,9 +960,9 @@
                 </a:solidFill>
               </a:defRPr>
             </a:lvl6pPr>
-            <a:lvl7pPr marL="3429000" indent="0">
+            <a:lvl7pPr marL="2743200" indent="0">
               <a:buNone/>
-              <a:defRPr sz="2000">
+              <a:defRPr sz="1600">
                 <a:solidFill>
                   <a:schemeClr val="tx1">
                     <a:tint val="75000"/>
@@ -968,9 +970,9 @@
                 </a:solidFill>
               </a:defRPr>
             </a:lvl7pPr>
-            <a:lvl8pPr marL="4000500" indent="0">
+            <a:lvl8pPr marL="3200400" indent="0">
               <a:buNone/>
-              <a:defRPr sz="2000">
+              <a:defRPr sz="1600">
                 <a:solidFill>
                   <a:schemeClr val="tx1">
                     <a:tint val="75000"/>
@@ -978,9 +980,9 @@
                 </a:solidFill>
               </a:defRPr>
             </a:lvl8pPr>
-            <a:lvl9pPr marL="4572000" indent="0">
+            <a:lvl9pPr marL="3657600" indent="0">
               <a:buNone/>
-              <a:defRPr sz="2000">
+              <a:defRPr sz="1600">
                 <a:solidFill>
                   <a:schemeClr val="tx1">
                     <a:tint val="75000"/>
@@ -1015,7 +1017,7 @@
           <a:p>
             <a:fld id="{86D1F84C-FAEE-43AD-A0DD-C7A92FE74B12}" type="datetimeFigureOut">
               <a:rPr lang="en-US" smtClean="0"/>
-              <a:t>2/18/2023</a:t>
+              <a:t>2/20/2023</a:t>
             </a:fld>
             <a:endParaRPr lang="en-US"/>
           </a:p>
@@ -1066,7 +1068,7 @@
     </p:spTree>
     <p:extLst>
       <p:ext uri="{BB962C8B-B14F-4D97-AF65-F5344CB8AC3E}">
-        <p14:creationId xmlns:p14="http://schemas.microsoft.com/office/powerpoint/2010/main" val="2538755470"/>
+        <p14:creationId xmlns:p14="http://schemas.microsoft.com/office/powerpoint/2010/main" val="2623410308"/>
       </p:ext>
     </p:extLst>
   </p:cSld>
@@ -1128,8 +1130,8 @@
         </p:nvSpPr>
         <p:spPr>
           <a:xfrm>
-            <a:off x="1047750" y="2434167"/>
-            <a:ext cx="6477000" cy="5801784"/>
+            <a:off x="838200" y="1825625"/>
+            <a:ext cx="5181600" cy="4351338"/>
           </a:xfrm>
         </p:spPr>
         <p:txBody>
@@ -1185,8 +1187,8 @@
         </p:nvSpPr>
         <p:spPr>
           <a:xfrm>
-            <a:off x="7715250" y="2434167"/>
-            <a:ext cx="6477000" cy="5801784"/>
+            <a:off x="6172200" y="1825625"/>
+            <a:ext cx="5181600" cy="4351338"/>
           </a:xfrm>
         </p:spPr>
         <p:txBody>
@@ -1247,7 +1249,7 @@
           <a:p>
             <a:fld id="{86D1F84C-FAEE-43AD-A0DD-C7A92FE74B12}" type="datetimeFigureOut">
               <a:rPr lang="en-US" smtClean="0"/>
-              <a:t>2/18/2023</a:t>
+              <a:t>2/20/2023</a:t>
             </a:fld>
             <a:endParaRPr lang="en-US"/>
           </a:p>
@@ -1298,7 +1300,7 @@
     </p:spTree>
     <p:extLst>
       <p:ext uri="{BB962C8B-B14F-4D97-AF65-F5344CB8AC3E}">
-        <p14:creationId xmlns:p14="http://schemas.microsoft.com/office/powerpoint/2010/main" val="3523616587"/>
+        <p14:creationId xmlns:p14="http://schemas.microsoft.com/office/powerpoint/2010/main" val="1409359136"/>
       </p:ext>
     </p:extLst>
   </p:cSld>
@@ -1337,8 +1339,8 @@
         </p:nvSpPr>
         <p:spPr>
           <a:xfrm>
-            <a:off x="1049735" y="486834"/>
-            <a:ext cx="13144500" cy="1767417"/>
+            <a:off x="839788" y="365125"/>
+            <a:ext cx="10515600" cy="1325563"/>
           </a:xfrm>
         </p:spPr>
         <p:txBody>
@@ -1365,8 +1367,8 @@
         </p:nvSpPr>
         <p:spPr>
           <a:xfrm>
-            <a:off x="1049736" y="2241551"/>
-            <a:ext cx="6447234" cy="1098549"/>
+            <a:off x="839788" y="1681163"/>
+            <a:ext cx="5157787" cy="823912"/>
           </a:xfrm>
         </p:spPr>
         <p:txBody>
@@ -1374,39 +1376,39 @@
           <a:lstStyle>
             <a:lvl1pPr marL="0" indent="0">
               <a:buNone/>
-              <a:defRPr sz="3000" b="1"/>
+              <a:defRPr sz="2400" b="1"/>
             </a:lvl1pPr>
-            <a:lvl2pPr marL="571500" indent="0">
-              <a:buNone/>
-              <a:defRPr sz="2500" b="1"/>
-            </a:lvl2pPr>
-            <a:lvl3pPr marL="1143000" indent="0">
-              <a:buNone/>
-              <a:defRPr sz="2250" b="1"/>
-            </a:lvl3pPr>
-            <a:lvl4pPr marL="1714500" indent="0">
+            <a:lvl2pPr marL="457200" indent="0">
               <a:buNone/>
               <a:defRPr sz="2000" b="1"/>
+            </a:lvl2pPr>
+            <a:lvl3pPr marL="914400" indent="0">
+              <a:buNone/>
+              <a:defRPr sz="1800" b="1"/>
+            </a:lvl3pPr>
+            <a:lvl4pPr marL="1371600" indent="0">
+              <a:buNone/>
+              <a:defRPr sz="1600" b="1"/>
             </a:lvl4pPr>
-            <a:lvl5pPr marL="2286000" indent="0">
+            <a:lvl5pPr marL="1828800" indent="0">
               <a:buNone/>
-              <a:defRPr sz="2000" b="1"/>
+              <a:defRPr sz="1600" b="1"/>
             </a:lvl5pPr>
-            <a:lvl6pPr marL="2857500" indent="0">
+            <a:lvl6pPr marL="2286000" indent="0">
               <a:buNone/>
-              <a:defRPr sz="2000" b="1"/>
+              <a:defRPr sz="1600" b="1"/>
             </a:lvl6pPr>
-            <a:lvl7pPr marL="3429000" indent="0">
+            <a:lvl7pPr marL="2743200" indent="0">
               <a:buNone/>
-              <a:defRPr sz="2000" b="1"/>
+              <a:defRPr sz="1600" b="1"/>
             </a:lvl7pPr>
-            <a:lvl8pPr marL="4000500" indent="0">
+            <a:lvl8pPr marL="3200400" indent="0">
               <a:buNone/>
-              <a:defRPr sz="2000" b="1"/>
+              <a:defRPr sz="1600" b="1"/>
             </a:lvl8pPr>
-            <a:lvl9pPr marL="4572000" indent="0">
+            <a:lvl9pPr marL="3657600" indent="0">
               <a:buNone/>
-              <a:defRPr sz="2000" b="1"/>
+              <a:defRPr sz="1600" b="1"/>
             </a:lvl9pPr>
           </a:lstStyle>
           <a:p>
@@ -1430,8 +1432,8 @@
         </p:nvSpPr>
         <p:spPr>
           <a:xfrm>
-            <a:off x="1049736" y="3340100"/>
-            <a:ext cx="6447234" cy="4912784"/>
+            <a:off x="839788" y="2505075"/>
+            <a:ext cx="5157787" cy="3684588"/>
           </a:xfrm>
         </p:spPr>
         <p:txBody>
@@ -1487,8 +1489,8 @@
         </p:nvSpPr>
         <p:spPr>
           <a:xfrm>
-            <a:off x="7715250" y="2241551"/>
-            <a:ext cx="6478985" cy="1098549"/>
+            <a:off x="6172200" y="1681163"/>
+            <a:ext cx="5183188" cy="823912"/>
           </a:xfrm>
         </p:spPr>
         <p:txBody>
@@ -1496,39 +1498,39 @@
           <a:lstStyle>
             <a:lvl1pPr marL="0" indent="0">
               <a:buNone/>
-              <a:defRPr sz="3000" b="1"/>
+              <a:defRPr sz="2400" b="1"/>
             </a:lvl1pPr>
-            <a:lvl2pPr marL="571500" indent="0">
-              <a:buNone/>
-              <a:defRPr sz="2500" b="1"/>
-            </a:lvl2pPr>
-            <a:lvl3pPr marL="1143000" indent="0">
-              <a:buNone/>
-              <a:defRPr sz="2250" b="1"/>
-            </a:lvl3pPr>
-            <a:lvl4pPr marL="1714500" indent="0">
+            <a:lvl2pPr marL="457200" indent="0">
               <a:buNone/>
               <a:defRPr sz="2000" b="1"/>
+            </a:lvl2pPr>
+            <a:lvl3pPr marL="914400" indent="0">
+              <a:buNone/>
+              <a:defRPr sz="1800" b="1"/>
+            </a:lvl3pPr>
+            <a:lvl4pPr marL="1371600" indent="0">
+              <a:buNone/>
+              <a:defRPr sz="1600" b="1"/>
             </a:lvl4pPr>
-            <a:lvl5pPr marL="2286000" indent="0">
+            <a:lvl5pPr marL="1828800" indent="0">
               <a:buNone/>
-              <a:defRPr sz="2000" b="1"/>
+              <a:defRPr sz="1600" b="1"/>
             </a:lvl5pPr>
-            <a:lvl6pPr marL="2857500" indent="0">
+            <a:lvl6pPr marL="2286000" indent="0">
               <a:buNone/>
-              <a:defRPr sz="2000" b="1"/>
+              <a:defRPr sz="1600" b="1"/>
             </a:lvl6pPr>
-            <a:lvl7pPr marL="3429000" indent="0">
+            <a:lvl7pPr marL="2743200" indent="0">
               <a:buNone/>
-              <a:defRPr sz="2000" b="1"/>
+              <a:defRPr sz="1600" b="1"/>
             </a:lvl7pPr>
-            <a:lvl8pPr marL="4000500" indent="0">
+            <a:lvl8pPr marL="3200400" indent="0">
               <a:buNone/>
-              <a:defRPr sz="2000" b="1"/>
+              <a:defRPr sz="1600" b="1"/>
             </a:lvl8pPr>
-            <a:lvl9pPr marL="4572000" indent="0">
+            <a:lvl9pPr marL="3657600" indent="0">
               <a:buNone/>
-              <a:defRPr sz="2000" b="1"/>
+              <a:defRPr sz="1600" b="1"/>
             </a:lvl9pPr>
           </a:lstStyle>
           <a:p>
@@ -1552,8 +1554,8 @@
         </p:nvSpPr>
         <p:spPr>
           <a:xfrm>
-            <a:off x="7715250" y="3340100"/>
-            <a:ext cx="6478985" cy="4912784"/>
+            <a:off x="6172200" y="2505075"/>
+            <a:ext cx="5183188" cy="3684588"/>
           </a:xfrm>
         </p:spPr>
         <p:txBody>
@@ -1614,7 +1616,7 @@
           <a:p>
             <a:fld id="{86D1F84C-FAEE-43AD-A0DD-C7A92FE74B12}" type="datetimeFigureOut">
               <a:rPr lang="en-US" smtClean="0"/>
-              <a:t>2/18/2023</a:t>
+              <a:t>2/20/2023</a:t>
             </a:fld>
             <a:endParaRPr lang="en-US"/>
           </a:p>
@@ -1665,7 +1667,7 @@
     </p:spTree>
     <p:extLst>
       <p:ext uri="{BB962C8B-B14F-4D97-AF65-F5344CB8AC3E}">
-        <p14:creationId xmlns:p14="http://schemas.microsoft.com/office/powerpoint/2010/main" val="494068317"/>
+        <p14:creationId xmlns:p14="http://schemas.microsoft.com/office/powerpoint/2010/main" val="1872320935"/>
       </p:ext>
     </p:extLst>
   </p:cSld>
@@ -1732,7 +1734,7 @@
           <a:p>
             <a:fld id="{86D1F84C-FAEE-43AD-A0DD-C7A92FE74B12}" type="datetimeFigureOut">
               <a:rPr lang="en-US" smtClean="0"/>
-              <a:t>2/18/2023</a:t>
+              <a:t>2/20/2023</a:t>
             </a:fld>
             <a:endParaRPr lang="en-US"/>
           </a:p>
@@ -1783,7 +1785,7 @@
     </p:spTree>
     <p:extLst>
       <p:ext uri="{BB962C8B-B14F-4D97-AF65-F5344CB8AC3E}">
-        <p14:creationId xmlns:p14="http://schemas.microsoft.com/office/powerpoint/2010/main" val="487520201"/>
+        <p14:creationId xmlns:p14="http://schemas.microsoft.com/office/powerpoint/2010/main" val="2693405131"/>
       </p:ext>
     </p:extLst>
   </p:cSld>
@@ -1827,7 +1829,7 @@
           <a:p>
             <a:fld id="{86D1F84C-FAEE-43AD-A0DD-C7A92FE74B12}" type="datetimeFigureOut">
               <a:rPr lang="en-US" smtClean="0"/>
-              <a:t>2/18/2023</a:t>
+              <a:t>2/20/2023</a:t>
             </a:fld>
             <a:endParaRPr lang="en-US"/>
           </a:p>
@@ -1878,7 +1880,7 @@
     </p:spTree>
     <p:extLst>
       <p:ext uri="{BB962C8B-B14F-4D97-AF65-F5344CB8AC3E}">
-        <p14:creationId xmlns:p14="http://schemas.microsoft.com/office/powerpoint/2010/main" val="3722658377"/>
+        <p14:creationId xmlns:p14="http://schemas.microsoft.com/office/powerpoint/2010/main" val="1994564151"/>
       </p:ext>
     </p:extLst>
   </p:cSld>
@@ -1917,15 +1919,15 @@
         </p:nvSpPr>
         <p:spPr>
           <a:xfrm>
-            <a:off x="1049736" y="609600"/>
-            <a:ext cx="4915296" cy="2133600"/>
+            <a:off x="839788" y="457200"/>
+            <a:ext cx="3932237" cy="1600200"/>
           </a:xfrm>
         </p:spPr>
         <p:txBody>
           <a:bodyPr anchor="b"/>
           <a:lstStyle>
             <a:lvl1pPr>
-              <a:defRPr sz="4000"/>
+              <a:defRPr sz="3200"/>
             </a:lvl1pPr>
           </a:lstStyle>
           <a:p>
@@ -1949,39 +1951,39 @@
         </p:nvSpPr>
         <p:spPr>
           <a:xfrm>
-            <a:off x="6478985" y="1316567"/>
-            <a:ext cx="7715250" cy="6498167"/>
+            <a:off x="5183188" y="987425"/>
+            <a:ext cx="6172200" cy="4873625"/>
           </a:xfrm>
         </p:spPr>
         <p:txBody>
           <a:bodyPr/>
           <a:lstStyle>
             <a:lvl1pPr>
-              <a:defRPr sz="4000"/>
+              <a:defRPr sz="3200"/>
             </a:lvl1pPr>
             <a:lvl2pPr>
-              <a:defRPr sz="3500"/>
+              <a:defRPr sz="2800"/>
             </a:lvl2pPr>
             <a:lvl3pPr>
-              <a:defRPr sz="3000"/>
+              <a:defRPr sz="2400"/>
             </a:lvl3pPr>
             <a:lvl4pPr>
-              <a:defRPr sz="2500"/>
+              <a:defRPr sz="2000"/>
             </a:lvl4pPr>
             <a:lvl5pPr>
-              <a:defRPr sz="2500"/>
+              <a:defRPr sz="2000"/>
             </a:lvl5pPr>
             <a:lvl6pPr>
-              <a:defRPr sz="2500"/>
+              <a:defRPr sz="2000"/>
             </a:lvl6pPr>
             <a:lvl7pPr>
-              <a:defRPr sz="2500"/>
+              <a:defRPr sz="2000"/>
             </a:lvl7pPr>
             <a:lvl8pPr>
-              <a:defRPr sz="2500"/>
+              <a:defRPr sz="2000"/>
             </a:lvl8pPr>
             <a:lvl9pPr>
-              <a:defRPr sz="2500"/>
+              <a:defRPr sz="2000"/>
             </a:lvl9pPr>
           </a:lstStyle>
           <a:p>
@@ -2034,8 +2036,8 @@
         </p:nvSpPr>
         <p:spPr>
           <a:xfrm>
-            <a:off x="1049736" y="2743200"/>
-            <a:ext cx="4915296" cy="5082117"/>
+            <a:off x="839788" y="2057400"/>
+            <a:ext cx="3932237" cy="3811588"/>
           </a:xfrm>
         </p:spPr>
         <p:txBody>
@@ -2043,39 +2045,39 @@
           <a:lstStyle>
             <a:lvl1pPr marL="0" indent="0">
               <a:buNone/>
-              <a:defRPr sz="2000"/>
+              <a:defRPr sz="1600"/>
             </a:lvl1pPr>
-            <a:lvl2pPr marL="571500" indent="0">
+            <a:lvl2pPr marL="457200" indent="0">
               <a:buNone/>
-              <a:defRPr sz="1750"/>
+              <a:defRPr sz="1400"/>
             </a:lvl2pPr>
-            <a:lvl3pPr marL="1143000" indent="0">
+            <a:lvl3pPr marL="914400" indent="0">
               <a:buNone/>
-              <a:defRPr sz="1500"/>
+              <a:defRPr sz="1200"/>
             </a:lvl3pPr>
-            <a:lvl4pPr marL="1714500" indent="0">
+            <a:lvl4pPr marL="1371600" indent="0">
               <a:buNone/>
-              <a:defRPr sz="1250"/>
+              <a:defRPr sz="1000"/>
             </a:lvl4pPr>
-            <a:lvl5pPr marL="2286000" indent="0">
+            <a:lvl5pPr marL="1828800" indent="0">
               <a:buNone/>
-              <a:defRPr sz="1250"/>
+              <a:defRPr sz="1000"/>
             </a:lvl5pPr>
-            <a:lvl6pPr marL="2857500" indent="0">
+            <a:lvl6pPr marL="2286000" indent="0">
               <a:buNone/>
-              <a:defRPr sz="1250"/>
+              <a:defRPr sz="1000"/>
             </a:lvl6pPr>
-            <a:lvl7pPr marL="3429000" indent="0">
+            <a:lvl7pPr marL="2743200" indent="0">
               <a:buNone/>
-              <a:defRPr sz="1250"/>
+              <a:defRPr sz="1000"/>
             </a:lvl7pPr>
-            <a:lvl8pPr marL="4000500" indent="0">
+            <a:lvl8pPr marL="3200400" indent="0">
               <a:buNone/>
-              <a:defRPr sz="1250"/>
+              <a:defRPr sz="1000"/>
             </a:lvl8pPr>
-            <a:lvl9pPr marL="4572000" indent="0">
+            <a:lvl9pPr marL="3657600" indent="0">
               <a:buNone/>
-              <a:defRPr sz="1250"/>
+              <a:defRPr sz="1000"/>
             </a:lvl9pPr>
           </a:lstStyle>
           <a:p>
@@ -2104,7 +2106,7 @@
           <a:p>
             <a:fld id="{86D1F84C-FAEE-43AD-A0DD-C7A92FE74B12}" type="datetimeFigureOut">
               <a:rPr lang="en-US" smtClean="0"/>
-              <a:t>2/18/2023</a:t>
+              <a:t>2/20/2023</a:t>
             </a:fld>
             <a:endParaRPr lang="en-US"/>
           </a:p>
@@ -2155,7 +2157,7 @@
     </p:spTree>
     <p:extLst>
       <p:ext uri="{BB962C8B-B14F-4D97-AF65-F5344CB8AC3E}">
-        <p14:creationId xmlns:p14="http://schemas.microsoft.com/office/powerpoint/2010/main" val="2338731631"/>
+        <p14:creationId xmlns:p14="http://schemas.microsoft.com/office/powerpoint/2010/main" val="452075349"/>
       </p:ext>
     </p:extLst>
   </p:cSld>
@@ -2194,15 +2196,15 @@
         </p:nvSpPr>
         <p:spPr>
           <a:xfrm>
-            <a:off x="1049736" y="609600"/>
-            <a:ext cx="4915296" cy="2133600"/>
+            <a:off x="839788" y="457200"/>
+            <a:ext cx="3932237" cy="1600200"/>
           </a:xfrm>
         </p:spPr>
         <p:txBody>
           <a:bodyPr anchor="b"/>
           <a:lstStyle>
             <a:lvl1pPr>
-              <a:defRPr sz="4000"/>
+              <a:defRPr sz="3200"/>
             </a:lvl1pPr>
           </a:lstStyle>
           <a:p>
@@ -2226,8 +2228,8 @@
         </p:nvSpPr>
         <p:spPr>
           <a:xfrm>
-            <a:off x="6478985" y="1316567"/>
-            <a:ext cx="7715250" cy="6498167"/>
+            <a:off x="5183188" y="987425"/>
+            <a:ext cx="6172200" cy="4873625"/>
           </a:xfrm>
         </p:spPr>
         <p:txBody>
@@ -2235,39 +2237,39 @@
           <a:lstStyle>
             <a:lvl1pPr marL="0" indent="0">
               <a:buNone/>
-              <a:defRPr sz="4000"/>
+              <a:defRPr sz="3200"/>
             </a:lvl1pPr>
-            <a:lvl2pPr marL="571500" indent="0">
+            <a:lvl2pPr marL="457200" indent="0">
               <a:buNone/>
-              <a:defRPr sz="3500"/>
+              <a:defRPr sz="2800"/>
             </a:lvl2pPr>
-            <a:lvl3pPr marL="1143000" indent="0">
+            <a:lvl3pPr marL="914400" indent="0">
               <a:buNone/>
-              <a:defRPr sz="3000"/>
+              <a:defRPr sz="2400"/>
             </a:lvl3pPr>
-            <a:lvl4pPr marL="1714500" indent="0">
+            <a:lvl4pPr marL="1371600" indent="0">
               <a:buNone/>
-              <a:defRPr sz="2500"/>
+              <a:defRPr sz="2000"/>
             </a:lvl4pPr>
-            <a:lvl5pPr marL="2286000" indent="0">
+            <a:lvl5pPr marL="1828800" indent="0">
               <a:buNone/>
-              <a:defRPr sz="2500"/>
+              <a:defRPr sz="2000"/>
             </a:lvl5pPr>
-            <a:lvl6pPr marL="2857500" indent="0">
+            <a:lvl6pPr marL="2286000" indent="0">
               <a:buNone/>
-              <a:defRPr sz="2500"/>
+              <a:defRPr sz="2000"/>
             </a:lvl6pPr>
-            <a:lvl7pPr marL="3429000" indent="0">
+            <a:lvl7pPr marL="2743200" indent="0">
               <a:buNone/>
-              <a:defRPr sz="2500"/>
+              <a:defRPr sz="2000"/>
             </a:lvl7pPr>
-            <a:lvl8pPr marL="4000500" indent="0">
+            <a:lvl8pPr marL="3200400" indent="0">
               <a:buNone/>
-              <a:defRPr sz="2500"/>
+              <a:defRPr sz="2000"/>
             </a:lvl8pPr>
-            <a:lvl9pPr marL="4572000" indent="0">
+            <a:lvl9pPr marL="3657600" indent="0">
               <a:buNone/>
-              <a:defRPr sz="2500"/>
+              <a:defRPr sz="2000"/>
             </a:lvl9pPr>
           </a:lstStyle>
           <a:p>
@@ -2291,8 +2293,8 @@
         </p:nvSpPr>
         <p:spPr>
           <a:xfrm>
-            <a:off x="1049736" y="2743200"/>
-            <a:ext cx="4915296" cy="5082117"/>
+            <a:off x="839788" y="2057400"/>
+            <a:ext cx="3932237" cy="3811588"/>
           </a:xfrm>
         </p:spPr>
         <p:txBody>
@@ -2300,39 +2302,39 @@
           <a:lstStyle>
             <a:lvl1pPr marL="0" indent="0">
               <a:buNone/>
-              <a:defRPr sz="2000"/>
+              <a:defRPr sz="1600"/>
             </a:lvl1pPr>
-            <a:lvl2pPr marL="571500" indent="0">
+            <a:lvl2pPr marL="457200" indent="0">
               <a:buNone/>
-              <a:defRPr sz="1750"/>
+              <a:defRPr sz="1400"/>
             </a:lvl2pPr>
-            <a:lvl3pPr marL="1143000" indent="0">
+            <a:lvl3pPr marL="914400" indent="0">
               <a:buNone/>
-              <a:defRPr sz="1500"/>
+              <a:defRPr sz="1200"/>
             </a:lvl3pPr>
-            <a:lvl4pPr marL="1714500" indent="0">
+            <a:lvl4pPr marL="1371600" indent="0">
               <a:buNone/>
-              <a:defRPr sz="1250"/>
+              <a:defRPr sz="1000"/>
             </a:lvl4pPr>
-            <a:lvl5pPr marL="2286000" indent="0">
+            <a:lvl5pPr marL="1828800" indent="0">
               <a:buNone/>
-              <a:defRPr sz="1250"/>
+              <a:defRPr sz="1000"/>
             </a:lvl5pPr>
-            <a:lvl6pPr marL="2857500" indent="0">
+            <a:lvl6pPr marL="2286000" indent="0">
               <a:buNone/>
-              <a:defRPr sz="1250"/>
+              <a:defRPr sz="1000"/>
             </a:lvl6pPr>
-            <a:lvl7pPr marL="3429000" indent="0">
+            <a:lvl7pPr marL="2743200" indent="0">
               <a:buNone/>
-              <a:defRPr sz="1250"/>
+              <a:defRPr sz="1000"/>
             </a:lvl7pPr>
-            <a:lvl8pPr marL="4000500" indent="0">
+            <a:lvl8pPr marL="3200400" indent="0">
               <a:buNone/>
-              <a:defRPr sz="1250"/>
+              <a:defRPr sz="1000"/>
             </a:lvl8pPr>
-            <a:lvl9pPr marL="4572000" indent="0">
+            <a:lvl9pPr marL="3657600" indent="0">
               <a:buNone/>
-              <a:defRPr sz="1250"/>
+              <a:defRPr sz="1000"/>
             </a:lvl9pPr>
           </a:lstStyle>
           <a:p>
@@ -2361,7 +2363,7 @@
           <a:p>
             <a:fld id="{86D1F84C-FAEE-43AD-A0DD-C7A92FE74B12}" type="datetimeFigureOut">
               <a:rPr lang="en-US" smtClean="0"/>
-              <a:t>2/18/2023</a:t>
+              <a:t>2/20/2023</a:t>
             </a:fld>
             <a:endParaRPr lang="en-US"/>
           </a:p>
@@ -2412,7 +2414,7 @@
     </p:spTree>
     <p:extLst>
       <p:ext uri="{BB962C8B-B14F-4D97-AF65-F5344CB8AC3E}">
-        <p14:creationId xmlns:p14="http://schemas.microsoft.com/office/powerpoint/2010/main" val="1196267772"/>
+        <p14:creationId xmlns:p14="http://schemas.microsoft.com/office/powerpoint/2010/main" val="3903245703"/>
       </p:ext>
     </p:extLst>
   </p:cSld>
@@ -2456,8 +2458,8 @@
         </p:nvSpPr>
         <p:spPr>
           <a:xfrm>
-            <a:off x="1047750" y="486834"/>
-            <a:ext cx="13144500" cy="1767417"/>
+            <a:off x="838200" y="365125"/>
+            <a:ext cx="10515600" cy="1325563"/>
           </a:xfrm>
           <a:prstGeom prst="rect">
             <a:avLst/>
@@ -2489,8 +2491,8 @@
         </p:nvSpPr>
         <p:spPr>
           <a:xfrm>
-            <a:off x="1047750" y="2434167"/>
-            <a:ext cx="13144500" cy="5801784"/>
+            <a:off x="838200" y="1825625"/>
+            <a:ext cx="10515600" cy="4351338"/>
           </a:xfrm>
           <a:prstGeom prst="rect">
             <a:avLst/>
@@ -2551,8 +2553,8 @@
         </p:nvSpPr>
         <p:spPr>
           <a:xfrm>
-            <a:off x="1047750" y="8475134"/>
-            <a:ext cx="3429000" cy="486833"/>
+            <a:off x="838200" y="6356350"/>
+            <a:ext cx="2743200" cy="365125"/>
           </a:xfrm>
           <a:prstGeom prst="rect">
             <a:avLst/>
@@ -2562,7 +2564,7 @@
           <a:bodyPr vert="horz" lIns="91440" tIns="45720" rIns="91440" bIns="45720" rtlCol="0" anchor="ctr"/>
           <a:lstStyle>
             <a:lvl1pPr algn="l">
-              <a:defRPr sz="1500">
+              <a:defRPr sz="1200">
                 <a:solidFill>
                   <a:schemeClr val="tx1">
                     <a:tint val="75000"/>
@@ -2574,7 +2576,7 @@
           <a:p>
             <a:fld id="{86D1F84C-FAEE-43AD-A0DD-C7A92FE74B12}" type="datetimeFigureOut">
               <a:rPr lang="en-US" smtClean="0"/>
-              <a:t>2/18/2023</a:t>
+              <a:t>2/20/2023</a:t>
             </a:fld>
             <a:endParaRPr lang="en-US"/>
           </a:p>
@@ -2592,8 +2594,8 @@
         </p:nvSpPr>
         <p:spPr>
           <a:xfrm>
-            <a:off x="5048250" y="8475134"/>
-            <a:ext cx="5143500" cy="486833"/>
+            <a:off x="4038600" y="6356350"/>
+            <a:ext cx="4114800" cy="365125"/>
           </a:xfrm>
           <a:prstGeom prst="rect">
             <a:avLst/>
@@ -2603,7 +2605,7 @@
           <a:bodyPr vert="horz" lIns="91440" tIns="45720" rIns="91440" bIns="45720" rtlCol="0" anchor="ctr"/>
           <a:lstStyle>
             <a:lvl1pPr algn="ctr">
-              <a:defRPr sz="1500">
+              <a:defRPr sz="1200">
                 <a:solidFill>
                   <a:schemeClr val="tx1">
                     <a:tint val="75000"/>
@@ -2629,8 +2631,8 @@
         </p:nvSpPr>
         <p:spPr>
           <a:xfrm>
-            <a:off x="10763250" y="8475134"/>
-            <a:ext cx="3429000" cy="486833"/>
+            <a:off x="8610600" y="6356350"/>
+            <a:ext cx="2743200" cy="365125"/>
           </a:xfrm>
           <a:prstGeom prst="rect">
             <a:avLst/>
@@ -2640,7 +2642,7 @@
           <a:bodyPr vert="horz" lIns="91440" tIns="45720" rIns="91440" bIns="45720" rtlCol="0" anchor="ctr"/>
           <a:lstStyle>
             <a:lvl1pPr algn="r">
-              <a:defRPr sz="1500">
+              <a:defRPr sz="1200">
                 <a:solidFill>
                   <a:schemeClr val="tx1">
                     <a:tint val="75000"/>
@@ -2661,27 +2663,27 @@
     </p:spTree>
     <p:extLst>
       <p:ext uri="{BB962C8B-B14F-4D97-AF65-F5344CB8AC3E}">
-        <p14:creationId xmlns:p14="http://schemas.microsoft.com/office/powerpoint/2010/main" val="3851736981"/>
+        <p14:creationId xmlns:p14="http://schemas.microsoft.com/office/powerpoint/2010/main" val="2615925048"/>
       </p:ext>
     </p:extLst>
   </p:cSld>
   <p:clrMap bg1="lt1" tx1="dk1" bg2="lt2" tx2="dk2" accent1="accent1" accent2="accent2" accent3="accent3" accent4="accent4" accent5="accent5" accent6="accent6" hlink="hlink" folHlink="folHlink"/>
   <p:sldLayoutIdLst>
-    <p:sldLayoutId id="2147483661" r:id="rId1"/>
-    <p:sldLayoutId id="2147483662" r:id="rId2"/>
-    <p:sldLayoutId id="2147483663" r:id="rId3"/>
-    <p:sldLayoutId id="2147483664" r:id="rId4"/>
-    <p:sldLayoutId id="2147483665" r:id="rId5"/>
-    <p:sldLayoutId id="2147483666" r:id="rId6"/>
-    <p:sldLayoutId id="2147483667" r:id="rId7"/>
-    <p:sldLayoutId id="2147483668" r:id="rId8"/>
-    <p:sldLayoutId id="2147483669" r:id="rId9"/>
-    <p:sldLayoutId id="2147483670" r:id="rId10"/>
-    <p:sldLayoutId id="2147483671" r:id="rId11"/>
+    <p:sldLayoutId id="2147483685" r:id="rId1"/>
+    <p:sldLayoutId id="2147483686" r:id="rId2"/>
+    <p:sldLayoutId id="2147483687" r:id="rId3"/>
+    <p:sldLayoutId id="2147483688" r:id="rId4"/>
+    <p:sldLayoutId id="2147483689" r:id="rId5"/>
+    <p:sldLayoutId id="2147483690" r:id="rId6"/>
+    <p:sldLayoutId id="2147483691" r:id="rId7"/>
+    <p:sldLayoutId id="2147483692" r:id="rId8"/>
+    <p:sldLayoutId id="2147483693" r:id="rId9"/>
+    <p:sldLayoutId id="2147483694" r:id="rId10"/>
+    <p:sldLayoutId id="2147483695" r:id="rId11"/>
   </p:sldLayoutIdLst>
   <p:txStyles>
     <p:titleStyle>
-      <a:lvl1pPr algn="l" defTabSz="1143000" rtl="0" eaLnBrk="1" latinLnBrk="0" hangingPunct="1">
+      <a:lvl1pPr algn="l" defTabSz="914400" rtl="0" eaLnBrk="1" latinLnBrk="0" hangingPunct="1">
         <a:lnSpc>
           <a:spcPct val="90000"/>
         </a:lnSpc>
@@ -2689,7 +2691,7 @@
           <a:spcPct val="0"/>
         </a:spcBef>
         <a:buNone/>
-        <a:defRPr sz="5500" kern="1200">
+        <a:defRPr sz="4400" kern="1200">
           <a:solidFill>
             <a:schemeClr val="tx1"/>
           </a:solidFill>
@@ -2700,16 +2702,16 @@
       </a:lvl1pPr>
     </p:titleStyle>
     <p:bodyStyle>
-      <a:lvl1pPr marL="285750" indent="-285750" algn="l" defTabSz="1143000" rtl="0" eaLnBrk="1" latinLnBrk="0" hangingPunct="1">
+      <a:lvl1pPr marL="228600" indent="-228600" algn="l" defTabSz="914400" rtl="0" eaLnBrk="1" latinLnBrk="0" hangingPunct="1">
         <a:lnSpc>
           <a:spcPct val="90000"/>
         </a:lnSpc>
         <a:spcBef>
-          <a:spcPts val="1250"/>
+          <a:spcPts val="1000"/>
         </a:spcBef>
         <a:buFont typeface="Arial" panose="020B0604020202020204" pitchFamily="34" charset="0"/>
         <a:buChar char="•"/>
-        <a:defRPr sz="3500" kern="1200">
+        <a:defRPr sz="2800" kern="1200">
           <a:solidFill>
             <a:schemeClr val="tx1"/>
           </a:solidFill>
@@ -2718,16 +2720,16 @@
           <a:cs typeface="+mn-cs"/>
         </a:defRPr>
       </a:lvl1pPr>
-      <a:lvl2pPr marL="857250" indent="-285750" algn="l" defTabSz="1143000" rtl="0" eaLnBrk="1" latinLnBrk="0" hangingPunct="1">
+      <a:lvl2pPr marL="685800" indent="-228600" algn="l" defTabSz="914400" rtl="0" eaLnBrk="1" latinLnBrk="0" hangingPunct="1">
         <a:lnSpc>
           <a:spcPct val="90000"/>
         </a:lnSpc>
         <a:spcBef>
-          <a:spcPts val="625"/>
+          <a:spcPts val="500"/>
         </a:spcBef>
         <a:buFont typeface="Arial" panose="020B0604020202020204" pitchFamily="34" charset="0"/>
         <a:buChar char="•"/>
-        <a:defRPr sz="3000" kern="1200">
+        <a:defRPr sz="2400" kern="1200">
           <a:solidFill>
             <a:schemeClr val="tx1"/>
           </a:solidFill>
@@ -2736,16 +2738,16 @@
           <a:cs typeface="+mn-cs"/>
         </a:defRPr>
       </a:lvl2pPr>
-      <a:lvl3pPr marL="1428750" indent="-285750" algn="l" defTabSz="1143000" rtl="0" eaLnBrk="1" latinLnBrk="0" hangingPunct="1">
+      <a:lvl3pPr marL="1143000" indent="-228600" algn="l" defTabSz="914400" rtl="0" eaLnBrk="1" latinLnBrk="0" hangingPunct="1">
         <a:lnSpc>
           <a:spcPct val="90000"/>
         </a:lnSpc>
         <a:spcBef>
-          <a:spcPts val="625"/>
+          <a:spcPts val="500"/>
         </a:spcBef>
         <a:buFont typeface="Arial" panose="020B0604020202020204" pitchFamily="34" charset="0"/>
         <a:buChar char="•"/>
-        <a:defRPr sz="2500" kern="1200">
+        <a:defRPr sz="2000" kern="1200">
           <a:solidFill>
             <a:schemeClr val="tx1"/>
           </a:solidFill>
@@ -2754,16 +2756,16 @@
           <a:cs typeface="+mn-cs"/>
         </a:defRPr>
       </a:lvl3pPr>
-      <a:lvl4pPr marL="2000250" indent="-285750" algn="l" defTabSz="1143000" rtl="0" eaLnBrk="1" latinLnBrk="0" hangingPunct="1">
+      <a:lvl4pPr marL="1600200" indent="-228600" algn="l" defTabSz="914400" rtl="0" eaLnBrk="1" latinLnBrk="0" hangingPunct="1">
         <a:lnSpc>
           <a:spcPct val="90000"/>
         </a:lnSpc>
         <a:spcBef>
-          <a:spcPts val="625"/>
+          <a:spcPts val="500"/>
         </a:spcBef>
         <a:buFont typeface="Arial" panose="020B0604020202020204" pitchFamily="34" charset="0"/>
         <a:buChar char="•"/>
-        <a:defRPr sz="2250" kern="1200">
+        <a:defRPr sz="1800" kern="1200">
           <a:solidFill>
             <a:schemeClr val="tx1"/>
           </a:solidFill>
@@ -2772,16 +2774,16 @@
           <a:cs typeface="+mn-cs"/>
         </a:defRPr>
       </a:lvl4pPr>
-      <a:lvl5pPr marL="2571750" indent="-285750" algn="l" defTabSz="1143000" rtl="0" eaLnBrk="1" latinLnBrk="0" hangingPunct="1">
+      <a:lvl5pPr marL="2057400" indent="-228600" algn="l" defTabSz="914400" rtl="0" eaLnBrk="1" latinLnBrk="0" hangingPunct="1">
         <a:lnSpc>
           <a:spcPct val="90000"/>
         </a:lnSpc>
         <a:spcBef>
-          <a:spcPts val="625"/>
+          <a:spcPts val="500"/>
         </a:spcBef>
         <a:buFont typeface="Arial" panose="020B0604020202020204" pitchFamily="34" charset="0"/>
         <a:buChar char="•"/>
-        <a:defRPr sz="2250" kern="1200">
+        <a:defRPr sz="1800" kern="1200">
           <a:solidFill>
             <a:schemeClr val="tx1"/>
           </a:solidFill>
@@ -2790,16 +2792,16 @@
           <a:cs typeface="+mn-cs"/>
         </a:defRPr>
       </a:lvl5pPr>
-      <a:lvl6pPr marL="3143250" indent="-285750" algn="l" defTabSz="1143000" rtl="0" eaLnBrk="1" latinLnBrk="0" hangingPunct="1">
+      <a:lvl6pPr marL="2514600" indent="-228600" algn="l" defTabSz="914400" rtl="0" eaLnBrk="1" latinLnBrk="0" hangingPunct="1">
         <a:lnSpc>
           <a:spcPct val="90000"/>
         </a:lnSpc>
         <a:spcBef>
-          <a:spcPts val="625"/>
+          <a:spcPts val="500"/>
         </a:spcBef>
         <a:buFont typeface="Arial" panose="020B0604020202020204" pitchFamily="34" charset="0"/>
         <a:buChar char="•"/>
-        <a:defRPr sz="2250" kern="1200">
+        <a:defRPr sz="1800" kern="1200">
           <a:solidFill>
             <a:schemeClr val="tx1"/>
           </a:solidFill>
@@ -2808,16 +2810,16 @@
           <a:cs typeface="+mn-cs"/>
         </a:defRPr>
       </a:lvl6pPr>
-      <a:lvl7pPr marL="3714750" indent="-285750" algn="l" defTabSz="1143000" rtl="0" eaLnBrk="1" latinLnBrk="0" hangingPunct="1">
+      <a:lvl7pPr marL="2971800" indent="-228600" algn="l" defTabSz="914400" rtl="0" eaLnBrk="1" latinLnBrk="0" hangingPunct="1">
         <a:lnSpc>
           <a:spcPct val="90000"/>
         </a:lnSpc>
         <a:spcBef>
-          <a:spcPts val="625"/>
+          <a:spcPts val="500"/>
         </a:spcBef>
         <a:buFont typeface="Arial" panose="020B0604020202020204" pitchFamily="34" charset="0"/>
         <a:buChar char="•"/>
-        <a:defRPr sz="2250" kern="1200">
+        <a:defRPr sz="1800" kern="1200">
           <a:solidFill>
             <a:schemeClr val="tx1"/>
           </a:solidFill>
@@ -2826,16 +2828,16 @@
           <a:cs typeface="+mn-cs"/>
         </a:defRPr>
       </a:lvl7pPr>
-      <a:lvl8pPr marL="4286250" indent="-285750" algn="l" defTabSz="1143000" rtl="0" eaLnBrk="1" latinLnBrk="0" hangingPunct="1">
+      <a:lvl8pPr marL="3429000" indent="-228600" algn="l" defTabSz="914400" rtl="0" eaLnBrk="1" latinLnBrk="0" hangingPunct="1">
         <a:lnSpc>
           <a:spcPct val="90000"/>
         </a:lnSpc>
         <a:spcBef>
-          <a:spcPts val="625"/>
+          <a:spcPts val="500"/>
         </a:spcBef>
         <a:buFont typeface="Arial" panose="020B0604020202020204" pitchFamily="34" charset="0"/>
         <a:buChar char="•"/>
-        <a:defRPr sz="2250" kern="1200">
+        <a:defRPr sz="1800" kern="1200">
           <a:solidFill>
             <a:schemeClr val="tx1"/>
           </a:solidFill>
@@ -2844,16 +2846,16 @@
           <a:cs typeface="+mn-cs"/>
         </a:defRPr>
       </a:lvl8pPr>
-      <a:lvl9pPr marL="4857750" indent="-285750" algn="l" defTabSz="1143000" rtl="0" eaLnBrk="1" latinLnBrk="0" hangingPunct="1">
+      <a:lvl9pPr marL="3886200" indent="-228600" algn="l" defTabSz="914400" rtl="0" eaLnBrk="1" latinLnBrk="0" hangingPunct="1">
         <a:lnSpc>
           <a:spcPct val="90000"/>
         </a:lnSpc>
         <a:spcBef>
-          <a:spcPts val="625"/>
+          <a:spcPts val="500"/>
         </a:spcBef>
         <a:buFont typeface="Arial" panose="020B0604020202020204" pitchFamily="34" charset="0"/>
         <a:buChar char="•"/>
-        <a:defRPr sz="2250" kern="1200">
+        <a:defRPr sz="1800" kern="1200">
           <a:solidFill>
             <a:schemeClr val="tx1"/>
           </a:solidFill>
@@ -2867,8 +2869,8 @@
       <a:defPPr>
         <a:defRPr lang="en-US"/>
       </a:defPPr>
-      <a:lvl1pPr marL="0" algn="l" defTabSz="1143000" rtl="0" eaLnBrk="1" latinLnBrk="0" hangingPunct="1">
-        <a:defRPr sz="2250" kern="1200">
+      <a:lvl1pPr marL="0" algn="l" defTabSz="914400" rtl="0" eaLnBrk="1" latinLnBrk="0" hangingPunct="1">
+        <a:defRPr sz="1800" kern="1200">
           <a:solidFill>
             <a:schemeClr val="tx1"/>
           </a:solidFill>
@@ -2877,8 +2879,8 @@
           <a:cs typeface="+mn-cs"/>
         </a:defRPr>
       </a:lvl1pPr>
-      <a:lvl2pPr marL="571500" algn="l" defTabSz="1143000" rtl="0" eaLnBrk="1" latinLnBrk="0" hangingPunct="1">
-        <a:defRPr sz="2250" kern="1200">
+      <a:lvl2pPr marL="457200" algn="l" defTabSz="914400" rtl="0" eaLnBrk="1" latinLnBrk="0" hangingPunct="1">
+        <a:defRPr sz="1800" kern="1200">
           <a:solidFill>
             <a:schemeClr val="tx1"/>
           </a:solidFill>
@@ -2887,8 +2889,8 @@
           <a:cs typeface="+mn-cs"/>
         </a:defRPr>
       </a:lvl2pPr>
-      <a:lvl3pPr marL="1143000" algn="l" defTabSz="1143000" rtl="0" eaLnBrk="1" latinLnBrk="0" hangingPunct="1">
-        <a:defRPr sz="2250" kern="1200">
+      <a:lvl3pPr marL="914400" algn="l" defTabSz="914400" rtl="0" eaLnBrk="1" latinLnBrk="0" hangingPunct="1">
+        <a:defRPr sz="1800" kern="1200">
           <a:solidFill>
             <a:schemeClr val="tx1"/>
           </a:solidFill>
@@ -2897,8 +2899,8 @@
           <a:cs typeface="+mn-cs"/>
         </a:defRPr>
       </a:lvl3pPr>
-      <a:lvl4pPr marL="1714500" algn="l" defTabSz="1143000" rtl="0" eaLnBrk="1" latinLnBrk="0" hangingPunct="1">
-        <a:defRPr sz="2250" kern="1200">
+      <a:lvl4pPr marL="1371600" algn="l" defTabSz="914400" rtl="0" eaLnBrk="1" latinLnBrk="0" hangingPunct="1">
+        <a:defRPr sz="1800" kern="1200">
           <a:solidFill>
             <a:schemeClr val="tx1"/>
           </a:solidFill>
@@ -2907,8 +2909,8 @@
           <a:cs typeface="+mn-cs"/>
         </a:defRPr>
       </a:lvl4pPr>
-      <a:lvl5pPr marL="2286000" algn="l" defTabSz="1143000" rtl="0" eaLnBrk="1" latinLnBrk="0" hangingPunct="1">
-        <a:defRPr sz="2250" kern="1200">
+      <a:lvl5pPr marL="1828800" algn="l" defTabSz="914400" rtl="0" eaLnBrk="1" latinLnBrk="0" hangingPunct="1">
+        <a:defRPr sz="1800" kern="1200">
           <a:solidFill>
             <a:schemeClr val="tx1"/>
           </a:solidFill>
@@ -2917,8 +2919,8 @@
           <a:cs typeface="+mn-cs"/>
         </a:defRPr>
       </a:lvl5pPr>
-      <a:lvl6pPr marL="2857500" algn="l" defTabSz="1143000" rtl="0" eaLnBrk="1" latinLnBrk="0" hangingPunct="1">
-        <a:defRPr sz="2250" kern="1200">
+      <a:lvl6pPr marL="2286000" algn="l" defTabSz="914400" rtl="0" eaLnBrk="1" latinLnBrk="0" hangingPunct="1">
+        <a:defRPr sz="1800" kern="1200">
           <a:solidFill>
             <a:schemeClr val="tx1"/>
           </a:solidFill>
@@ -2927,8 +2929,8 @@
           <a:cs typeface="+mn-cs"/>
         </a:defRPr>
       </a:lvl6pPr>
-      <a:lvl7pPr marL="3429000" algn="l" defTabSz="1143000" rtl="0" eaLnBrk="1" latinLnBrk="0" hangingPunct="1">
-        <a:defRPr sz="2250" kern="1200">
+      <a:lvl7pPr marL="2743200" algn="l" defTabSz="914400" rtl="0" eaLnBrk="1" latinLnBrk="0" hangingPunct="1">
+        <a:defRPr sz="1800" kern="1200">
           <a:solidFill>
             <a:schemeClr val="tx1"/>
           </a:solidFill>
@@ -2937,8 +2939,8 @@
           <a:cs typeface="+mn-cs"/>
         </a:defRPr>
       </a:lvl7pPr>
-      <a:lvl8pPr marL="4000500" algn="l" defTabSz="1143000" rtl="0" eaLnBrk="1" latinLnBrk="0" hangingPunct="1">
-        <a:defRPr sz="2250" kern="1200">
+      <a:lvl8pPr marL="3200400" algn="l" defTabSz="914400" rtl="0" eaLnBrk="1" latinLnBrk="0" hangingPunct="1">
+        <a:defRPr sz="1800" kern="1200">
           <a:solidFill>
             <a:schemeClr val="tx1"/>
           </a:solidFill>
@@ -2947,8 +2949,8 @@
           <a:cs typeface="+mn-cs"/>
         </a:defRPr>
       </a:lvl8pPr>
-      <a:lvl9pPr marL="4572000" algn="l" defTabSz="1143000" rtl="0" eaLnBrk="1" latinLnBrk="0" hangingPunct="1">
-        <a:defRPr sz="2250" kern="1200">
+      <a:lvl9pPr marL="3657600" algn="l" defTabSz="914400" rtl="0" eaLnBrk="1" latinLnBrk="0" hangingPunct="1">
+        <a:defRPr sz="1800" kern="1200">
           <a:solidFill>
             <a:schemeClr val="tx1"/>
           </a:solidFill>
@@ -3016,8 +3018,8 @@
         </p:blipFill>
         <p:spPr>
           <a:xfrm>
-            <a:off x="0" y="0"/>
-            <a:ext cx="15240000" cy="9144000"/>
+            <a:off x="383789" y="1674"/>
+            <a:ext cx="11424422" cy="6854653"/>
           </a:xfrm>
           <a:prstGeom prst="rect">
             <a:avLst/>
@@ -3038,8 +3040,8 @@
         </p:nvSpPr>
         <p:spPr>
           <a:xfrm rot="11099126">
-            <a:off x="-370129" y="-508293"/>
-            <a:ext cx="11187193" cy="10084385"/>
+            <a:off x="106328" y="-379360"/>
+            <a:ext cx="8386300" cy="7559598"/>
           </a:xfrm>
           <a:custGeom>
             <a:avLst/>
@@ -3138,7 +3140,7 @@
           <a:lstStyle/>
           <a:p>
             <a:pPr algn="ctr"/>
-            <a:endParaRPr lang="en-US" sz="2880" dirty="0"/>
+            <a:endParaRPr lang="en-US" sz="2159" dirty="0"/>
           </a:p>
         </p:txBody>
       </p:sp>
@@ -3156,10 +3158,10 @@
         </p:nvGrpSpPr>
         <p:grpSpPr>
           <a:xfrm>
-            <a:off x="952755" y="3016790"/>
-            <a:ext cx="3476492" cy="1077218"/>
-            <a:chOff x="266955" y="2280190"/>
-            <a:chExt cx="3476492" cy="1077218"/>
+            <a:off x="1098007" y="2251551"/>
+            <a:ext cx="2606097" cy="830740"/>
+            <a:chOff x="266955" y="2264701"/>
+            <a:chExt cx="3476492" cy="1108195"/>
           </a:xfrm>
         </p:grpSpPr>
         <p:sp>
@@ -3212,7 +3214,7 @@
             <a:lstStyle/>
             <a:p>
               <a:pPr algn="ctr"/>
-              <a:endParaRPr lang="en-US" sz="3600" dirty="0">
+              <a:endParaRPr lang="en-US" sz="2699" dirty="0">
                 <a:solidFill>
                   <a:schemeClr val="bg1"/>
                 </a:solidFill>
@@ -3235,8 +3237,8 @@
           </p:nvSpPr>
           <p:spPr>
             <a:xfrm>
-              <a:off x="266955" y="2280190"/>
-              <a:ext cx="3476490" cy="1077218"/>
+              <a:off x="266955" y="2264701"/>
+              <a:ext cx="3476491" cy="1108195"/>
             </a:xfrm>
             <a:prstGeom prst="rect">
               <a:avLst/>
@@ -3254,7 +3256,7 @@
             <a:p>
               <a:pPr algn="ctr"/>
               <a:r>
-                <a:rPr lang="en-US" sz="3200" dirty="0">
+                <a:rPr lang="en-US" sz="2399" dirty="0">
                   <a:solidFill>
                     <a:schemeClr val="bg1"/>
                   </a:solidFill>
@@ -3265,7 +3267,7 @@
             </a:p>
             <a:p>
               <a:pPr algn="ctr"/>
-              <a:endParaRPr lang="en-US" sz="3200" dirty="0">
+              <a:endParaRPr lang="en-US" sz="2399" dirty="0">
                 <a:solidFill>
                   <a:schemeClr val="bg1"/>
                 </a:solidFill>
@@ -3328,8 +3330,8 @@
         </p:nvGrpSpPr>
         <p:grpSpPr>
           <a:xfrm>
-            <a:off x="-382829" y="-596899"/>
-            <a:ext cx="15622829" cy="10198392"/>
+            <a:off x="96808" y="-445782"/>
+            <a:ext cx="11711403" cy="7645061"/>
             <a:chOff x="-382829" y="-482893"/>
             <a:chExt cx="15622829" cy="10084385"/>
           </a:xfrm>
@@ -3483,7 +3485,7 @@
             <a:lstStyle/>
             <a:p>
               <a:pPr algn="ctr"/>
-              <a:endParaRPr lang="en-US" sz="2880" dirty="0"/>
+              <a:endParaRPr lang="en-US" sz="2159" dirty="0"/>
             </a:p>
           </p:txBody>
         </p:sp>
@@ -3555,8 +3557,8 @@
         </p:blipFill>
         <p:spPr>
           <a:xfrm>
-            <a:off x="0" y="-70016"/>
-            <a:ext cx="15240000" cy="9247376"/>
+            <a:off x="383789" y="-50812"/>
+            <a:ext cx="11424422" cy="6932147"/>
           </a:xfrm>
           <a:prstGeom prst="rect">
             <a:avLst/>
@@ -3577,8 +3579,8 @@
         </p:nvSpPr>
         <p:spPr>
           <a:xfrm rot="11099126">
-            <a:off x="-382829" y="-596899"/>
-            <a:ext cx="11187193" cy="10198392"/>
+            <a:off x="96807" y="-445782"/>
+            <a:ext cx="8386300" cy="7645061"/>
           </a:xfrm>
           <a:custGeom>
             <a:avLst/>
@@ -3677,7 +3679,7 @@
           <a:lstStyle/>
           <a:p>
             <a:pPr algn="ctr"/>
-            <a:endParaRPr lang="en-US" sz="2880" dirty="0"/>
+            <a:endParaRPr lang="en-US" sz="2159" dirty="0"/>
           </a:p>
         </p:txBody>
       </p:sp>
@@ -3695,8 +3697,8 @@
         </p:nvGrpSpPr>
         <p:grpSpPr>
           <a:xfrm>
-            <a:off x="430029" y="3363275"/>
-            <a:ext cx="4885652" cy="888024"/>
+            <a:off x="706153" y="2522899"/>
+            <a:ext cx="3662451" cy="665693"/>
             <a:chOff x="952755" y="4111316"/>
             <a:chExt cx="3498704" cy="780510"/>
           </a:xfrm>
@@ -3950,7 +3952,7 @@
             <a:lstStyle/>
             <a:p>
               <a:pPr algn="ctr"/>
-              <a:endParaRPr lang="en-US" sz="3600" dirty="0">
+              <a:endParaRPr lang="en-US" sz="2699" dirty="0">
                 <a:solidFill>
                   <a:schemeClr val="bg1"/>
                 </a:solidFill>
@@ -3973,8 +3975,8 @@
           </p:nvSpPr>
           <p:spPr>
             <a:xfrm>
-              <a:off x="974969" y="4175246"/>
-              <a:ext cx="3476490" cy="541027"/>
+              <a:off x="974969" y="4168423"/>
+              <a:ext cx="3476490" cy="554673"/>
             </a:xfrm>
             <a:prstGeom prst="rect">
               <a:avLst/>
@@ -3992,7 +3994,7 @@
             <a:p>
               <a:pPr algn="ctr"/>
               <a:r>
-                <a:rPr lang="en-US" sz="3300" dirty="0">
+                <a:rPr lang="en-US" sz="2474" dirty="0">
                   <a:solidFill>
                     <a:schemeClr val="bg1"/>
                   </a:solidFill>
@@ -4018,8 +4020,8 @@
         </p:nvGrpSpPr>
         <p:grpSpPr>
           <a:xfrm>
-            <a:off x="430282" y="4723641"/>
-            <a:ext cx="4885652" cy="888024"/>
+            <a:off x="706343" y="3542676"/>
+            <a:ext cx="3662451" cy="665693"/>
             <a:chOff x="952755" y="4111316"/>
             <a:chExt cx="3498704" cy="780510"/>
           </a:xfrm>
@@ -4273,7 +4275,7 @@
             <a:lstStyle/>
             <a:p>
               <a:pPr algn="ctr"/>
-              <a:endParaRPr lang="en-US" sz="3600" dirty="0">
+              <a:endParaRPr lang="en-US" sz="2699" dirty="0">
                 <a:solidFill>
                   <a:schemeClr val="bg1"/>
                 </a:solidFill>
@@ -4296,8 +4298,8 @@
           </p:nvSpPr>
           <p:spPr>
             <a:xfrm>
-              <a:off x="974969" y="4175246"/>
-              <a:ext cx="3476490" cy="541027"/>
+              <a:off x="974969" y="4168423"/>
+              <a:ext cx="3476490" cy="554673"/>
             </a:xfrm>
             <a:prstGeom prst="rect">
               <a:avLst/>
@@ -4315,7 +4317,7 @@
             <a:p>
               <a:pPr algn="ctr"/>
               <a:r>
-                <a:rPr lang="en-US" sz="3300" dirty="0">
+                <a:rPr lang="en-US" sz="2474" dirty="0">
                   <a:solidFill>
                     <a:schemeClr val="bg1"/>
                   </a:solidFill>
@@ -4341,8 +4343,8 @@
         </p:nvGrpSpPr>
         <p:grpSpPr>
           <a:xfrm>
-            <a:off x="430029" y="6151858"/>
-            <a:ext cx="4885652" cy="888024"/>
+            <a:off x="706153" y="4613316"/>
+            <a:ext cx="3662451" cy="665693"/>
             <a:chOff x="952755" y="4111316"/>
             <a:chExt cx="3498704" cy="780510"/>
           </a:xfrm>
@@ -4596,7 +4598,7 @@
             <a:lstStyle/>
             <a:p>
               <a:pPr algn="ctr"/>
-              <a:endParaRPr lang="en-US" sz="3600" dirty="0">
+              <a:endParaRPr lang="en-US" sz="2699" dirty="0">
                 <a:solidFill>
                   <a:schemeClr val="bg1"/>
                 </a:solidFill>
@@ -4619,8 +4621,8 @@
           </p:nvSpPr>
           <p:spPr>
             <a:xfrm>
-              <a:off x="974969" y="4175246"/>
-              <a:ext cx="3476490" cy="541027"/>
+              <a:off x="974969" y="4168423"/>
+              <a:ext cx="3476490" cy="554673"/>
             </a:xfrm>
             <a:prstGeom prst="rect">
               <a:avLst/>
@@ -4638,7 +4640,7 @@
             <a:p>
               <a:pPr algn="ctr"/>
               <a:r>
-                <a:rPr lang="en-US" sz="3300" dirty="0">
+                <a:rPr lang="en-US" sz="2474" dirty="0">
                   <a:solidFill>
                     <a:schemeClr val="bg1"/>
                   </a:solidFill>
@@ -4664,8 +4666,8 @@
         </p:nvGrpSpPr>
         <p:grpSpPr>
           <a:xfrm>
-            <a:off x="430029" y="2059970"/>
-            <a:ext cx="4885652" cy="888024"/>
+            <a:off x="706153" y="1545897"/>
+            <a:ext cx="3662451" cy="665693"/>
             <a:chOff x="952755" y="4111316"/>
             <a:chExt cx="3498704" cy="780510"/>
           </a:xfrm>
@@ -4919,7 +4921,7 @@
             <a:lstStyle/>
             <a:p>
               <a:pPr algn="ctr"/>
-              <a:endParaRPr lang="en-US" sz="3600" dirty="0">
+              <a:endParaRPr lang="en-US" sz="2699" dirty="0">
                 <a:solidFill>
                   <a:schemeClr val="bg1"/>
                 </a:solidFill>
@@ -4942,8 +4944,8 @@
           </p:nvSpPr>
           <p:spPr>
             <a:xfrm>
-              <a:off x="974969" y="4175246"/>
-              <a:ext cx="3476490" cy="541027"/>
+              <a:off x="974969" y="4168423"/>
+              <a:ext cx="3476490" cy="554673"/>
             </a:xfrm>
             <a:prstGeom prst="rect">
               <a:avLst/>
@@ -4961,7 +4963,7 @@
             <a:p>
               <a:pPr algn="ctr"/>
               <a:r>
-                <a:rPr lang="en-US" sz="3300" dirty="0">
+                <a:rPr lang="en-US" sz="2474" dirty="0">
                   <a:solidFill>
                     <a:schemeClr val="bg1"/>
                   </a:solidFill>
@@ -5041,8 +5043,8 @@
         </p:blipFill>
         <p:spPr>
           <a:xfrm>
-            <a:off x="0" y="-75304"/>
-            <a:ext cx="16198464" cy="9219304"/>
+            <a:off x="0" y="-2525"/>
+            <a:ext cx="12192001" cy="6911103"/>
           </a:xfrm>
           <a:prstGeom prst="rect">
             <a:avLst/>
@@ -5063,8 +5065,8 @@
         </p:nvSpPr>
         <p:spPr>
           <a:xfrm rot="11099126">
-            <a:off x="-382829" y="-596899"/>
-            <a:ext cx="11187193" cy="10198392"/>
+            <a:off x="-277226" y="-385826"/>
+            <a:ext cx="8386300" cy="7645061"/>
           </a:xfrm>
           <a:custGeom>
             <a:avLst/>
@@ -5163,7 +5165,7 @@
           <a:lstStyle/>
           <a:p>
             <a:pPr algn="ctr"/>
-            <a:endParaRPr lang="en-US" sz="2880" dirty="0"/>
+            <a:endParaRPr lang="en-US" sz="2159" dirty="0"/>
           </a:p>
         </p:txBody>
       </p:sp>
@@ -5181,8 +5183,8 @@
         </p:nvSpPr>
         <p:spPr>
           <a:xfrm>
-            <a:off x="443999" y="4307946"/>
-            <a:ext cx="4854633" cy="888024"/>
+            <a:off x="381920" y="3283308"/>
+            <a:ext cx="3639197" cy="665693"/>
           </a:xfrm>
           <a:custGeom>
             <a:avLst/>
@@ -5418,7 +5420,7 @@
           <a:lstStyle/>
           <a:p>
             <a:pPr algn="ctr"/>
-            <a:endParaRPr lang="en-US" sz="3600" dirty="0">
+            <a:endParaRPr lang="en-US" sz="2699" dirty="0">
               <a:solidFill>
                 <a:schemeClr val="tx1"/>
               </a:solidFill>
@@ -5441,8 +5443,8 @@
         </p:nvGrpSpPr>
         <p:grpSpPr>
           <a:xfrm>
-            <a:off x="430029" y="4290594"/>
-            <a:ext cx="4885652" cy="888024"/>
+            <a:off x="371446" y="3270300"/>
+            <a:ext cx="3662451" cy="665693"/>
             <a:chOff x="952755" y="4111316"/>
             <a:chExt cx="3498704" cy="780510"/>
           </a:xfrm>
@@ -5696,7 +5698,7 @@
             <a:lstStyle/>
             <a:p>
               <a:pPr algn="ctr"/>
-              <a:endParaRPr lang="en-US" sz="3600" dirty="0">
+              <a:endParaRPr lang="en-US" sz="2699" dirty="0">
                 <a:solidFill>
                   <a:schemeClr val="bg1"/>
                 </a:solidFill>
@@ -5719,8 +5721,8 @@
           </p:nvSpPr>
           <p:spPr>
             <a:xfrm>
-              <a:off x="974969" y="4175246"/>
-              <a:ext cx="3476490" cy="541027"/>
+              <a:off x="974969" y="4168423"/>
+              <a:ext cx="3476490" cy="554673"/>
             </a:xfrm>
             <a:prstGeom prst="rect">
               <a:avLst/>
@@ -5738,7 +5740,7 @@
             <a:p>
               <a:pPr algn="ctr"/>
               <a:r>
-                <a:rPr lang="en-US" sz="3300" dirty="0">
+                <a:rPr lang="en-US" sz="2474" dirty="0">
                   <a:solidFill>
                     <a:schemeClr val="bg1"/>
                   </a:solidFill>
@@ -5764,8 +5766,8 @@
         </p:nvSpPr>
         <p:spPr>
           <a:xfrm>
-            <a:off x="430028" y="5652555"/>
-            <a:ext cx="4854633" cy="888024"/>
+            <a:off x="371447" y="4291272"/>
+            <a:ext cx="3639197" cy="665693"/>
           </a:xfrm>
           <a:custGeom>
             <a:avLst/>
@@ -6001,7 +6003,7 @@
           <a:lstStyle/>
           <a:p>
             <a:pPr algn="ctr"/>
-            <a:endParaRPr lang="en-US" sz="3600" dirty="0">
+            <a:endParaRPr lang="en-US" sz="2699" dirty="0">
               <a:solidFill>
                 <a:schemeClr val="tx1"/>
               </a:solidFill>
@@ -6024,8 +6026,8 @@
         </p:nvGrpSpPr>
         <p:grpSpPr>
           <a:xfrm>
-            <a:off x="430282" y="5652555"/>
-            <a:ext cx="4885652" cy="888024"/>
+            <a:off x="371636" y="4291272"/>
+            <a:ext cx="3662451" cy="665693"/>
             <a:chOff x="952755" y="4111316"/>
             <a:chExt cx="3498704" cy="780510"/>
           </a:xfrm>
@@ -6279,7 +6281,7 @@
             <a:lstStyle/>
             <a:p>
               <a:pPr algn="ctr"/>
-              <a:endParaRPr lang="en-US" sz="3600" dirty="0">
+              <a:endParaRPr lang="en-US" sz="2699" dirty="0">
                 <a:solidFill>
                   <a:schemeClr val="bg1"/>
                 </a:solidFill>
@@ -6302,8 +6304,8 @@
           </p:nvSpPr>
           <p:spPr>
             <a:xfrm>
-              <a:off x="974969" y="4175246"/>
-              <a:ext cx="3476490" cy="541027"/>
+              <a:off x="974969" y="4168423"/>
+              <a:ext cx="3476490" cy="554673"/>
             </a:xfrm>
             <a:prstGeom prst="rect">
               <a:avLst/>
@@ -6321,7 +6323,7 @@
             <a:p>
               <a:pPr algn="ctr"/>
               <a:r>
-                <a:rPr lang="en-US" sz="3300" dirty="0">
+                <a:rPr lang="en-US" sz="2474" dirty="0">
                   <a:solidFill>
                     <a:schemeClr val="bg1"/>
                   </a:solidFill>
@@ -6347,8 +6349,8 @@
         </p:nvSpPr>
         <p:spPr>
           <a:xfrm>
-            <a:off x="436379" y="2982623"/>
-            <a:ext cx="4854633" cy="888024"/>
+            <a:off x="376208" y="2289801"/>
+            <a:ext cx="3639197" cy="665693"/>
           </a:xfrm>
           <a:custGeom>
             <a:avLst/>
@@ -6584,7 +6586,7 @@
           <a:lstStyle/>
           <a:p>
             <a:pPr algn="ctr"/>
-            <a:endParaRPr lang="en-US" sz="3600" dirty="0">
+            <a:endParaRPr lang="en-US" sz="2699" dirty="0">
               <a:solidFill>
                 <a:schemeClr val="tx1"/>
               </a:solidFill>
@@ -6607,8 +6609,8 @@
         </p:nvGrpSpPr>
         <p:grpSpPr>
           <a:xfrm>
-            <a:off x="430029" y="2988884"/>
-            <a:ext cx="4885652" cy="888024"/>
+            <a:off x="371446" y="2294494"/>
+            <a:ext cx="3662451" cy="665693"/>
             <a:chOff x="952755" y="4111316"/>
             <a:chExt cx="3498704" cy="780510"/>
           </a:xfrm>
@@ -6862,7 +6864,7 @@
             <a:lstStyle/>
             <a:p>
               <a:pPr algn="ctr"/>
-              <a:endParaRPr lang="en-US" sz="3600" dirty="0">
+              <a:endParaRPr lang="en-US" sz="2699" dirty="0">
                 <a:solidFill>
                   <a:schemeClr val="bg1"/>
                 </a:solidFill>
@@ -6885,8 +6887,8 @@
           </p:nvSpPr>
           <p:spPr>
             <a:xfrm>
-              <a:off x="974969" y="4175246"/>
-              <a:ext cx="3476490" cy="541027"/>
+              <a:off x="974969" y="4168423"/>
+              <a:ext cx="3476490" cy="554673"/>
             </a:xfrm>
             <a:prstGeom prst="rect">
               <a:avLst/>
@@ -6904,7 +6906,7 @@
             <a:p>
               <a:pPr algn="ctr"/>
               <a:r>
-                <a:rPr lang="en-US" sz="3300" dirty="0">
+                <a:rPr lang="en-US" sz="2474" dirty="0">
                   <a:solidFill>
                     <a:schemeClr val="bg1"/>
                   </a:solidFill>
@@ -6930,8 +6932,8 @@
         </p:nvSpPr>
         <p:spPr>
           <a:xfrm>
-            <a:off x="461049" y="7063363"/>
-            <a:ext cx="4854633" cy="888024"/>
+            <a:off x="394701" y="5348863"/>
+            <a:ext cx="3639197" cy="665693"/>
           </a:xfrm>
           <a:custGeom>
             <a:avLst/>
@@ -7167,7 +7169,7 @@
           <a:lstStyle/>
           <a:p>
             <a:pPr algn="ctr"/>
-            <a:endParaRPr lang="en-US" sz="3600" dirty="0">
+            <a:endParaRPr lang="en-US" sz="2699" dirty="0">
               <a:solidFill>
                 <a:schemeClr val="tx1"/>
               </a:solidFill>
@@ -7190,8 +7192,8 @@
         </p:nvGrpSpPr>
         <p:grpSpPr>
           <a:xfrm>
-            <a:off x="430029" y="7063363"/>
-            <a:ext cx="4885652" cy="888024"/>
+            <a:off x="371446" y="5348863"/>
+            <a:ext cx="3662451" cy="665693"/>
             <a:chOff x="952755" y="4111316"/>
             <a:chExt cx="3498704" cy="780510"/>
           </a:xfrm>
@@ -7445,7 +7447,7 @@
             <a:lstStyle/>
             <a:p>
               <a:pPr algn="ctr"/>
-              <a:endParaRPr lang="en-US" sz="3600" dirty="0">
+              <a:endParaRPr lang="en-US" sz="2699" dirty="0">
                 <a:solidFill>
                   <a:schemeClr val="bg1"/>
                 </a:solidFill>
@@ -7468,8 +7470,8 @@
           </p:nvSpPr>
           <p:spPr>
             <a:xfrm>
-              <a:off x="974969" y="4175246"/>
-              <a:ext cx="3476490" cy="541027"/>
+              <a:off x="974969" y="4168423"/>
+              <a:ext cx="3476490" cy="554673"/>
             </a:xfrm>
             <a:prstGeom prst="rect">
               <a:avLst/>
@@ -7487,7 +7489,7 @@
             <a:p>
               <a:pPr algn="ctr"/>
               <a:r>
-                <a:rPr lang="en-US" sz="3300" dirty="0">
+                <a:rPr lang="en-US" sz="2474" dirty="0">
                   <a:solidFill>
                     <a:schemeClr val="bg1"/>
                   </a:solidFill>
@@ -7513,8 +7515,8 @@
         </p:nvSpPr>
         <p:spPr>
           <a:xfrm>
-            <a:off x="461049" y="1314855"/>
-            <a:ext cx="8108730" cy="1107996"/>
+            <a:off x="394700" y="1039586"/>
+            <a:ext cx="6078579" cy="853632"/>
           </a:xfrm>
           <a:prstGeom prst="rect">
             <a:avLst/>
@@ -7528,7 +7530,7 @@
           <a:lstStyle/>
           <a:p>
             <a:r>
-              <a:rPr lang="en-US" sz="6600" dirty="0">
+              <a:rPr lang="en-US" sz="4947" dirty="0">
                 <a:solidFill>
                   <a:schemeClr val="bg1"/>
                 </a:solidFill>
@@ -7542,7 +7544,7 @@
     </p:spTree>
     <p:extLst>
       <p:ext uri="{BB962C8B-B14F-4D97-AF65-F5344CB8AC3E}">
-        <p14:creationId xmlns:p14="http://schemas.microsoft.com/office/powerpoint/2010/main" val="809081352"/>
+        <p14:creationId xmlns:p14="http://schemas.microsoft.com/office/powerpoint/2010/main" val="1732742842"/>
       </p:ext>
     </p:extLst>
   </p:cSld>
@@ -7553,6 +7555,2706 @@
 </file>
 
 <file path=ppt/slides/slide5.xml><?xml version="1.0" encoding="utf-8"?>
+<p:sld xmlns:a="http://schemas.openxmlformats.org/drawingml/2006/main" xmlns:r="http://schemas.openxmlformats.org/officeDocument/2006/relationships" xmlns:p="http://schemas.openxmlformats.org/presentationml/2006/main">
+  <p:cSld>
+    <p:bg>
+      <p:bgPr>
+        <a:solidFill>
+          <a:schemeClr val="bg1">
+            <a:alpha val="0"/>
+          </a:schemeClr>
+        </a:solidFill>
+        <a:effectLst/>
+      </p:bgPr>
+    </p:bg>
+    <p:spTree>
+      <p:nvGrpSpPr>
+        <p:cNvPr id="1" name=""/>
+        <p:cNvGrpSpPr/>
+        <p:nvPr/>
+      </p:nvGrpSpPr>
+      <p:grpSpPr>
+        <a:xfrm>
+          <a:off x="0" y="0"/>
+          <a:ext cx="0" cy="0"/>
+          <a:chOff x="0" y="0"/>
+          <a:chExt cx="0" cy="0"/>
+        </a:xfrm>
+      </p:grpSpPr>
+      <p:sp>
+        <p:nvSpPr>
+          <p:cNvPr id="2" name="Rectangle 1">
+            <a:extLst>
+              <a:ext uri="{FF2B5EF4-FFF2-40B4-BE49-F238E27FC236}">
+                <a16:creationId xmlns:a16="http://schemas.microsoft.com/office/drawing/2014/main" id="{23BEF586-CE3F-2419-EA0C-962862BAC118}"/>
+              </a:ext>
+            </a:extLst>
+          </p:cNvPr>
+          <p:cNvSpPr/>
+          <p:nvPr/>
+        </p:nvSpPr>
+        <p:spPr>
+          <a:xfrm>
+            <a:off x="-89763" y="-63609"/>
+            <a:ext cx="12452620" cy="7270829"/>
+          </a:xfrm>
+          <a:prstGeom prst="rect">
+            <a:avLst/>
+          </a:prstGeom>
+          <a:solidFill>
+            <a:schemeClr val="tx1"/>
+          </a:solidFill>
+          <a:ln>
+            <a:solidFill>
+              <a:schemeClr val="tx1"/>
+            </a:solidFill>
+          </a:ln>
+        </p:spPr>
+        <p:style>
+          <a:lnRef idx="2">
+            <a:schemeClr val="accent1">
+              <a:shade val="50000"/>
+            </a:schemeClr>
+          </a:lnRef>
+          <a:fillRef idx="1">
+            <a:schemeClr val="accent1"/>
+          </a:fillRef>
+          <a:effectRef idx="0">
+            <a:schemeClr val="accent1"/>
+          </a:effectRef>
+          <a:fontRef idx="minor">
+            <a:schemeClr val="lt1"/>
+          </a:fontRef>
+        </p:style>
+        <p:txBody>
+          <a:bodyPr rtlCol="0" anchor="ctr"/>
+          <a:lstStyle/>
+          <a:p>
+            <a:pPr algn="ctr"/>
+            <a:endParaRPr lang="en-US" sz="1581"/>
+          </a:p>
+        </p:txBody>
+      </p:sp>
+      <p:sp>
+        <p:nvSpPr>
+          <p:cNvPr id="28" name="Freeform: Shape 27">
+            <a:extLst>
+              <a:ext uri="{FF2B5EF4-FFF2-40B4-BE49-F238E27FC236}">
+                <a16:creationId xmlns:a16="http://schemas.microsoft.com/office/drawing/2014/main" id="{CA6BC35D-B640-EBAB-40FE-498499B8D914}"/>
+              </a:ext>
+            </a:extLst>
+          </p:cNvPr>
+          <p:cNvSpPr/>
+          <p:nvPr/>
+        </p:nvSpPr>
+        <p:spPr>
+          <a:xfrm>
+            <a:off x="381920" y="3283308"/>
+            <a:ext cx="3639197" cy="665693"/>
+          </a:xfrm>
+          <a:custGeom>
+            <a:avLst/>
+            <a:gdLst>
+              <a:gd name="connsiteX0" fmla="*/ 288453 w 3476491"/>
+              <a:gd name="connsiteY0" fmla="*/ 0 h 780510"/>
+              <a:gd name="connsiteX1" fmla="*/ 2995948 w 3476491"/>
+              <a:gd name="connsiteY1" fmla="*/ 0 h 780510"/>
+              <a:gd name="connsiteX2" fmla="*/ 2856951 w 3476491"/>
+              <a:gd name="connsiteY2" fmla="*/ 66152 h 780510"/>
+              <a:gd name="connsiteX3" fmla="*/ 3085439 w 3476491"/>
+              <a:gd name="connsiteY3" fmla="*/ 103945 h 780510"/>
+              <a:gd name="connsiteX4" fmla="*/ 3028410 w 3476491"/>
+              <a:gd name="connsiteY4" fmla="*/ 217851 h 780510"/>
+              <a:gd name="connsiteX5" fmla="*/ 3219656 w 3476491"/>
+              <a:gd name="connsiteY5" fmla="*/ 172066 h 780510"/>
+              <a:gd name="connsiteX6" fmla="*/ 3197332 w 3476491"/>
+              <a:gd name="connsiteY6" fmla="*/ 378196 h 780510"/>
+              <a:gd name="connsiteX7" fmla="*/ 3336575 w 3476491"/>
+              <a:gd name="connsiteY7" fmla="*/ 262177 h 780510"/>
+              <a:gd name="connsiteX8" fmla="*/ 3437178 w 3476491"/>
+              <a:gd name="connsiteY8" fmla="*/ 410027 h 780510"/>
+              <a:gd name="connsiteX9" fmla="*/ 3476491 w 3476491"/>
+              <a:gd name="connsiteY9" fmla="*/ 313558 h 780510"/>
+              <a:gd name="connsiteX10" fmla="*/ 3476491 w 3476491"/>
+              <a:gd name="connsiteY10" fmla="*/ 492057 h 780510"/>
+              <a:gd name="connsiteX11" fmla="*/ 3188038 w 3476491"/>
+              <a:gd name="connsiteY11" fmla="*/ 780510 h 780510"/>
+              <a:gd name="connsiteX12" fmla="*/ 489448 w 3476491"/>
+              <a:gd name="connsiteY12" fmla="*/ 780510 h 780510"/>
+              <a:gd name="connsiteX13" fmla="*/ 393068 w 3476491"/>
+              <a:gd name="connsiteY13" fmla="*/ 750434 h 780510"/>
+              <a:gd name="connsiteX14" fmla="*/ 465283 w 3476491"/>
+              <a:gd name="connsiteY14" fmla="*/ 645496 h 780510"/>
+              <a:gd name="connsiteX15" fmla="*/ 269546 w 3476491"/>
+              <a:gd name="connsiteY15" fmla="*/ 664428 h 780510"/>
+              <a:gd name="connsiteX16" fmla="*/ 320126 w 3476491"/>
+              <a:gd name="connsiteY16" fmla="*/ 463356 h 780510"/>
+              <a:gd name="connsiteX17" fmla="*/ 166194 w 3476491"/>
+              <a:gd name="connsiteY17" fmla="*/ 559031 h 780510"/>
+              <a:gd name="connsiteX18" fmla="*/ 86976 w 3476491"/>
+              <a:gd name="connsiteY18" fmla="*/ 398703 h 780510"/>
+              <a:gd name="connsiteX19" fmla="*/ 8480 w 3476491"/>
+              <a:gd name="connsiteY19" fmla="*/ 534057 h 780510"/>
+              <a:gd name="connsiteX20" fmla="*/ 0 w 3476491"/>
+              <a:gd name="connsiteY20" fmla="*/ 492057 h 780510"/>
+              <a:gd name="connsiteX21" fmla="*/ 0 w 3476491"/>
+              <a:gd name="connsiteY21" fmla="*/ 288453 h 780510"/>
+              <a:gd name="connsiteX22" fmla="*/ 288453 w 3476491"/>
+              <a:gd name="connsiteY22" fmla="*/ 0 h 780510"/>
+            </a:gdLst>
+            <a:ahLst/>
+            <a:cxnLst>
+              <a:cxn ang="0">
+                <a:pos x="connsiteX0" y="connsiteY0"/>
+              </a:cxn>
+              <a:cxn ang="0">
+                <a:pos x="connsiteX1" y="connsiteY1"/>
+              </a:cxn>
+              <a:cxn ang="0">
+                <a:pos x="connsiteX2" y="connsiteY2"/>
+              </a:cxn>
+              <a:cxn ang="0">
+                <a:pos x="connsiteX3" y="connsiteY3"/>
+              </a:cxn>
+              <a:cxn ang="0">
+                <a:pos x="connsiteX4" y="connsiteY4"/>
+              </a:cxn>
+              <a:cxn ang="0">
+                <a:pos x="connsiteX5" y="connsiteY5"/>
+              </a:cxn>
+              <a:cxn ang="0">
+                <a:pos x="connsiteX6" y="connsiteY6"/>
+              </a:cxn>
+              <a:cxn ang="0">
+                <a:pos x="connsiteX7" y="connsiteY7"/>
+              </a:cxn>
+              <a:cxn ang="0">
+                <a:pos x="connsiteX8" y="connsiteY8"/>
+              </a:cxn>
+              <a:cxn ang="0">
+                <a:pos x="connsiteX9" y="connsiteY9"/>
+              </a:cxn>
+              <a:cxn ang="0">
+                <a:pos x="connsiteX10" y="connsiteY10"/>
+              </a:cxn>
+              <a:cxn ang="0">
+                <a:pos x="connsiteX11" y="connsiteY11"/>
+              </a:cxn>
+              <a:cxn ang="0">
+                <a:pos x="connsiteX12" y="connsiteY12"/>
+              </a:cxn>
+              <a:cxn ang="0">
+                <a:pos x="connsiteX13" y="connsiteY13"/>
+              </a:cxn>
+              <a:cxn ang="0">
+                <a:pos x="connsiteX14" y="connsiteY14"/>
+              </a:cxn>
+              <a:cxn ang="0">
+                <a:pos x="connsiteX15" y="connsiteY15"/>
+              </a:cxn>
+              <a:cxn ang="0">
+                <a:pos x="connsiteX16" y="connsiteY16"/>
+              </a:cxn>
+              <a:cxn ang="0">
+                <a:pos x="connsiteX17" y="connsiteY17"/>
+              </a:cxn>
+              <a:cxn ang="0">
+                <a:pos x="connsiteX18" y="connsiteY18"/>
+              </a:cxn>
+              <a:cxn ang="0">
+                <a:pos x="connsiteX19" y="connsiteY19"/>
+              </a:cxn>
+              <a:cxn ang="0">
+                <a:pos x="connsiteX20" y="connsiteY20"/>
+              </a:cxn>
+              <a:cxn ang="0">
+                <a:pos x="connsiteX21" y="connsiteY21"/>
+              </a:cxn>
+              <a:cxn ang="0">
+                <a:pos x="connsiteX22" y="connsiteY22"/>
+              </a:cxn>
+            </a:cxnLst>
+            <a:rect l="l" t="t" r="r" b="b"/>
+            <a:pathLst>
+              <a:path w="3476491" h="780510">
+                <a:moveTo>
+                  <a:pt x="288453" y="0"/>
+                </a:moveTo>
+                <a:lnTo>
+                  <a:pt x="2995948" y="0"/>
+                </a:lnTo>
+                <a:lnTo>
+                  <a:pt x="2856951" y="66152"/>
+                </a:lnTo>
+                <a:lnTo>
+                  <a:pt x="3085439" y="103945"/>
+                </a:lnTo>
+                <a:lnTo>
+                  <a:pt x="3028410" y="217851"/>
+                </a:lnTo>
+                <a:lnTo>
+                  <a:pt x="3219656" y="172066"/>
+                </a:lnTo>
+                <a:lnTo>
+                  <a:pt x="3197332" y="378196"/>
+                </a:lnTo>
+                <a:lnTo>
+                  <a:pt x="3336575" y="262177"/>
+                </a:lnTo>
+                <a:lnTo>
+                  <a:pt x="3437178" y="410027"/>
+                </a:lnTo>
+                <a:lnTo>
+                  <a:pt x="3476491" y="313558"/>
+                </a:lnTo>
+                <a:lnTo>
+                  <a:pt x="3476491" y="492057"/>
+                </a:lnTo>
+                <a:cubicBezTo>
+                  <a:pt x="3476491" y="651365"/>
+                  <a:pt x="3347346" y="780510"/>
+                  <a:pt x="3188038" y="780510"/>
+                </a:cubicBezTo>
+                <a:lnTo>
+                  <a:pt x="489448" y="780510"/>
+                </a:lnTo>
+                <a:lnTo>
+                  <a:pt x="393068" y="750434"/>
+                </a:lnTo>
+                <a:lnTo>
+                  <a:pt x="465283" y="645496"/>
+                </a:lnTo>
+                <a:lnTo>
+                  <a:pt x="269546" y="664428"/>
+                </a:lnTo>
+                <a:lnTo>
+                  <a:pt x="320126" y="463356"/>
+                </a:lnTo>
+                <a:lnTo>
+                  <a:pt x="166194" y="559031"/>
+                </a:lnTo>
+                <a:lnTo>
+                  <a:pt x="86976" y="398703"/>
+                </a:lnTo>
+                <a:lnTo>
+                  <a:pt x="8480" y="534057"/>
+                </a:lnTo>
+                <a:lnTo>
+                  <a:pt x="0" y="492057"/>
+                </a:lnTo>
+                <a:lnTo>
+                  <a:pt x="0" y="288453"/>
+                </a:lnTo>
+                <a:cubicBezTo>
+                  <a:pt x="0" y="129145"/>
+                  <a:pt x="129145" y="0"/>
+                  <a:pt x="288453" y="0"/>
+                </a:cubicBezTo>
+                <a:close/>
+              </a:path>
+            </a:pathLst>
+          </a:custGeom>
+          <a:solidFill>
+            <a:schemeClr val="tx1">
+              <a:alpha val="51000"/>
+            </a:schemeClr>
+          </a:solidFill>
+          <a:ln w="38100">
+            <a:noFill/>
+          </a:ln>
+        </p:spPr>
+        <p:style>
+          <a:lnRef idx="2">
+            <a:schemeClr val="accent1">
+              <a:shade val="50000"/>
+            </a:schemeClr>
+          </a:lnRef>
+          <a:fillRef idx="1">
+            <a:schemeClr val="accent1"/>
+          </a:fillRef>
+          <a:effectRef idx="0">
+            <a:schemeClr val="accent1"/>
+          </a:effectRef>
+          <a:fontRef idx="minor">
+            <a:schemeClr val="lt1"/>
+          </a:fontRef>
+        </p:style>
+        <p:txBody>
+          <a:bodyPr wrap="square" rtlCol="0" anchor="ctr">
+            <a:noAutofit/>
+          </a:bodyPr>
+          <a:lstStyle/>
+          <a:p>
+            <a:pPr algn="ctr"/>
+            <a:endParaRPr lang="en-US" sz="2699" dirty="0">
+              <a:solidFill>
+                <a:schemeClr val="tx1"/>
+              </a:solidFill>
+              <a:latin typeface="Quantum" pitchFamily="50" charset="0"/>
+            </a:endParaRPr>
+          </a:p>
+        </p:txBody>
+      </p:sp>
+      <p:grpSp>
+        <p:nvGrpSpPr>
+          <p:cNvPr id="3" name="Group 2">
+            <a:extLst>
+              <a:ext uri="{FF2B5EF4-FFF2-40B4-BE49-F238E27FC236}">
+                <a16:creationId xmlns:a16="http://schemas.microsoft.com/office/drawing/2014/main" id="{27EA5EBB-6428-0888-EEF2-1F1DBF9E7F5F}"/>
+              </a:ext>
+            </a:extLst>
+          </p:cNvPr>
+          <p:cNvGrpSpPr/>
+          <p:nvPr/>
+        </p:nvGrpSpPr>
+        <p:grpSpPr>
+          <a:xfrm>
+            <a:off x="371446" y="3270300"/>
+            <a:ext cx="3662451" cy="665693"/>
+            <a:chOff x="952755" y="4111316"/>
+            <a:chExt cx="3498704" cy="780510"/>
+          </a:xfrm>
+        </p:grpSpPr>
+        <p:sp>
+          <p:nvSpPr>
+            <p:cNvPr id="4" name="Freeform: Shape 3">
+              <a:extLst>
+                <a:ext uri="{FF2B5EF4-FFF2-40B4-BE49-F238E27FC236}">
+                  <a16:creationId xmlns:a16="http://schemas.microsoft.com/office/drawing/2014/main" id="{40B58E7E-EC4B-5A69-4B92-981132881109}"/>
+                </a:ext>
+              </a:extLst>
+            </p:cNvPr>
+            <p:cNvSpPr/>
+            <p:nvPr/>
+          </p:nvSpPr>
+          <p:spPr>
+            <a:xfrm>
+              <a:off x="952755" y="4111316"/>
+              <a:ext cx="3476491" cy="780510"/>
+            </a:xfrm>
+            <a:custGeom>
+              <a:avLst/>
+              <a:gdLst>
+                <a:gd name="connsiteX0" fmla="*/ 288453 w 3476491"/>
+                <a:gd name="connsiteY0" fmla="*/ 0 h 780510"/>
+                <a:gd name="connsiteX1" fmla="*/ 2995948 w 3476491"/>
+                <a:gd name="connsiteY1" fmla="*/ 0 h 780510"/>
+                <a:gd name="connsiteX2" fmla="*/ 2856951 w 3476491"/>
+                <a:gd name="connsiteY2" fmla="*/ 66152 h 780510"/>
+                <a:gd name="connsiteX3" fmla="*/ 3085439 w 3476491"/>
+                <a:gd name="connsiteY3" fmla="*/ 103945 h 780510"/>
+                <a:gd name="connsiteX4" fmla="*/ 3028410 w 3476491"/>
+                <a:gd name="connsiteY4" fmla="*/ 217851 h 780510"/>
+                <a:gd name="connsiteX5" fmla="*/ 3219656 w 3476491"/>
+                <a:gd name="connsiteY5" fmla="*/ 172066 h 780510"/>
+                <a:gd name="connsiteX6" fmla="*/ 3197332 w 3476491"/>
+                <a:gd name="connsiteY6" fmla="*/ 378196 h 780510"/>
+                <a:gd name="connsiteX7" fmla="*/ 3336575 w 3476491"/>
+                <a:gd name="connsiteY7" fmla="*/ 262177 h 780510"/>
+                <a:gd name="connsiteX8" fmla="*/ 3437178 w 3476491"/>
+                <a:gd name="connsiteY8" fmla="*/ 410027 h 780510"/>
+                <a:gd name="connsiteX9" fmla="*/ 3476491 w 3476491"/>
+                <a:gd name="connsiteY9" fmla="*/ 313558 h 780510"/>
+                <a:gd name="connsiteX10" fmla="*/ 3476491 w 3476491"/>
+                <a:gd name="connsiteY10" fmla="*/ 492057 h 780510"/>
+                <a:gd name="connsiteX11" fmla="*/ 3188038 w 3476491"/>
+                <a:gd name="connsiteY11" fmla="*/ 780510 h 780510"/>
+                <a:gd name="connsiteX12" fmla="*/ 489448 w 3476491"/>
+                <a:gd name="connsiteY12" fmla="*/ 780510 h 780510"/>
+                <a:gd name="connsiteX13" fmla="*/ 393068 w 3476491"/>
+                <a:gd name="connsiteY13" fmla="*/ 750434 h 780510"/>
+                <a:gd name="connsiteX14" fmla="*/ 465283 w 3476491"/>
+                <a:gd name="connsiteY14" fmla="*/ 645496 h 780510"/>
+                <a:gd name="connsiteX15" fmla="*/ 269546 w 3476491"/>
+                <a:gd name="connsiteY15" fmla="*/ 664428 h 780510"/>
+                <a:gd name="connsiteX16" fmla="*/ 320126 w 3476491"/>
+                <a:gd name="connsiteY16" fmla="*/ 463356 h 780510"/>
+                <a:gd name="connsiteX17" fmla="*/ 166194 w 3476491"/>
+                <a:gd name="connsiteY17" fmla="*/ 559031 h 780510"/>
+                <a:gd name="connsiteX18" fmla="*/ 86976 w 3476491"/>
+                <a:gd name="connsiteY18" fmla="*/ 398703 h 780510"/>
+                <a:gd name="connsiteX19" fmla="*/ 8480 w 3476491"/>
+                <a:gd name="connsiteY19" fmla="*/ 534057 h 780510"/>
+                <a:gd name="connsiteX20" fmla="*/ 0 w 3476491"/>
+                <a:gd name="connsiteY20" fmla="*/ 492057 h 780510"/>
+                <a:gd name="connsiteX21" fmla="*/ 0 w 3476491"/>
+                <a:gd name="connsiteY21" fmla="*/ 288453 h 780510"/>
+                <a:gd name="connsiteX22" fmla="*/ 288453 w 3476491"/>
+                <a:gd name="connsiteY22" fmla="*/ 0 h 780510"/>
+              </a:gdLst>
+              <a:ahLst/>
+              <a:cxnLst>
+                <a:cxn ang="0">
+                  <a:pos x="connsiteX0" y="connsiteY0"/>
+                </a:cxn>
+                <a:cxn ang="0">
+                  <a:pos x="connsiteX1" y="connsiteY1"/>
+                </a:cxn>
+                <a:cxn ang="0">
+                  <a:pos x="connsiteX2" y="connsiteY2"/>
+                </a:cxn>
+                <a:cxn ang="0">
+                  <a:pos x="connsiteX3" y="connsiteY3"/>
+                </a:cxn>
+                <a:cxn ang="0">
+                  <a:pos x="connsiteX4" y="connsiteY4"/>
+                </a:cxn>
+                <a:cxn ang="0">
+                  <a:pos x="connsiteX5" y="connsiteY5"/>
+                </a:cxn>
+                <a:cxn ang="0">
+                  <a:pos x="connsiteX6" y="connsiteY6"/>
+                </a:cxn>
+                <a:cxn ang="0">
+                  <a:pos x="connsiteX7" y="connsiteY7"/>
+                </a:cxn>
+                <a:cxn ang="0">
+                  <a:pos x="connsiteX8" y="connsiteY8"/>
+                </a:cxn>
+                <a:cxn ang="0">
+                  <a:pos x="connsiteX9" y="connsiteY9"/>
+                </a:cxn>
+                <a:cxn ang="0">
+                  <a:pos x="connsiteX10" y="connsiteY10"/>
+                </a:cxn>
+                <a:cxn ang="0">
+                  <a:pos x="connsiteX11" y="connsiteY11"/>
+                </a:cxn>
+                <a:cxn ang="0">
+                  <a:pos x="connsiteX12" y="connsiteY12"/>
+                </a:cxn>
+                <a:cxn ang="0">
+                  <a:pos x="connsiteX13" y="connsiteY13"/>
+                </a:cxn>
+                <a:cxn ang="0">
+                  <a:pos x="connsiteX14" y="connsiteY14"/>
+                </a:cxn>
+                <a:cxn ang="0">
+                  <a:pos x="connsiteX15" y="connsiteY15"/>
+                </a:cxn>
+                <a:cxn ang="0">
+                  <a:pos x="connsiteX16" y="connsiteY16"/>
+                </a:cxn>
+                <a:cxn ang="0">
+                  <a:pos x="connsiteX17" y="connsiteY17"/>
+                </a:cxn>
+                <a:cxn ang="0">
+                  <a:pos x="connsiteX18" y="connsiteY18"/>
+                </a:cxn>
+                <a:cxn ang="0">
+                  <a:pos x="connsiteX19" y="connsiteY19"/>
+                </a:cxn>
+                <a:cxn ang="0">
+                  <a:pos x="connsiteX20" y="connsiteY20"/>
+                </a:cxn>
+                <a:cxn ang="0">
+                  <a:pos x="connsiteX21" y="connsiteY21"/>
+                </a:cxn>
+                <a:cxn ang="0">
+                  <a:pos x="connsiteX22" y="connsiteY22"/>
+                </a:cxn>
+              </a:cxnLst>
+              <a:rect l="l" t="t" r="r" b="b"/>
+              <a:pathLst>
+                <a:path w="3476491" h="780510">
+                  <a:moveTo>
+                    <a:pt x="288453" y="0"/>
+                  </a:moveTo>
+                  <a:lnTo>
+                    <a:pt x="2995948" y="0"/>
+                  </a:lnTo>
+                  <a:lnTo>
+                    <a:pt x="2856951" y="66152"/>
+                  </a:lnTo>
+                  <a:lnTo>
+                    <a:pt x="3085439" y="103945"/>
+                  </a:lnTo>
+                  <a:lnTo>
+                    <a:pt x="3028410" y="217851"/>
+                  </a:lnTo>
+                  <a:lnTo>
+                    <a:pt x="3219656" y="172066"/>
+                  </a:lnTo>
+                  <a:lnTo>
+                    <a:pt x="3197332" y="378196"/>
+                  </a:lnTo>
+                  <a:lnTo>
+                    <a:pt x="3336575" y="262177"/>
+                  </a:lnTo>
+                  <a:lnTo>
+                    <a:pt x="3437178" y="410027"/>
+                  </a:lnTo>
+                  <a:lnTo>
+                    <a:pt x="3476491" y="313558"/>
+                  </a:lnTo>
+                  <a:lnTo>
+                    <a:pt x="3476491" y="492057"/>
+                  </a:lnTo>
+                  <a:cubicBezTo>
+                    <a:pt x="3476491" y="651365"/>
+                    <a:pt x="3347346" y="780510"/>
+                    <a:pt x="3188038" y="780510"/>
+                  </a:cubicBezTo>
+                  <a:lnTo>
+                    <a:pt x="489448" y="780510"/>
+                  </a:lnTo>
+                  <a:lnTo>
+                    <a:pt x="393068" y="750434"/>
+                  </a:lnTo>
+                  <a:lnTo>
+                    <a:pt x="465283" y="645496"/>
+                  </a:lnTo>
+                  <a:lnTo>
+                    <a:pt x="269546" y="664428"/>
+                  </a:lnTo>
+                  <a:lnTo>
+                    <a:pt x="320126" y="463356"/>
+                  </a:lnTo>
+                  <a:lnTo>
+                    <a:pt x="166194" y="559031"/>
+                  </a:lnTo>
+                  <a:lnTo>
+                    <a:pt x="86976" y="398703"/>
+                  </a:lnTo>
+                  <a:lnTo>
+                    <a:pt x="8480" y="534057"/>
+                  </a:lnTo>
+                  <a:lnTo>
+                    <a:pt x="0" y="492057"/>
+                  </a:lnTo>
+                  <a:lnTo>
+                    <a:pt x="0" y="288453"/>
+                  </a:lnTo>
+                  <a:cubicBezTo>
+                    <a:pt x="0" y="129145"/>
+                    <a:pt x="129145" y="0"/>
+                    <a:pt x="288453" y="0"/>
+                  </a:cubicBezTo>
+                  <a:close/>
+                </a:path>
+              </a:pathLst>
+            </a:custGeom>
+            <a:noFill/>
+            <a:ln w="38100">
+              <a:solidFill>
+                <a:schemeClr val="bg1"/>
+              </a:solidFill>
+            </a:ln>
+          </p:spPr>
+          <p:style>
+            <a:lnRef idx="2">
+              <a:schemeClr val="accent1">
+                <a:shade val="50000"/>
+              </a:schemeClr>
+            </a:lnRef>
+            <a:fillRef idx="1">
+              <a:schemeClr val="accent1"/>
+            </a:fillRef>
+            <a:effectRef idx="0">
+              <a:schemeClr val="accent1"/>
+            </a:effectRef>
+            <a:fontRef idx="minor">
+              <a:schemeClr val="lt1"/>
+            </a:fontRef>
+          </p:style>
+          <p:txBody>
+            <a:bodyPr wrap="square" rtlCol="0" anchor="ctr">
+              <a:noAutofit/>
+            </a:bodyPr>
+            <a:lstStyle/>
+            <a:p>
+              <a:pPr algn="ctr"/>
+              <a:endParaRPr lang="en-US" sz="2699" dirty="0">
+                <a:solidFill>
+                  <a:schemeClr val="bg1"/>
+                </a:solidFill>
+                <a:latin typeface="Quantum" pitchFamily="50" charset="0"/>
+              </a:endParaRPr>
+            </a:p>
+          </p:txBody>
+        </p:sp>
+        <p:sp>
+          <p:nvSpPr>
+            <p:cNvPr id="5" name="TextBox 4">
+              <a:extLst>
+                <a:ext uri="{FF2B5EF4-FFF2-40B4-BE49-F238E27FC236}">
+                  <a16:creationId xmlns:a16="http://schemas.microsoft.com/office/drawing/2014/main" id="{CEA9CFCB-7A26-9EF8-52BA-CF278700F5FD}"/>
+                </a:ext>
+              </a:extLst>
+            </p:cNvPr>
+            <p:cNvSpPr txBox="1"/>
+            <p:nvPr/>
+          </p:nvSpPr>
+          <p:spPr>
+            <a:xfrm>
+              <a:off x="974969" y="4168423"/>
+              <a:ext cx="3476490" cy="554673"/>
+            </a:xfrm>
+            <a:prstGeom prst="rect">
+              <a:avLst/>
+            </a:prstGeom>
+            <a:noFill/>
+            <a:ln>
+              <a:noFill/>
+            </a:ln>
+          </p:spPr>
+          <p:txBody>
+            <a:bodyPr wrap="square" rtlCol="0" anchor="ctr">
+              <a:spAutoFit/>
+            </a:bodyPr>
+            <a:lstStyle/>
+            <a:p>
+              <a:pPr algn="ctr"/>
+              <a:r>
+                <a:rPr lang="en-US" sz="2474" dirty="0">
+                  <a:solidFill>
+                    <a:schemeClr val="bg1"/>
+                  </a:solidFill>
+                  <a:latin typeface="Quantum" pitchFamily="50" charset="0"/>
+                </a:rPr>
+                <a:t>INSTRUCTIONS </a:t>
+              </a:r>
+            </a:p>
+          </p:txBody>
+        </p:sp>
+      </p:grpSp>
+      <p:sp>
+        <p:nvSpPr>
+          <p:cNvPr id="29" name="Freeform: Shape 28">
+            <a:extLst>
+              <a:ext uri="{FF2B5EF4-FFF2-40B4-BE49-F238E27FC236}">
+                <a16:creationId xmlns:a16="http://schemas.microsoft.com/office/drawing/2014/main" id="{59365FC8-5C9D-157F-9A66-35D6E1B0A34B}"/>
+              </a:ext>
+            </a:extLst>
+          </p:cNvPr>
+          <p:cNvSpPr/>
+          <p:nvPr/>
+        </p:nvSpPr>
+        <p:spPr>
+          <a:xfrm>
+            <a:off x="371447" y="4291272"/>
+            <a:ext cx="3639197" cy="665693"/>
+          </a:xfrm>
+          <a:custGeom>
+            <a:avLst/>
+            <a:gdLst>
+              <a:gd name="connsiteX0" fmla="*/ 288453 w 3476491"/>
+              <a:gd name="connsiteY0" fmla="*/ 0 h 780510"/>
+              <a:gd name="connsiteX1" fmla="*/ 2995948 w 3476491"/>
+              <a:gd name="connsiteY1" fmla="*/ 0 h 780510"/>
+              <a:gd name="connsiteX2" fmla="*/ 2856951 w 3476491"/>
+              <a:gd name="connsiteY2" fmla="*/ 66152 h 780510"/>
+              <a:gd name="connsiteX3" fmla="*/ 3085439 w 3476491"/>
+              <a:gd name="connsiteY3" fmla="*/ 103945 h 780510"/>
+              <a:gd name="connsiteX4" fmla="*/ 3028410 w 3476491"/>
+              <a:gd name="connsiteY4" fmla="*/ 217851 h 780510"/>
+              <a:gd name="connsiteX5" fmla="*/ 3219656 w 3476491"/>
+              <a:gd name="connsiteY5" fmla="*/ 172066 h 780510"/>
+              <a:gd name="connsiteX6" fmla="*/ 3197332 w 3476491"/>
+              <a:gd name="connsiteY6" fmla="*/ 378196 h 780510"/>
+              <a:gd name="connsiteX7" fmla="*/ 3336575 w 3476491"/>
+              <a:gd name="connsiteY7" fmla="*/ 262177 h 780510"/>
+              <a:gd name="connsiteX8" fmla="*/ 3437178 w 3476491"/>
+              <a:gd name="connsiteY8" fmla="*/ 410027 h 780510"/>
+              <a:gd name="connsiteX9" fmla="*/ 3476491 w 3476491"/>
+              <a:gd name="connsiteY9" fmla="*/ 313558 h 780510"/>
+              <a:gd name="connsiteX10" fmla="*/ 3476491 w 3476491"/>
+              <a:gd name="connsiteY10" fmla="*/ 492057 h 780510"/>
+              <a:gd name="connsiteX11" fmla="*/ 3188038 w 3476491"/>
+              <a:gd name="connsiteY11" fmla="*/ 780510 h 780510"/>
+              <a:gd name="connsiteX12" fmla="*/ 489448 w 3476491"/>
+              <a:gd name="connsiteY12" fmla="*/ 780510 h 780510"/>
+              <a:gd name="connsiteX13" fmla="*/ 393068 w 3476491"/>
+              <a:gd name="connsiteY13" fmla="*/ 750434 h 780510"/>
+              <a:gd name="connsiteX14" fmla="*/ 465283 w 3476491"/>
+              <a:gd name="connsiteY14" fmla="*/ 645496 h 780510"/>
+              <a:gd name="connsiteX15" fmla="*/ 269546 w 3476491"/>
+              <a:gd name="connsiteY15" fmla="*/ 664428 h 780510"/>
+              <a:gd name="connsiteX16" fmla="*/ 320126 w 3476491"/>
+              <a:gd name="connsiteY16" fmla="*/ 463356 h 780510"/>
+              <a:gd name="connsiteX17" fmla="*/ 166194 w 3476491"/>
+              <a:gd name="connsiteY17" fmla="*/ 559031 h 780510"/>
+              <a:gd name="connsiteX18" fmla="*/ 86976 w 3476491"/>
+              <a:gd name="connsiteY18" fmla="*/ 398703 h 780510"/>
+              <a:gd name="connsiteX19" fmla="*/ 8480 w 3476491"/>
+              <a:gd name="connsiteY19" fmla="*/ 534057 h 780510"/>
+              <a:gd name="connsiteX20" fmla="*/ 0 w 3476491"/>
+              <a:gd name="connsiteY20" fmla="*/ 492057 h 780510"/>
+              <a:gd name="connsiteX21" fmla="*/ 0 w 3476491"/>
+              <a:gd name="connsiteY21" fmla="*/ 288453 h 780510"/>
+              <a:gd name="connsiteX22" fmla="*/ 288453 w 3476491"/>
+              <a:gd name="connsiteY22" fmla="*/ 0 h 780510"/>
+            </a:gdLst>
+            <a:ahLst/>
+            <a:cxnLst>
+              <a:cxn ang="0">
+                <a:pos x="connsiteX0" y="connsiteY0"/>
+              </a:cxn>
+              <a:cxn ang="0">
+                <a:pos x="connsiteX1" y="connsiteY1"/>
+              </a:cxn>
+              <a:cxn ang="0">
+                <a:pos x="connsiteX2" y="connsiteY2"/>
+              </a:cxn>
+              <a:cxn ang="0">
+                <a:pos x="connsiteX3" y="connsiteY3"/>
+              </a:cxn>
+              <a:cxn ang="0">
+                <a:pos x="connsiteX4" y="connsiteY4"/>
+              </a:cxn>
+              <a:cxn ang="0">
+                <a:pos x="connsiteX5" y="connsiteY5"/>
+              </a:cxn>
+              <a:cxn ang="0">
+                <a:pos x="connsiteX6" y="connsiteY6"/>
+              </a:cxn>
+              <a:cxn ang="0">
+                <a:pos x="connsiteX7" y="connsiteY7"/>
+              </a:cxn>
+              <a:cxn ang="0">
+                <a:pos x="connsiteX8" y="connsiteY8"/>
+              </a:cxn>
+              <a:cxn ang="0">
+                <a:pos x="connsiteX9" y="connsiteY9"/>
+              </a:cxn>
+              <a:cxn ang="0">
+                <a:pos x="connsiteX10" y="connsiteY10"/>
+              </a:cxn>
+              <a:cxn ang="0">
+                <a:pos x="connsiteX11" y="connsiteY11"/>
+              </a:cxn>
+              <a:cxn ang="0">
+                <a:pos x="connsiteX12" y="connsiteY12"/>
+              </a:cxn>
+              <a:cxn ang="0">
+                <a:pos x="connsiteX13" y="connsiteY13"/>
+              </a:cxn>
+              <a:cxn ang="0">
+                <a:pos x="connsiteX14" y="connsiteY14"/>
+              </a:cxn>
+              <a:cxn ang="0">
+                <a:pos x="connsiteX15" y="connsiteY15"/>
+              </a:cxn>
+              <a:cxn ang="0">
+                <a:pos x="connsiteX16" y="connsiteY16"/>
+              </a:cxn>
+              <a:cxn ang="0">
+                <a:pos x="connsiteX17" y="connsiteY17"/>
+              </a:cxn>
+              <a:cxn ang="0">
+                <a:pos x="connsiteX18" y="connsiteY18"/>
+              </a:cxn>
+              <a:cxn ang="0">
+                <a:pos x="connsiteX19" y="connsiteY19"/>
+              </a:cxn>
+              <a:cxn ang="0">
+                <a:pos x="connsiteX20" y="connsiteY20"/>
+              </a:cxn>
+              <a:cxn ang="0">
+                <a:pos x="connsiteX21" y="connsiteY21"/>
+              </a:cxn>
+              <a:cxn ang="0">
+                <a:pos x="connsiteX22" y="connsiteY22"/>
+              </a:cxn>
+            </a:cxnLst>
+            <a:rect l="l" t="t" r="r" b="b"/>
+            <a:pathLst>
+              <a:path w="3476491" h="780510">
+                <a:moveTo>
+                  <a:pt x="288453" y="0"/>
+                </a:moveTo>
+                <a:lnTo>
+                  <a:pt x="2995948" y="0"/>
+                </a:lnTo>
+                <a:lnTo>
+                  <a:pt x="2856951" y="66152"/>
+                </a:lnTo>
+                <a:lnTo>
+                  <a:pt x="3085439" y="103945"/>
+                </a:lnTo>
+                <a:lnTo>
+                  <a:pt x="3028410" y="217851"/>
+                </a:lnTo>
+                <a:lnTo>
+                  <a:pt x="3219656" y="172066"/>
+                </a:lnTo>
+                <a:lnTo>
+                  <a:pt x="3197332" y="378196"/>
+                </a:lnTo>
+                <a:lnTo>
+                  <a:pt x="3336575" y="262177"/>
+                </a:lnTo>
+                <a:lnTo>
+                  <a:pt x="3437178" y="410027"/>
+                </a:lnTo>
+                <a:lnTo>
+                  <a:pt x="3476491" y="313558"/>
+                </a:lnTo>
+                <a:lnTo>
+                  <a:pt x="3476491" y="492057"/>
+                </a:lnTo>
+                <a:cubicBezTo>
+                  <a:pt x="3476491" y="651365"/>
+                  <a:pt x="3347346" y="780510"/>
+                  <a:pt x="3188038" y="780510"/>
+                </a:cubicBezTo>
+                <a:lnTo>
+                  <a:pt x="489448" y="780510"/>
+                </a:lnTo>
+                <a:lnTo>
+                  <a:pt x="393068" y="750434"/>
+                </a:lnTo>
+                <a:lnTo>
+                  <a:pt x="465283" y="645496"/>
+                </a:lnTo>
+                <a:lnTo>
+                  <a:pt x="269546" y="664428"/>
+                </a:lnTo>
+                <a:lnTo>
+                  <a:pt x="320126" y="463356"/>
+                </a:lnTo>
+                <a:lnTo>
+                  <a:pt x="166194" y="559031"/>
+                </a:lnTo>
+                <a:lnTo>
+                  <a:pt x="86976" y="398703"/>
+                </a:lnTo>
+                <a:lnTo>
+                  <a:pt x="8480" y="534057"/>
+                </a:lnTo>
+                <a:lnTo>
+                  <a:pt x="0" y="492057"/>
+                </a:lnTo>
+                <a:lnTo>
+                  <a:pt x="0" y="288453"/>
+                </a:lnTo>
+                <a:cubicBezTo>
+                  <a:pt x="0" y="129145"/>
+                  <a:pt x="129145" y="0"/>
+                  <a:pt x="288453" y="0"/>
+                </a:cubicBezTo>
+                <a:close/>
+              </a:path>
+            </a:pathLst>
+          </a:custGeom>
+          <a:solidFill>
+            <a:schemeClr val="tx1">
+              <a:alpha val="51000"/>
+            </a:schemeClr>
+          </a:solidFill>
+          <a:ln w="38100">
+            <a:noFill/>
+          </a:ln>
+        </p:spPr>
+        <p:style>
+          <a:lnRef idx="2">
+            <a:schemeClr val="accent1">
+              <a:shade val="50000"/>
+            </a:schemeClr>
+          </a:lnRef>
+          <a:fillRef idx="1">
+            <a:schemeClr val="accent1"/>
+          </a:fillRef>
+          <a:effectRef idx="0">
+            <a:schemeClr val="accent1"/>
+          </a:effectRef>
+          <a:fontRef idx="minor">
+            <a:schemeClr val="lt1"/>
+          </a:fontRef>
+        </p:style>
+        <p:txBody>
+          <a:bodyPr wrap="square" rtlCol="0" anchor="ctr">
+            <a:noAutofit/>
+          </a:bodyPr>
+          <a:lstStyle/>
+          <a:p>
+            <a:pPr algn="ctr"/>
+            <a:endParaRPr lang="en-US" sz="2699" dirty="0">
+              <a:solidFill>
+                <a:schemeClr val="tx1"/>
+              </a:solidFill>
+              <a:latin typeface="Quantum" pitchFamily="50" charset="0"/>
+            </a:endParaRPr>
+          </a:p>
+        </p:txBody>
+      </p:sp>
+      <p:grpSp>
+        <p:nvGrpSpPr>
+          <p:cNvPr id="6" name="Group 5">
+            <a:extLst>
+              <a:ext uri="{FF2B5EF4-FFF2-40B4-BE49-F238E27FC236}">
+                <a16:creationId xmlns:a16="http://schemas.microsoft.com/office/drawing/2014/main" id="{4C37ECD3-2F6C-741C-F2B6-EFD9CF886AA0}"/>
+              </a:ext>
+            </a:extLst>
+          </p:cNvPr>
+          <p:cNvGrpSpPr/>
+          <p:nvPr/>
+        </p:nvGrpSpPr>
+        <p:grpSpPr>
+          <a:xfrm>
+            <a:off x="371636" y="4291272"/>
+            <a:ext cx="3662451" cy="665693"/>
+            <a:chOff x="952755" y="4111316"/>
+            <a:chExt cx="3498704" cy="780510"/>
+          </a:xfrm>
+        </p:grpSpPr>
+        <p:sp>
+          <p:nvSpPr>
+            <p:cNvPr id="8" name="Freeform: Shape 7">
+              <a:extLst>
+                <a:ext uri="{FF2B5EF4-FFF2-40B4-BE49-F238E27FC236}">
+                  <a16:creationId xmlns:a16="http://schemas.microsoft.com/office/drawing/2014/main" id="{728C3697-D2D8-9937-07B7-465DA5B1C814}"/>
+                </a:ext>
+              </a:extLst>
+            </p:cNvPr>
+            <p:cNvSpPr/>
+            <p:nvPr/>
+          </p:nvSpPr>
+          <p:spPr>
+            <a:xfrm>
+              <a:off x="952755" y="4111316"/>
+              <a:ext cx="3476491" cy="780510"/>
+            </a:xfrm>
+            <a:custGeom>
+              <a:avLst/>
+              <a:gdLst>
+                <a:gd name="connsiteX0" fmla="*/ 288453 w 3476491"/>
+                <a:gd name="connsiteY0" fmla="*/ 0 h 780510"/>
+                <a:gd name="connsiteX1" fmla="*/ 2995948 w 3476491"/>
+                <a:gd name="connsiteY1" fmla="*/ 0 h 780510"/>
+                <a:gd name="connsiteX2" fmla="*/ 2856951 w 3476491"/>
+                <a:gd name="connsiteY2" fmla="*/ 66152 h 780510"/>
+                <a:gd name="connsiteX3" fmla="*/ 3085439 w 3476491"/>
+                <a:gd name="connsiteY3" fmla="*/ 103945 h 780510"/>
+                <a:gd name="connsiteX4" fmla="*/ 3028410 w 3476491"/>
+                <a:gd name="connsiteY4" fmla="*/ 217851 h 780510"/>
+                <a:gd name="connsiteX5" fmla="*/ 3219656 w 3476491"/>
+                <a:gd name="connsiteY5" fmla="*/ 172066 h 780510"/>
+                <a:gd name="connsiteX6" fmla="*/ 3197332 w 3476491"/>
+                <a:gd name="connsiteY6" fmla="*/ 378196 h 780510"/>
+                <a:gd name="connsiteX7" fmla="*/ 3336575 w 3476491"/>
+                <a:gd name="connsiteY7" fmla="*/ 262177 h 780510"/>
+                <a:gd name="connsiteX8" fmla="*/ 3437178 w 3476491"/>
+                <a:gd name="connsiteY8" fmla="*/ 410027 h 780510"/>
+                <a:gd name="connsiteX9" fmla="*/ 3476491 w 3476491"/>
+                <a:gd name="connsiteY9" fmla="*/ 313558 h 780510"/>
+                <a:gd name="connsiteX10" fmla="*/ 3476491 w 3476491"/>
+                <a:gd name="connsiteY10" fmla="*/ 492057 h 780510"/>
+                <a:gd name="connsiteX11" fmla="*/ 3188038 w 3476491"/>
+                <a:gd name="connsiteY11" fmla="*/ 780510 h 780510"/>
+                <a:gd name="connsiteX12" fmla="*/ 489448 w 3476491"/>
+                <a:gd name="connsiteY12" fmla="*/ 780510 h 780510"/>
+                <a:gd name="connsiteX13" fmla="*/ 393068 w 3476491"/>
+                <a:gd name="connsiteY13" fmla="*/ 750434 h 780510"/>
+                <a:gd name="connsiteX14" fmla="*/ 465283 w 3476491"/>
+                <a:gd name="connsiteY14" fmla="*/ 645496 h 780510"/>
+                <a:gd name="connsiteX15" fmla="*/ 269546 w 3476491"/>
+                <a:gd name="connsiteY15" fmla="*/ 664428 h 780510"/>
+                <a:gd name="connsiteX16" fmla="*/ 320126 w 3476491"/>
+                <a:gd name="connsiteY16" fmla="*/ 463356 h 780510"/>
+                <a:gd name="connsiteX17" fmla="*/ 166194 w 3476491"/>
+                <a:gd name="connsiteY17" fmla="*/ 559031 h 780510"/>
+                <a:gd name="connsiteX18" fmla="*/ 86976 w 3476491"/>
+                <a:gd name="connsiteY18" fmla="*/ 398703 h 780510"/>
+                <a:gd name="connsiteX19" fmla="*/ 8480 w 3476491"/>
+                <a:gd name="connsiteY19" fmla="*/ 534057 h 780510"/>
+                <a:gd name="connsiteX20" fmla="*/ 0 w 3476491"/>
+                <a:gd name="connsiteY20" fmla="*/ 492057 h 780510"/>
+                <a:gd name="connsiteX21" fmla="*/ 0 w 3476491"/>
+                <a:gd name="connsiteY21" fmla="*/ 288453 h 780510"/>
+                <a:gd name="connsiteX22" fmla="*/ 288453 w 3476491"/>
+                <a:gd name="connsiteY22" fmla="*/ 0 h 780510"/>
+              </a:gdLst>
+              <a:ahLst/>
+              <a:cxnLst>
+                <a:cxn ang="0">
+                  <a:pos x="connsiteX0" y="connsiteY0"/>
+                </a:cxn>
+                <a:cxn ang="0">
+                  <a:pos x="connsiteX1" y="connsiteY1"/>
+                </a:cxn>
+                <a:cxn ang="0">
+                  <a:pos x="connsiteX2" y="connsiteY2"/>
+                </a:cxn>
+                <a:cxn ang="0">
+                  <a:pos x="connsiteX3" y="connsiteY3"/>
+                </a:cxn>
+                <a:cxn ang="0">
+                  <a:pos x="connsiteX4" y="connsiteY4"/>
+                </a:cxn>
+                <a:cxn ang="0">
+                  <a:pos x="connsiteX5" y="connsiteY5"/>
+                </a:cxn>
+                <a:cxn ang="0">
+                  <a:pos x="connsiteX6" y="connsiteY6"/>
+                </a:cxn>
+                <a:cxn ang="0">
+                  <a:pos x="connsiteX7" y="connsiteY7"/>
+                </a:cxn>
+                <a:cxn ang="0">
+                  <a:pos x="connsiteX8" y="connsiteY8"/>
+                </a:cxn>
+                <a:cxn ang="0">
+                  <a:pos x="connsiteX9" y="connsiteY9"/>
+                </a:cxn>
+                <a:cxn ang="0">
+                  <a:pos x="connsiteX10" y="connsiteY10"/>
+                </a:cxn>
+                <a:cxn ang="0">
+                  <a:pos x="connsiteX11" y="connsiteY11"/>
+                </a:cxn>
+                <a:cxn ang="0">
+                  <a:pos x="connsiteX12" y="connsiteY12"/>
+                </a:cxn>
+                <a:cxn ang="0">
+                  <a:pos x="connsiteX13" y="connsiteY13"/>
+                </a:cxn>
+                <a:cxn ang="0">
+                  <a:pos x="connsiteX14" y="connsiteY14"/>
+                </a:cxn>
+                <a:cxn ang="0">
+                  <a:pos x="connsiteX15" y="connsiteY15"/>
+                </a:cxn>
+                <a:cxn ang="0">
+                  <a:pos x="connsiteX16" y="connsiteY16"/>
+                </a:cxn>
+                <a:cxn ang="0">
+                  <a:pos x="connsiteX17" y="connsiteY17"/>
+                </a:cxn>
+                <a:cxn ang="0">
+                  <a:pos x="connsiteX18" y="connsiteY18"/>
+                </a:cxn>
+                <a:cxn ang="0">
+                  <a:pos x="connsiteX19" y="connsiteY19"/>
+                </a:cxn>
+                <a:cxn ang="0">
+                  <a:pos x="connsiteX20" y="connsiteY20"/>
+                </a:cxn>
+                <a:cxn ang="0">
+                  <a:pos x="connsiteX21" y="connsiteY21"/>
+                </a:cxn>
+                <a:cxn ang="0">
+                  <a:pos x="connsiteX22" y="connsiteY22"/>
+                </a:cxn>
+              </a:cxnLst>
+              <a:rect l="l" t="t" r="r" b="b"/>
+              <a:pathLst>
+                <a:path w="3476491" h="780510">
+                  <a:moveTo>
+                    <a:pt x="288453" y="0"/>
+                  </a:moveTo>
+                  <a:lnTo>
+                    <a:pt x="2995948" y="0"/>
+                  </a:lnTo>
+                  <a:lnTo>
+                    <a:pt x="2856951" y="66152"/>
+                  </a:lnTo>
+                  <a:lnTo>
+                    <a:pt x="3085439" y="103945"/>
+                  </a:lnTo>
+                  <a:lnTo>
+                    <a:pt x="3028410" y="217851"/>
+                  </a:lnTo>
+                  <a:lnTo>
+                    <a:pt x="3219656" y="172066"/>
+                  </a:lnTo>
+                  <a:lnTo>
+                    <a:pt x="3197332" y="378196"/>
+                  </a:lnTo>
+                  <a:lnTo>
+                    <a:pt x="3336575" y="262177"/>
+                  </a:lnTo>
+                  <a:lnTo>
+                    <a:pt x="3437178" y="410027"/>
+                  </a:lnTo>
+                  <a:lnTo>
+                    <a:pt x="3476491" y="313558"/>
+                  </a:lnTo>
+                  <a:lnTo>
+                    <a:pt x="3476491" y="492057"/>
+                  </a:lnTo>
+                  <a:cubicBezTo>
+                    <a:pt x="3476491" y="651365"/>
+                    <a:pt x="3347346" y="780510"/>
+                    <a:pt x="3188038" y="780510"/>
+                  </a:cubicBezTo>
+                  <a:lnTo>
+                    <a:pt x="489448" y="780510"/>
+                  </a:lnTo>
+                  <a:lnTo>
+                    <a:pt x="393068" y="750434"/>
+                  </a:lnTo>
+                  <a:lnTo>
+                    <a:pt x="465283" y="645496"/>
+                  </a:lnTo>
+                  <a:lnTo>
+                    <a:pt x="269546" y="664428"/>
+                  </a:lnTo>
+                  <a:lnTo>
+                    <a:pt x="320126" y="463356"/>
+                  </a:lnTo>
+                  <a:lnTo>
+                    <a:pt x="166194" y="559031"/>
+                  </a:lnTo>
+                  <a:lnTo>
+                    <a:pt x="86976" y="398703"/>
+                  </a:lnTo>
+                  <a:lnTo>
+                    <a:pt x="8480" y="534057"/>
+                  </a:lnTo>
+                  <a:lnTo>
+                    <a:pt x="0" y="492057"/>
+                  </a:lnTo>
+                  <a:lnTo>
+                    <a:pt x="0" y="288453"/>
+                  </a:lnTo>
+                  <a:cubicBezTo>
+                    <a:pt x="0" y="129145"/>
+                    <a:pt x="129145" y="0"/>
+                    <a:pt x="288453" y="0"/>
+                  </a:cubicBezTo>
+                  <a:close/>
+                </a:path>
+              </a:pathLst>
+            </a:custGeom>
+            <a:noFill/>
+            <a:ln w="38100">
+              <a:solidFill>
+                <a:schemeClr val="bg1"/>
+              </a:solidFill>
+            </a:ln>
+          </p:spPr>
+          <p:style>
+            <a:lnRef idx="2">
+              <a:schemeClr val="accent1">
+                <a:shade val="50000"/>
+              </a:schemeClr>
+            </a:lnRef>
+            <a:fillRef idx="1">
+              <a:schemeClr val="accent1"/>
+            </a:fillRef>
+            <a:effectRef idx="0">
+              <a:schemeClr val="accent1"/>
+            </a:effectRef>
+            <a:fontRef idx="minor">
+              <a:schemeClr val="lt1"/>
+            </a:fontRef>
+          </p:style>
+          <p:txBody>
+            <a:bodyPr wrap="square" rtlCol="0" anchor="ctr">
+              <a:noAutofit/>
+            </a:bodyPr>
+            <a:lstStyle/>
+            <a:p>
+              <a:pPr algn="ctr"/>
+              <a:endParaRPr lang="en-US" sz="2699" dirty="0">
+                <a:solidFill>
+                  <a:schemeClr val="bg1"/>
+                </a:solidFill>
+                <a:latin typeface="Quantum" pitchFamily="50" charset="0"/>
+              </a:endParaRPr>
+            </a:p>
+          </p:txBody>
+        </p:sp>
+        <p:sp>
+          <p:nvSpPr>
+            <p:cNvPr id="9" name="TextBox 8">
+              <a:extLst>
+                <a:ext uri="{FF2B5EF4-FFF2-40B4-BE49-F238E27FC236}">
+                  <a16:creationId xmlns:a16="http://schemas.microsoft.com/office/drawing/2014/main" id="{1F4486D3-8AE3-92A9-F365-079F603A2E7D}"/>
+                </a:ext>
+              </a:extLst>
+            </p:cNvPr>
+            <p:cNvSpPr txBox="1"/>
+            <p:nvPr/>
+          </p:nvSpPr>
+          <p:spPr>
+            <a:xfrm>
+              <a:off x="974969" y="4168423"/>
+              <a:ext cx="3476490" cy="554673"/>
+            </a:xfrm>
+            <a:prstGeom prst="rect">
+              <a:avLst/>
+            </a:prstGeom>
+            <a:noFill/>
+            <a:ln>
+              <a:noFill/>
+            </a:ln>
+          </p:spPr>
+          <p:txBody>
+            <a:bodyPr wrap="square" rtlCol="0" anchor="ctr">
+              <a:spAutoFit/>
+            </a:bodyPr>
+            <a:lstStyle/>
+            <a:p>
+              <a:pPr algn="ctr"/>
+              <a:r>
+                <a:rPr lang="en-US" sz="2474" dirty="0">
+                  <a:solidFill>
+                    <a:schemeClr val="bg1"/>
+                  </a:solidFill>
+                  <a:latin typeface="Quantum" pitchFamily="50" charset="0"/>
+                </a:rPr>
+                <a:t>ABOUT</a:t>
+              </a:r>
+            </a:p>
+          </p:txBody>
+        </p:sp>
+      </p:grpSp>
+      <p:sp>
+        <p:nvSpPr>
+          <p:cNvPr id="24" name="Freeform: Shape 23">
+            <a:extLst>
+              <a:ext uri="{FF2B5EF4-FFF2-40B4-BE49-F238E27FC236}">
+                <a16:creationId xmlns:a16="http://schemas.microsoft.com/office/drawing/2014/main" id="{577B53DD-62D7-33C9-AF4E-4709EC4077AE}"/>
+              </a:ext>
+            </a:extLst>
+          </p:cNvPr>
+          <p:cNvSpPr/>
+          <p:nvPr/>
+        </p:nvSpPr>
+        <p:spPr>
+          <a:xfrm>
+            <a:off x="376208" y="2289801"/>
+            <a:ext cx="3639197" cy="665693"/>
+          </a:xfrm>
+          <a:custGeom>
+            <a:avLst/>
+            <a:gdLst>
+              <a:gd name="connsiteX0" fmla="*/ 288453 w 3476491"/>
+              <a:gd name="connsiteY0" fmla="*/ 0 h 780510"/>
+              <a:gd name="connsiteX1" fmla="*/ 2995948 w 3476491"/>
+              <a:gd name="connsiteY1" fmla="*/ 0 h 780510"/>
+              <a:gd name="connsiteX2" fmla="*/ 2856951 w 3476491"/>
+              <a:gd name="connsiteY2" fmla="*/ 66152 h 780510"/>
+              <a:gd name="connsiteX3" fmla="*/ 3085439 w 3476491"/>
+              <a:gd name="connsiteY3" fmla="*/ 103945 h 780510"/>
+              <a:gd name="connsiteX4" fmla="*/ 3028410 w 3476491"/>
+              <a:gd name="connsiteY4" fmla="*/ 217851 h 780510"/>
+              <a:gd name="connsiteX5" fmla="*/ 3219656 w 3476491"/>
+              <a:gd name="connsiteY5" fmla="*/ 172066 h 780510"/>
+              <a:gd name="connsiteX6" fmla="*/ 3197332 w 3476491"/>
+              <a:gd name="connsiteY6" fmla="*/ 378196 h 780510"/>
+              <a:gd name="connsiteX7" fmla="*/ 3336575 w 3476491"/>
+              <a:gd name="connsiteY7" fmla="*/ 262177 h 780510"/>
+              <a:gd name="connsiteX8" fmla="*/ 3437178 w 3476491"/>
+              <a:gd name="connsiteY8" fmla="*/ 410027 h 780510"/>
+              <a:gd name="connsiteX9" fmla="*/ 3476491 w 3476491"/>
+              <a:gd name="connsiteY9" fmla="*/ 313558 h 780510"/>
+              <a:gd name="connsiteX10" fmla="*/ 3476491 w 3476491"/>
+              <a:gd name="connsiteY10" fmla="*/ 492057 h 780510"/>
+              <a:gd name="connsiteX11" fmla="*/ 3188038 w 3476491"/>
+              <a:gd name="connsiteY11" fmla="*/ 780510 h 780510"/>
+              <a:gd name="connsiteX12" fmla="*/ 489448 w 3476491"/>
+              <a:gd name="connsiteY12" fmla="*/ 780510 h 780510"/>
+              <a:gd name="connsiteX13" fmla="*/ 393068 w 3476491"/>
+              <a:gd name="connsiteY13" fmla="*/ 750434 h 780510"/>
+              <a:gd name="connsiteX14" fmla="*/ 465283 w 3476491"/>
+              <a:gd name="connsiteY14" fmla="*/ 645496 h 780510"/>
+              <a:gd name="connsiteX15" fmla="*/ 269546 w 3476491"/>
+              <a:gd name="connsiteY15" fmla="*/ 664428 h 780510"/>
+              <a:gd name="connsiteX16" fmla="*/ 320126 w 3476491"/>
+              <a:gd name="connsiteY16" fmla="*/ 463356 h 780510"/>
+              <a:gd name="connsiteX17" fmla="*/ 166194 w 3476491"/>
+              <a:gd name="connsiteY17" fmla="*/ 559031 h 780510"/>
+              <a:gd name="connsiteX18" fmla="*/ 86976 w 3476491"/>
+              <a:gd name="connsiteY18" fmla="*/ 398703 h 780510"/>
+              <a:gd name="connsiteX19" fmla="*/ 8480 w 3476491"/>
+              <a:gd name="connsiteY19" fmla="*/ 534057 h 780510"/>
+              <a:gd name="connsiteX20" fmla="*/ 0 w 3476491"/>
+              <a:gd name="connsiteY20" fmla="*/ 492057 h 780510"/>
+              <a:gd name="connsiteX21" fmla="*/ 0 w 3476491"/>
+              <a:gd name="connsiteY21" fmla="*/ 288453 h 780510"/>
+              <a:gd name="connsiteX22" fmla="*/ 288453 w 3476491"/>
+              <a:gd name="connsiteY22" fmla="*/ 0 h 780510"/>
+            </a:gdLst>
+            <a:ahLst/>
+            <a:cxnLst>
+              <a:cxn ang="0">
+                <a:pos x="connsiteX0" y="connsiteY0"/>
+              </a:cxn>
+              <a:cxn ang="0">
+                <a:pos x="connsiteX1" y="connsiteY1"/>
+              </a:cxn>
+              <a:cxn ang="0">
+                <a:pos x="connsiteX2" y="connsiteY2"/>
+              </a:cxn>
+              <a:cxn ang="0">
+                <a:pos x="connsiteX3" y="connsiteY3"/>
+              </a:cxn>
+              <a:cxn ang="0">
+                <a:pos x="connsiteX4" y="connsiteY4"/>
+              </a:cxn>
+              <a:cxn ang="0">
+                <a:pos x="connsiteX5" y="connsiteY5"/>
+              </a:cxn>
+              <a:cxn ang="0">
+                <a:pos x="connsiteX6" y="connsiteY6"/>
+              </a:cxn>
+              <a:cxn ang="0">
+                <a:pos x="connsiteX7" y="connsiteY7"/>
+              </a:cxn>
+              <a:cxn ang="0">
+                <a:pos x="connsiteX8" y="connsiteY8"/>
+              </a:cxn>
+              <a:cxn ang="0">
+                <a:pos x="connsiteX9" y="connsiteY9"/>
+              </a:cxn>
+              <a:cxn ang="0">
+                <a:pos x="connsiteX10" y="connsiteY10"/>
+              </a:cxn>
+              <a:cxn ang="0">
+                <a:pos x="connsiteX11" y="connsiteY11"/>
+              </a:cxn>
+              <a:cxn ang="0">
+                <a:pos x="connsiteX12" y="connsiteY12"/>
+              </a:cxn>
+              <a:cxn ang="0">
+                <a:pos x="connsiteX13" y="connsiteY13"/>
+              </a:cxn>
+              <a:cxn ang="0">
+                <a:pos x="connsiteX14" y="connsiteY14"/>
+              </a:cxn>
+              <a:cxn ang="0">
+                <a:pos x="connsiteX15" y="connsiteY15"/>
+              </a:cxn>
+              <a:cxn ang="0">
+                <a:pos x="connsiteX16" y="connsiteY16"/>
+              </a:cxn>
+              <a:cxn ang="0">
+                <a:pos x="connsiteX17" y="connsiteY17"/>
+              </a:cxn>
+              <a:cxn ang="0">
+                <a:pos x="connsiteX18" y="connsiteY18"/>
+              </a:cxn>
+              <a:cxn ang="0">
+                <a:pos x="connsiteX19" y="connsiteY19"/>
+              </a:cxn>
+              <a:cxn ang="0">
+                <a:pos x="connsiteX20" y="connsiteY20"/>
+              </a:cxn>
+              <a:cxn ang="0">
+                <a:pos x="connsiteX21" y="connsiteY21"/>
+              </a:cxn>
+              <a:cxn ang="0">
+                <a:pos x="connsiteX22" y="connsiteY22"/>
+              </a:cxn>
+            </a:cxnLst>
+            <a:rect l="l" t="t" r="r" b="b"/>
+            <a:pathLst>
+              <a:path w="3476491" h="780510">
+                <a:moveTo>
+                  <a:pt x="288453" y="0"/>
+                </a:moveTo>
+                <a:lnTo>
+                  <a:pt x="2995948" y="0"/>
+                </a:lnTo>
+                <a:lnTo>
+                  <a:pt x="2856951" y="66152"/>
+                </a:lnTo>
+                <a:lnTo>
+                  <a:pt x="3085439" y="103945"/>
+                </a:lnTo>
+                <a:lnTo>
+                  <a:pt x="3028410" y="217851"/>
+                </a:lnTo>
+                <a:lnTo>
+                  <a:pt x="3219656" y="172066"/>
+                </a:lnTo>
+                <a:lnTo>
+                  <a:pt x="3197332" y="378196"/>
+                </a:lnTo>
+                <a:lnTo>
+                  <a:pt x="3336575" y="262177"/>
+                </a:lnTo>
+                <a:lnTo>
+                  <a:pt x="3437178" y="410027"/>
+                </a:lnTo>
+                <a:lnTo>
+                  <a:pt x="3476491" y="313558"/>
+                </a:lnTo>
+                <a:lnTo>
+                  <a:pt x="3476491" y="492057"/>
+                </a:lnTo>
+                <a:cubicBezTo>
+                  <a:pt x="3476491" y="651365"/>
+                  <a:pt x="3347346" y="780510"/>
+                  <a:pt x="3188038" y="780510"/>
+                </a:cubicBezTo>
+                <a:lnTo>
+                  <a:pt x="489448" y="780510"/>
+                </a:lnTo>
+                <a:lnTo>
+                  <a:pt x="393068" y="750434"/>
+                </a:lnTo>
+                <a:lnTo>
+                  <a:pt x="465283" y="645496"/>
+                </a:lnTo>
+                <a:lnTo>
+                  <a:pt x="269546" y="664428"/>
+                </a:lnTo>
+                <a:lnTo>
+                  <a:pt x="320126" y="463356"/>
+                </a:lnTo>
+                <a:lnTo>
+                  <a:pt x="166194" y="559031"/>
+                </a:lnTo>
+                <a:lnTo>
+                  <a:pt x="86976" y="398703"/>
+                </a:lnTo>
+                <a:lnTo>
+                  <a:pt x="8480" y="534057"/>
+                </a:lnTo>
+                <a:lnTo>
+                  <a:pt x="0" y="492057"/>
+                </a:lnTo>
+                <a:lnTo>
+                  <a:pt x="0" y="288453"/>
+                </a:lnTo>
+                <a:cubicBezTo>
+                  <a:pt x="0" y="129145"/>
+                  <a:pt x="129145" y="0"/>
+                  <a:pt x="288453" y="0"/>
+                </a:cubicBezTo>
+                <a:close/>
+              </a:path>
+            </a:pathLst>
+          </a:custGeom>
+          <a:solidFill>
+            <a:schemeClr val="tx1">
+              <a:alpha val="51000"/>
+            </a:schemeClr>
+          </a:solidFill>
+          <a:ln w="38100">
+            <a:noFill/>
+          </a:ln>
+        </p:spPr>
+        <p:style>
+          <a:lnRef idx="2">
+            <a:schemeClr val="accent1">
+              <a:shade val="50000"/>
+            </a:schemeClr>
+          </a:lnRef>
+          <a:fillRef idx="1">
+            <a:schemeClr val="accent1"/>
+          </a:fillRef>
+          <a:effectRef idx="0">
+            <a:schemeClr val="accent1"/>
+          </a:effectRef>
+          <a:fontRef idx="minor">
+            <a:schemeClr val="lt1"/>
+          </a:fontRef>
+        </p:style>
+        <p:txBody>
+          <a:bodyPr wrap="square" rtlCol="0" anchor="ctr">
+            <a:noAutofit/>
+          </a:bodyPr>
+          <a:lstStyle/>
+          <a:p>
+            <a:pPr algn="ctr"/>
+            <a:endParaRPr lang="en-US" sz="2699" dirty="0">
+              <a:solidFill>
+                <a:schemeClr val="tx1"/>
+              </a:solidFill>
+              <a:latin typeface="Quantum" pitchFamily="50" charset="0"/>
+            </a:endParaRPr>
+          </a:p>
+        </p:txBody>
+      </p:sp>
+      <p:grpSp>
+        <p:nvGrpSpPr>
+          <p:cNvPr id="21" name="Group 20">
+            <a:extLst>
+              <a:ext uri="{FF2B5EF4-FFF2-40B4-BE49-F238E27FC236}">
+                <a16:creationId xmlns:a16="http://schemas.microsoft.com/office/drawing/2014/main" id="{51F36FB3-5C3D-1492-600E-A8DE545EB762}"/>
+              </a:ext>
+            </a:extLst>
+          </p:cNvPr>
+          <p:cNvGrpSpPr/>
+          <p:nvPr/>
+        </p:nvGrpSpPr>
+        <p:grpSpPr>
+          <a:xfrm>
+            <a:off x="371446" y="2294494"/>
+            <a:ext cx="3662451" cy="665693"/>
+            <a:chOff x="952755" y="4111316"/>
+            <a:chExt cx="3498704" cy="780510"/>
+          </a:xfrm>
+        </p:grpSpPr>
+        <p:sp>
+          <p:nvSpPr>
+            <p:cNvPr id="22" name="Freeform: Shape 21">
+              <a:extLst>
+                <a:ext uri="{FF2B5EF4-FFF2-40B4-BE49-F238E27FC236}">
+                  <a16:creationId xmlns:a16="http://schemas.microsoft.com/office/drawing/2014/main" id="{916CF72F-11EE-F6D7-8183-2823DC8F45C3}"/>
+                </a:ext>
+              </a:extLst>
+            </p:cNvPr>
+            <p:cNvSpPr/>
+            <p:nvPr/>
+          </p:nvSpPr>
+          <p:spPr>
+            <a:xfrm>
+              <a:off x="952755" y="4111316"/>
+              <a:ext cx="3476491" cy="780510"/>
+            </a:xfrm>
+            <a:custGeom>
+              <a:avLst/>
+              <a:gdLst>
+                <a:gd name="connsiteX0" fmla="*/ 288453 w 3476491"/>
+                <a:gd name="connsiteY0" fmla="*/ 0 h 780510"/>
+                <a:gd name="connsiteX1" fmla="*/ 2995948 w 3476491"/>
+                <a:gd name="connsiteY1" fmla="*/ 0 h 780510"/>
+                <a:gd name="connsiteX2" fmla="*/ 2856951 w 3476491"/>
+                <a:gd name="connsiteY2" fmla="*/ 66152 h 780510"/>
+                <a:gd name="connsiteX3" fmla="*/ 3085439 w 3476491"/>
+                <a:gd name="connsiteY3" fmla="*/ 103945 h 780510"/>
+                <a:gd name="connsiteX4" fmla="*/ 3028410 w 3476491"/>
+                <a:gd name="connsiteY4" fmla="*/ 217851 h 780510"/>
+                <a:gd name="connsiteX5" fmla="*/ 3219656 w 3476491"/>
+                <a:gd name="connsiteY5" fmla="*/ 172066 h 780510"/>
+                <a:gd name="connsiteX6" fmla="*/ 3197332 w 3476491"/>
+                <a:gd name="connsiteY6" fmla="*/ 378196 h 780510"/>
+                <a:gd name="connsiteX7" fmla="*/ 3336575 w 3476491"/>
+                <a:gd name="connsiteY7" fmla="*/ 262177 h 780510"/>
+                <a:gd name="connsiteX8" fmla="*/ 3437178 w 3476491"/>
+                <a:gd name="connsiteY8" fmla="*/ 410027 h 780510"/>
+                <a:gd name="connsiteX9" fmla="*/ 3476491 w 3476491"/>
+                <a:gd name="connsiteY9" fmla="*/ 313558 h 780510"/>
+                <a:gd name="connsiteX10" fmla="*/ 3476491 w 3476491"/>
+                <a:gd name="connsiteY10" fmla="*/ 492057 h 780510"/>
+                <a:gd name="connsiteX11" fmla="*/ 3188038 w 3476491"/>
+                <a:gd name="connsiteY11" fmla="*/ 780510 h 780510"/>
+                <a:gd name="connsiteX12" fmla="*/ 489448 w 3476491"/>
+                <a:gd name="connsiteY12" fmla="*/ 780510 h 780510"/>
+                <a:gd name="connsiteX13" fmla="*/ 393068 w 3476491"/>
+                <a:gd name="connsiteY13" fmla="*/ 750434 h 780510"/>
+                <a:gd name="connsiteX14" fmla="*/ 465283 w 3476491"/>
+                <a:gd name="connsiteY14" fmla="*/ 645496 h 780510"/>
+                <a:gd name="connsiteX15" fmla="*/ 269546 w 3476491"/>
+                <a:gd name="connsiteY15" fmla="*/ 664428 h 780510"/>
+                <a:gd name="connsiteX16" fmla="*/ 320126 w 3476491"/>
+                <a:gd name="connsiteY16" fmla="*/ 463356 h 780510"/>
+                <a:gd name="connsiteX17" fmla="*/ 166194 w 3476491"/>
+                <a:gd name="connsiteY17" fmla="*/ 559031 h 780510"/>
+                <a:gd name="connsiteX18" fmla="*/ 86976 w 3476491"/>
+                <a:gd name="connsiteY18" fmla="*/ 398703 h 780510"/>
+                <a:gd name="connsiteX19" fmla="*/ 8480 w 3476491"/>
+                <a:gd name="connsiteY19" fmla="*/ 534057 h 780510"/>
+                <a:gd name="connsiteX20" fmla="*/ 0 w 3476491"/>
+                <a:gd name="connsiteY20" fmla="*/ 492057 h 780510"/>
+                <a:gd name="connsiteX21" fmla="*/ 0 w 3476491"/>
+                <a:gd name="connsiteY21" fmla="*/ 288453 h 780510"/>
+                <a:gd name="connsiteX22" fmla="*/ 288453 w 3476491"/>
+                <a:gd name="connsiteY22" fmla="*/ 0 h 780510"/>
+              </a:gdLst>
+              <a:ahLst/>
+              <a:cxnLst>
+                <a:cxn ang="0">
+                  <a:pos x="connsiteX0" y="connsiteY0"/>
+                </a:cxn>
+                <a:cxn ang="0">
+                  <a:pos x="connsiteX1" y="connsiteY1"/>
+                </a:cxn>
+                <a:cxn ang="0">
+                  <a:pos x="connsiteX2" y="connsiteY2"/>
+                </a:cxn>
+                <a:cxn ang="0">
+                  <a:pos x="connsiteX3" y="connsiteY3"/>
+                </a:cxn>
+                <a:cxn ang="0">
+                  <a:pos x="connsiteX4" y="connsiteY4"/>
+                </a:cxn>
+                <a:cxn ang="0">
+                  <a:pos x="connsiteX5" y="connsiteY5"/>
+                </a:cxn>
+                <a:cxn ang="0">
+                  <a:pos x="connsiteX6" y="connsiteY6"/>
+                </a:cxn>
+                <a:cxn ang="0">
+                  <a:pos x="connsiteX7" y="connsiteY7"/>
+                </a:cxn>
+                <a:cxn ang="0">
+                  <a:pos x="connsiteX8" y="connsiteY8"/>
+                </a:cxn>
+                <a:cxn ang="0">
+                  <a:pos x="connsiteX9" y="connsiteY9"/>
+                </a:cxn>
+                <a:cxn ang="0">
+                  <a:pos x="connsiteX10" y="connsiteY10"/>
+                </a:cxn>
+                <a:cxn ang="0">
+                  <a:pos x="connsiteX11" y="connsiteY11"/>
+                </a:cxn>
+                <a:cxn ang="0">
+                  <a:pos x="connsiteX12" y="connsiteY12"/>
+                </a:cxn>
+                <a:cxn ang="0">
+                  <a:pos x="connsiteX13" y="connsiteY13"/>
+                </a:cxn>
+                <a:cxn ang="0">
+                  <a:pos x="connsiteX14" y="connsiteY14"/>
+                </a:cxn>
+                <a:cxn ang="0">
+                  <a:pos x="connsiteX15" y="connsiteY15"/>
+                </a:cxn>
+                <a:cxn ang="0">
+                  <a:pos x="connsiteX16" y="connsiteY16"/>
+                </a:cxn>
+                <a:cxn ang="0">
+                  <a:pos x="connsiteX17" y="connsiteY17"/>
+                </a:cxn>
+                <a:cxn ang="0">
+                  <a:pos x="connsiteX18" y="connsiteY18"/>
+                </a:cxn>
+                <a:cxn ang="0">
+                  <a:pos x="connsiteX19" y="connsiteY19"/>
+                </a:cxn>
+                <a:cxn ang="0">
+                  <a:pos x="connsiteX20" y="connsiteY20"/>
+                </a:cxn>
+                <a:cxn ang="0">
+                  <a:pos x="connsiteX21" y="connsiteY21"/>
+                </a:cxn>
+                <a:cxn ang="0">
+                  <a:pos x="connsiteX22" y="connsiteY22"/>
+                </a:cxn>
+              </a:cxnLst>
+              <a:rect l="l" t="t" r="r" b="b"/>
+              <a:pathLst>
+                <a:path w="3476491" h="780510">
+                  <a:moveTo>
+                    <a:pt x="288453" y="0"/>
+                  </a:moveTo>
+                  <a:lnTo>
+                    <a:pt x="2995948" y="0"/>
+                  </a:lnTo>
+                  <a:lnTo>
+                    <a:pt x="2856951" y="66152"/>
+                  </a:lnTo>
+                  <a:lnTo>
+                    <a:pt x="3085439" y="103945"/>
+                  </a:lnTo>
+                  <a:lnTo>
+                    <a:pt x="3028410" y="217851"/>
+                  </a:lnTo>
+                  <a:lnTo>
+                    <a:pt x="3219656" y="172066"/>
+                  </a:lnTo>
+                  <a:lnTo>
+                    <a:pt x="3197332" y="378196"/>
+                  </a:lnTo>
+                  <a:lnTo>
+                    <a:pt x="3336575" y="262177"/>
+                  </a:lnTo>
+                  <a:lnTo>
+                    <a:pt x="3437178" y="410027"/>
+                  </a:lnTo>
+                  <a:lnTo>
+                    <a:pt x="3476491" y="313558"/>
+                  </a:lnTo>
+                  <a:lnTo>
+                    <a:pt x="3476491" y="492057"/>
+                  </a:lnTo>
+                  <a:cubicBezTo>
+                    <a:pt x="3476491" y="651365"/>
+                    <a:pt x="3347346" y="780510"/>
+                    <a:pt x="3188038" y="780510"/>
+                  </a:cubicBezTo>
+                  <a:lnTo>
+                    <a:pt x="489448" y="780510"/>
+                  </a:lnTo>
+                  <a:lnTo>
+                    <a:pt x="393068" y="750434"/>
+                  </a:lnTo>
+                  <a:lnTo>
+                    <a:pt x="465283" y="645496"/>
+                  </a:lnTo>
+                  <a:lnTo>
+                    <a:pt x="269546" y="664428"/>
+                  </a:lnTo>
+                  <a:lnTo>
+                    <a:pt x="320126" y="463356"/>
+                  </a:lnTo>
+                  <a:lnTo>
+                    <a:pt x="166194" y="559031"/>
+                  </a:lnTo>
+                  <a:lnTo>
+                    <a:pt x="86976" y="398703"/>
+                  </a:lnTo>
+                  <a:lnTo>
+                    <a:pt x="8480" y="534057"/>
+                  </a:lnTo>
+                  <a:lnTo>
+                    <a:pt x="0" y="492057"/>
+                  </a:lnTo>
+                  <a:lnTo>
+                    <a:pt x="0" y="288453"/>
+                  </a:lnTo>
+                  <a:cubicBezTo>
+                    <a:pt x="0" y="129145"/>
+                    <a:pt x="129145" y="0"/>
+                    <a:pt x="288453" y="0"/>
+                  </a:cubicBezTo>
+                  <a:close/>
+                </a:path>
+              </a:pathLst>
+            </a:custGeom>
+            <a:noFill/>
+            <a:ln w="38100">
+              <a:solidFill>
+                <a:schemeClr val="bg1"/>
+              </a:solidFill>
+            </a:ln>
+          </p:spPr>
+          <p:style>
+            <a:lnRef idx="2">
+              <a:schemeClr val="accent1">
+                <a:shade val="50000"/>
+              </a:schemeClr>
+            </a:lnRef>
+            <a:fillRef idx="1">
+              <a:schemeClr val="accent1"/>
+            </a:fillRef>
+            <a:effectRef idx="0">
+              <a:schemeClr val="accent1"/>
+            </a:effectRef>
+            <a:fontRef idx="minor">
+              <a:schemeClr val="lt1"/>
+            </a:fontRef>
+          </p:style>
+          <p:txBody>
+            <a:bodyPr wrap="square" rtlCol="0" anchor="ctr">
+              <a:noAutofit/>
+            </a:bodyPr>
+            <a:lstStyle/>
+            <a:p>
+              <a:pPr algn="ctr"/>
+              <a:endParaRPr lang="en-US" sz="2699" dirty="0">
+                <a:solidFill>
+                  <a:schemeClr val="bg1"/>
+                </a:solidFill>
+                <a:latin typeface="Quantum" pitchFamily="50" charset="0"/>
+              </a:endParaRPr>
+            </a:p>
+          </p:txBody>
+        </p:sp>
+        <p:sp>
+          <p:nvSpPr>
+            <p:cNvPr id="23" name="TextBox 22">
+              <a:extLst>
+                <a:ext uri="{FF2B5EF4-FFF2-40B4-BE49-F238E27FC236}">
+                  <a16:creationId xmlns:a16="http://schemas.microsoft.com/office/drawing/2014/main" id="{A00BF272-55FE-682D-BCA5-87F624B0928E}"/>
+                </a:ext>
+              </a:extLst>
+            </p:cNvPr>
+            <p:cNvSpPr txBox="1"/>
+            <p:nvPr/>
+          </p:nvSpPr>
+          <p:spPr>
+            <a:xfrm>
+              <a:off x="974969" y="4168423"/>
+              <a:ext cx="3476490" cy="554673"/>
+            </a:xfrm>
+            <a:prstGeom prst="rect">
+              <a:avLst/>
+            </a:prstGeom>
+            <a:noFill/>
+            <a:ln>
+              <a:noFill/>
+            </a:ln>
+          </p:spPr>
+          <p:txBody>
+            <a:bodyPr wrap="square" rtlCol="0" anchor="ctr">
+              <a:spAutoFit/>
+            </a:bodyPr>
+            <a:lstStyle/>
+            <a:p>
+              <a:pPr algn="ctr"/>
+              <a:r>
+                <a:rPr lang="en-US" sz="2474" dirty="0">
+                  <a:solidFill>
+                    <a:schemeClr val="bg1"/>
+                  </a:solidFill>
+                  <a:latin typeface="Quantum" pitchFamily="50" charset="0"/>
+                </a:rPr>
+                <a:t>PLAY GAME </a:t>
+              </a:r>
+            </a:p>
+          </p:txBody>
+        </p:sp>
+      </p:grpSp>
+      <p:sp>
+        <p:nvSpPr>
+          <p:cNvPr id="30" name="Freeform: Shape 29">
+            <a:extLst>
+              <a:ext uri="{FF2B5EF4-FFF2-40B4-BE49-F238E27FC236}">
+                <a16:creationId xmlns:a16="http://schemas.microsoft.com/office/drawing/2014/main" id="{D018EF4F-26A7-CF57-4466-498A2C7C26A0}"/>
+              </a:ext>
+            </a:extLst>
+          </p:cNvPr>
+          <p:cNvSpPr/>
+          <p:nvPr/>
+        </p:nvSpPr>
+        <p:spPr>
+          <a:xfrm>
+            <a:off x="394701" y="5348863"/>
+            <a:ext cx="3639197" cy="665693"/>
+          </a:xfrm>
+          <a:custGeom>
+            <a:avLst/>
+            <a:gdLst>
+              <a:gd name="connsiteX0" fmla="*/ 288453 w 3476491"/>
+              <a:gd name="connsiteY0" fmla="*/ 0 h 780510"/>
+              <a:gd name="connsiteX1" fmla="*/ 2995948 w 3476491"/>
+              <a:gd name="connsiteY1" fmla="*/ 0 h 780510"/>
+              <a:gd name="connsiteX2" fmla="*/ 2856951 w 3476491"/>
+              <a:gd name="connsiteY2" fmla="*/ 66152 h 780510"/>
+              <a:gd name="connsiteX3" fmla="*/ 3085439 w 3476491"/>
+              <a:gd name="connsiteY3" fmla="*/ 103945 h 780510"/>
+              <a:gd name="connsiteX4" fmla="*/ 3028410 w 3476491"/>
+              <a:gd name="connsiteY4" fmla="*/ 217851 h 780510"/>
+              <a:gd name="connsiteX5" fmla="*/ 3219656 w 3476491"/>
+              <a:gd name="connsiteY5" fmla="*/ 172066 h 780510"/>
+              <a:gd name="connsiteX6" fmla="*/ 3197332 w 3476491"/>
+              <a:gd name="connsiteY6" fmla="*/ 378196 h 780510"/>
+              <a:gd name="connsiteX7" fmla="*/ 3336575 w 3476491"/>
+              <a:gd name="connsiteY7" fmla="*/ 262177 h 780510"/>
+              <a:gd name="connsiteX8" fmla="*/ 3437178 w 3476491"/>
+              <a:gd name="connsiteY8" fmla="*/ 410027 h 780510"/>
+              <a:gd name="connsiteX9" fmla="*/ 3476491 w 3476491"/>
+              <a:gd name="connsiteY9" fmla="*/ 313558 h 780510"/>
+              <a:gd name="connsiteX10" fmla="*/ 3476491 w 3476491"/>
+              <a:gd name="connsiteY10" fmla="*/ 492057 h 780510"/>
+              <a:gd name="connsiteX11" fmla="*/ 3188038 w 3476491"/>
+              <a:gd name="connsiteY11" fmla="*/ 780510 h 780510"/>
+              <a:gd name="connsiteX12" fmla="*/ 489448 w 3476491"/>
+              <a:gd name="connsiteY12" fmla="*/ 780510 h 780510"/>
+              <a:gd name="connsiteX13" fmla="*/ 393068 w 3476491"/>
+              <a:gd name="connsiteY13" fmla="*/ 750434 h 780510"/>
+              <a:gd name="connsiteX14" fmla="*/ 465283 w 3476491"/>
+              <a:gd name="connsiteY14" fmla="*/ 645496 h 780510"/>
+              <a:gd name="connsiteX15" fmla="*/ 269546 w 3476491"/>
+              <a:gd name="connsiteY15" fmla="*/ 664428 h 780510"/>
+              <a:gd name="connsiteX16" fmla="*/ 320126 w 3476491"/>
+              <a:gd name="connsiteY16" fmla="*/ 463356 h 780510"/>
+              <a:gd name="connsiteX17" fmla="*/ 166194 w 3476491"/>
+              <a:gd name="connsiteY17" fmla="*/ 559031 h 780510"/>
+              <a:gd name="connsiteX18" fmla="*/ 86976 w 3476491"/>
+              <a:gd name="connsiteY18" fmla="*/ 398703 h 780510"/>
+              <a:gd name="connsiteX19" fmla="*/ 8480 w 3476491"/>
+              <a:gd name="connsiteY19" fmla="*/ 534057 h 780510"/>
+              <a:gd name="connsiteX20" fmla="*/ 0 w 3476491"/>
+              <a:gd name="connsiteY20" fmla="*/ 492057 h 780510"/>
+              <a:gd name="connsiteX21" fmla="*/ 0 w 3476491"/>
+              <a:gd name="connsiteY21" fmla="*/ 288453 h 780510"/>
+              <a:gd name="connsiteX22" fmla="*/ 288453 w 3476491"/>
+              <a:gd name="connsiteY22" fmla="*/ 0 h 780510"/>
+            </a:gdLst>
+            <a:ahLst/>
+            <a:cxnLst>
+              <a:cxn ang="0">
+                <a:pos x="connsiteX0" y="connsiteY0"/>
+              </a:cxn>
+              <a:cxn ang="0">
+                <a:pos x="connsiteX1" y="connsiteY1"/>
+              </a:cxn>
+              <a:cxn ang="0">
+                <a:pos x="connsiteX2" y="connsiteY2"/>
+              </a:cxn>
+              <a:cxn ang="0">
+                <a:pos x="connsiteX3" y="connsiteY3"/>
+              </a:cxn>
+              <a:cxn ang="0">
+                <a:pos x="connsiteX4" y="connsiteY4"/>
+              </a:cxn>
+              <a:cxn ang="0">
+                <a:pos x="connsiteX5" y="connsiteY5"/>
+              </a:cxn>
+              <a:cxn ang="0">
+                <a:pos x="connsiteX6" y="connsiteY6"/>
+              </a:cxn>
+              <a:cxn ang="0">
+                <a:pos x="connsiteX7" y="connsiteY7"/>
+              </a:cxn>
+              <a:cxn ang="0">
+                <a:pos x="connsiteX8" y="connsiteY8"/>
+              </a:cxn>
+              <a:cxn ang="0">
+                <a:pos x="connsiteX9" y="connsiteY9"/>
+              </a:cxn>
+              <a:cxn ang="0">
+                <a:pos x="connsiteX10" y="connsiteY10"/>
+              </a:cxn>
+              <a:cxn ang="0">
+                <a:pos x="connsiteX11" y="connsiteY11"/>
+              </a:cxn>
+              <a:cxn ang="0">
+                <a:pos x="connsiteX12" y="connsiteY12"/>
+              </a:cxn>
+              <a:cxn ang="0">
+                <a:pos x="connsiteX13" y="connsiteY13"/>
+              </a:cxn>
+              <a:cxn ang="0">
+                <a:pos x="connsiteX14" y="connsiteY14"/>
+              </a:cxn>
+              <a:cxn ang="0">
+                <a:pos x="connsiteX15" y="connsiteY15"/>
+              </a:cxn>
+              <a:cxn ang="0">
+                <a:pos x="connsiteX16" y="connsiteY16"/>
+              </a:cxn>
+              <a:cxn ang="0">
+                <a:pos x="connsiteX17" y="connsiteY17"/>
+              </a:cxn>
+              <a:cxn ang="0">
+                <a:pos x="connsiteX18" y="connsiteY18"/>
+              </a:cxn>
+              <a:cxn ang="0">
+                <a:pos x="connsiteX19" y="connsiteY19"/>
+              </a:cxn>
+              <a:cxn ang="0">
+                <a:pos x="connsiteX20" y="connsiteY20"/>
+              </a:cxn>
+              <a:cxn ang="0">
+                <a:pos x="connsiteX21" y="connsiteY21"/>
+              </a:cxn>
+              <a:cxn ang="0">
+                <a:pos x="connsiteX22" y="connsiteY22"/>
+              </a:cxn>
+            </a:cxnLst>
+            <a:rect l="l" t="t" r="r" b="b"/>
+            <a:pathLst>
+              <a:path w="3476491" h="780510">
+                <a:moveTo>
+                  <a:pt x="288453" y="0"/>
+                </a:moveTo>
+                <a:lnTo>
+                  <a:pt x="2995948" y="0"/>
+                </a:lnTo>
+                <a:lnTo>
+                  <a:pt x="2856951" y="66152"/>
+                </a:lnTo>
+                <a:lnTo>
+                  <a:pt x="3085439" y="103945"/>
+                </a:lnTo>
+                <a:lnTo>
+                  <a:pt x="3028410" y="217851"/>
+                </a:lnTo>
+                <a:lnTo>
+                  <a:pt x="3219656" y="172066"/>
+                </a:lnTo>
+                <a:lnTo>
+                  <a:pt x="3197332" y="378196"/>
+                </a:lnTo>
+                <a:lnTo>
+                  <a:pt x="3336575" y="262177"/>
+                </a:lnTo>
+                <a:lnTo>
+                  <a:pt x="3437178" y="410027"/>
+                </a:lnTo>
+                <a:lnTo>
+                  <a:pt x="3476491" y="313558"/>
+                </a:lnTo>
+                <a:lnTo>
+                  <a:pt x="3476491" y="492057"/>
+                </a:lnTo>
+                <a:cubicBezTo>
+                  <a:pt x="3476491" y="651365"/>
+                  <a:pt x="3347346" y="780510"/>
+                  <a:pt x="3188038" y="780510"/>
+                </a:cubicBezTo>
+                <a:lnTo>
+                  <a:pt x="489448" y="780510"/>
+                </a:lnTo>
+                <a:lnTo>
+                  <a:pt x="393068" y="750434"/>
+                </a:lnTo>
+                <a:lnTo>
+                  <a:pt x="465283" y="645496"/>
+                </a:lnTo>
+                <a:lnTo>
+                  <a:pt x="269546" y="664428"/>
+                </a:lnTo>
+                <a:lnTo>
+                  <a:pt x="320126" y="463356"/>
+                </a:lnTo>
+                <a:lnTo>
+                  <a:pt x="166194" y="559031"/>
+                </a:lnTo>
+                <a:lnTo>
+                  <a:pt x="86976" y="398703"/>
+                </a:lnTo>
+                <a:lnTo>
+                  <a:pt x="8480" y="534057"/>
+                </a:lnTo>
+                <a:lnTo>
+                  <a:pt x="0" y="492057"/>
+                </a:lnTo>
+                <a:lnTo>
+                  <a:pt x="0" y="288453"/>
+                </a:lnTo>
+                <a:cubicBezTo>
+                  <a:pt x="0" y="129145"/>
+                  <a:pt x="129145" y="0"/>
+                  <a:pt x="288453" y="0"/>
+                </a:cubicBezTo>
+                <a:close/>
+              </a:path>
+            </a:pathLst>
+          </a:custGeom>
+          <a:solidFill>
+            <a:schemeClr val="tx1">
+              <a:alpha val="51000"/>
+            </a:schemeClr>
+          </a:solidFill>
+          <a:ln w="38100">
+            <a:noFill/>
+          </a:ln>
+        </p:spPr>
+        <p:style>
+          <a:lnRef idx="2">
+            <a:schemeClr val="accent1">
+              <a:shade val="50000"/>
+            </a:schemeClr>
+          </a:lnRef>
+          <a:fillRef idx="1">
+            <a:schemeClr val="accent1"/>
+          </a:fillRef>
+          <a:effectRef idx="0">
+            <a:schemeClr val="accent1"/>
+          </a:effectRef>
+          <a:fontRef idx="minor">
+            <a:schemeClr val="lt1"/>
+          </a:fontRef>
+        </p:style>
+        <p:txBody>
+          <a:bodyPr wrap="square" rtlCol="0" anchor="ctr">
+            <a:noAutofit/>
+          </a:bodyPr>
+          <a:lstStyle/>
+          <a:p>
+            <a:pPr algn="ctr"/>
+            <a:endParaRPr lang="en-US" sz="2699" dirty="0">
+              <a:solidFill>
+                <a:schemeClr val="tx1"/>
+              </a:solidFill>
+              <a:latin typeface="Quantum" pitchFamily="50" charset="0"/>
+            </a:endParaRPr>
+          </a:p>
+        </p:txBody>
+      </p:sp>
+      <p:grpSp>
+        <p:nvGrpSpPr>
+          <p:cNvPr id="10" name="Group 9">
+            <a:extLst>
+              <a:ext uri="{FF2B5EF4-FFF2-40B4-BE49-F238E27FC236}">
+                <a16:creationId xmlns:a16="http://schemas.microsoft.com/office/drawing/2014/main" id="{6AB5BC95-09EE-9D26-013A-71890586B945}"/>
+              </a:ext>
+            </a:extLst>
+          </p:cNvPr>
+          <p:cNvGrpSpPr/>
+          <p:nvPr/>
+        </p:nvGrpSpPr>
+        <p:grpSpPr>
+          <a:xfrm>
+            <a:off x="371446" y="5348863"/>
+            <a:ext cx="3662451" cy="665693"/>
+            <a:chOff x="952755" y="4111316"/>
+            <a:chExt cx="3498704" cy="780510"/>
+          </a:xfrm>
+        </p:grpSpPr>
+        <p:sp>
+          <p:nvSpPr>
+            <p:cNvPr id="11" name="Freeform: Shape 10">
+              <a:extLst>
+                <a:ext uri="{FF2B5EF4-FFF2-40B4-BE49-F238E27FC236}">
+                  <a16:creationId xmlns:a16="http://schemas.microsoft.com/office/drawing/2014/main" id="{9483A0CF-120B-33AF-3B12-A6555D06AF78}"/>
+                </a:ext>
+              </a:extLst>
+            </p:cNvPr>
+            <p:cNvSpPr/>
+            <p:nvPr/>
+          </p:nvSpPr>
+          <p:spPr>
+            <a:xfrm>
+              <a:off x="952755" y="4111316"/>
+              <a:ext cx="3476491" cy="780510"/>
+            </a:xfrm>
+            <a:custGeom>
+              <a:avLst/>
+              <a:gdLst>
+                <a:gd name="connsiteX0" fmla="*/ 288453 w 3476491"/>
+                <a:gd name="connsiteY0" fmla="*/ 0 h 780510"/>
+                <a:gd name="connsiteX1" fmla="*/ 2995948 w 3476491"/>
+                <a:gd name="connsiteY1" fmla="*/ 0 h 780510"/>
+                <a:gd name="connsiteX2" fmla="*/ 2856951 w 3476491"/>
+                <a:gd name="connsiteY2" fmla="*/ 66152 h 780510"/>
+                <a:gd name="connsiteX3" fmla="*/ 3085439 w 3476491"/>
+                <a:gd name="connsiteY3" fmla="*/ 103945 h 780510"/>
+                <a:gd name="connsiteX4" fmla="*/ 3028410 w 3476491"/>
+                <a:gd name="connsiteY4" fmla="*/ 217851 h 780510"/>
+                <a:gd name="connsiteX5" fmla="*/ 3219656 w 3476491"/>
+                <a:gd name="connsiteY5" fmla="*/ 172066 h 780510"/>
+                <a:gd name="connsiteX6" fmla="*/ 3197332 w 3476491"/>
+                <a:gd name="connsiteY6" fmla="*/ 378196 h 780510"/>
+                <a:gd name="connsiteX7" fmla="*/ 3336575 w 3476491"/>
+                <a:gd name="connsiteY7" fmla="*/ 262177 h 780510"/>
+                <a:gd name="connsiteX8" fmla="*/ 3437178 w 3476491"/>
+                <a:gd name="connsiteY8" fmla="*/ 410027 h 780510"/>
+                <a:gd name="connsiteX9" fmla="*/ 3476491 w 3476491"/>
+                <a:gd name="connsiteY9" fmla="*/ 313558 h 780510"/>
+                <a:gd name="connsiteX10" fmla="*/ 3476491 w 3476491"/>
+                <a:gd name="connsiteY10" fmla="*/ 492057 h 780510"/>
+                <a:gd name="connsiteX11" fmla="*/ 3188038 w 3476491"/>
+                <a:gd name="connsiteY11" fmla="*/ 780510 h 780510"/>
+                <a:gd name="connsiteX12" fmla="*/ 489448 w 3476491"/>
+                <a:gd name="connsiteY12" fmla="*/ 780510 h 780510"/>
+                <a:gd name="connsiteX13" fmla="*/ 393068 w 3476491"/>
+                <a:gd name="connsiteY13" fmla="*/ 750434 h 780510"/>
+                <a:gd name="connsiteX14" fmla="*/ 465283 w 3476491"/>
+                <a:gd name="connsiteY14" fmla="*/ 645496 h 780510"/>
+                <a:gd name="connsiteX15" fmla="*/ 269546 w 3476491"/>
+                <a:gd name="connsiteY15" fmla="*/ 664428 h 780510"/>
+                <a:gd name="connsiteX16" fmla="*/ 320126 w 3476491"/>
+                <a:gd name="connsiteY16" fmla="*/ 463356 h 780510"/>
+                <a:gd name="connsiteX17" fmla="*/ 166194 w 3476491"/>
+                <a:gd name="connsiteY17" fmla="*/ 559031 h 780510"/>
+                <a:gd name="connsiteX18" fmla="*/ 86976 w 3476491"/>
+                <a:gd name="connsiteY18" fmla="*/ 398703 h 780510"/>
+                <a:gd name="connsiteX19" fmla="*/ 8480 w 3476491"/>
+                <a:gd name="connsiteY19" fmla="*/ 534057 h 780510"/>
+                <a:gd name="connsiteX20" fmla="*/ 0 w 3476491"/>
+                <a:gd name="connsiteY20" fmla="*/ 492057 h 780510"/>
+                <a:gd name="connsiteX21" fmla="*/ 0 w 3476491"/>
+                <a:gd name="connsiteY21" fmla="*/ 288453 h 780510"/>
+                <a:gd name="connsiteX22" fmla="*/ 288453 w 3476491"/>
+                <a:gd name="connsiteY22" fmla="*/ 0 h 780510"/>
+              </a:gdLst>
+              <a:ahLst/>
+              <a:cxnLst>
+                <a:cxn ang="0">
+                  <a:pos x="connsiteX0" y="connsiteY0"/>
+                </a:cxn>
+                <a:cxn ang="0">
+                  <a:pos x="connsiteX1" y="connsiteY1"/>
+                </a:cxn>
+                <a:cxn ang="0">
+                  <a:pos x="connsiteX2" y="connsiteY2"/>
+                </a:cxn>
+                <a:cxn ang="0">
+                  <a:pos x="connsiteX3" y="connsiteY3"/>
+                </a:cxn>
+                <a:cxn ang="0">
+                  <a:pos x="connsiteX4" y="connsiteY4"/>
+                </a:cxn>
+                <a:cxn ang="0">
+                  <a:pos x="connsiteX5" y="connsiteY5"/>
+                </a:cxn>
+                <a:cxn ang="0">
+                  <a:pos x="connsiteX6" y="connsiteY6"/>
+                </a:cxn>
+                <a:cxn ang="0">
+                  <a:pos x="connsiteX7" y="connsiteY7"/>
+                </a:cxn>
+                <a:cxn ang="0">
+                  <a:pos x="connsiteX8" y="connsiteY8"/>
+                </a:cxn>
+                <a:cxn ang="0">
+                  <a:pos x="connsiteX9" y="connsiteY9"/>
+                </a:cxn>
+                <a:cxn ang="0">
+                  <a:pos x="connsiteX10" y="connsiteY10"/>
+                </a:cxn>
+                <a:cxn ang="0">
+                  <a:pos x="connsiteX11" y="connsiteY11"/>
+                </a:cxn>
+                <a:cxn ang="0">
+                  <a:pos x="connsiteX12" y="connsiteY12"/>
+                </a:cxn>
+                <a:cxn ang="0">
+                  <a:pos x="connsiteX13" y="connsiteY13"/>
+                </a:cxn>
+                <a:cxn ang="0">
+                  <a:pos x="connsiteX14" y="connsiteY14"/>
+                </a:cxn>
+                <a:cxn ang="0">
+                  <a:pos x="connsiteX15" y="connsiteY15"/>
+                </a:cxn>
+                <a:cxn ang="0">
+                  <a:pos x="connsiteX16" y="connsiteY16"/>
+                </a:cxn>
+                <a:cxn ang="0">
+                  <a:pos x="connsiteX17" y="connsiteY17"/>
+                </a:cxn>
+                <a:cxn ang="0">
+                  <a:pos x="connsiteX18" y="connsiteY18"/>
+                </a:cxn>
+                <a:cxn ang="0">
+                  <a:pos x="connsiteX19" y="connsiteY19"/>
+                </a:cxn>
+                <a:cxn ang="0">
+                  <a:pos x="connsiteX20" y="connsiteY20"/>
+                </a:cxn>
+                <a:cxn ang="0">
+                  <a:pos x="connsiteX21" y="connsiteY21"/>
+                </a:cxn>
+                <a:cxn ang="0">
+                  <a:pos x="connsiteX22" y="connsiteY22"/>
+                </a:cxn>
+              </a:cxnLst>
+              <a:rect l="l" t="t" r="r" b="b"/>
+              <a:pathLst>
+                <a:path w="3476491" h="780510">
+                  <a:moveTo>
+                    <a:pt x="288453" y="0"/>
+                  </a:moveTo>
+                  <a:lnTo>
+                    <a:pt x="2995948" y="0"/>
+                  </a:lnTo>
+                  <a:lnTo>
+                    <a:pt x="2856951" y="66152"/>
+                  </a:lnTo>
+                  <a:lnTo>
+                    <a:pt x="3085439" y="103945"/>
+                  </a:lnTo>
+                  <a:lnTo>
+                    <a:pt x="3028410" y="217851"/>
+                  </a:lnTo>
+                  <a:lnTo>
+                    <a:pt x="3219656" y="172066"/>
+                  </a:lnTo>
+                  <a:lnTo>
+                    <a:pt x="3197332" y="378196"/>
+                  </a:lnTo>
+                  <a:lnTo>
+                    <a:pt x="3336575" y="262177"/>
+                  </a:lnTo>
+                  <a:lnTo>
+                    <a:pt x="3437178" y="410027"/>
+                  </a:lnTo>
+                  <a:lnTo>
+                    <a:pt x="3476491" y="313558"/>
+                  </a:lnTo>
+                  <a:lnTo>
+                    <a:pt x="3476491" y="492057"/>
+                  </a:lnTo>
+                  <a:cubicBezTo>
+                    <a:pt x="3476491" y="651365"/>
+                    <a:pt x="3347346" y="780510"/>
+                    <a:pt x="3188038" y="780510"/>
+                  </a:cubicBezTo>
+                  <a:lnTo>
+                    <a:pt x="489448" y="780510"/>
+                  </a:lnTo>
+                  <a:lnTo>
+                    <a:pt x="393068" y="750434"/>
+                  </a:lnTo>
+                  <a:lnTo>
+                    <a:pt x="465283" y="645496"/>
+                  </a:lnTo>
+                  <a:lnTo>
+                    <a:pt x="269546" y="664428"/>
+                  </a:lnTo>
+                  <a:lnTo>
+                    <a:pt x="320126" y="463356"/>
+                  </a:lnTo>
+                  <a:lnTo>
+                    <a:pt x="166194" y="559031"/>
+                  </a:lnTo>
+                  <a:lnTo>
+                    <a:pt x="86976" y="398703"/>
+                  </a:lnTo>
+                  <a:lnTo>
+                    <a:pt x="8480" y="534057"/>
+                  </a:lnTo>
+                  <a:lnTo>
+                    <a:pt x="0" y="492057"/>
+                  </a:lnTo>
+                  <a:lnTo>
+                    <a:pt x="0" y="288453"/>
+                  </a:lnTo>
+                  <a:cubicBezTo>
+                    <a:pt x="0" y="129145"/>
+                    <a:pt x="129145" y="0"/>
+                    <a:pt x="288453" y="0"/>
+                  </a:cubicBezTo>
+                  <a:close/>
+                </a:path>
+              </a:pathLst>
+            </a:custGeom>
+            <a:noFill/>
+            <a:ln w="38100">
+              <a:solidFill>
+                <a:schemeClr val="bg1"/>
+              </a:solidFill>
+            </a:ln>
+          </p:spPr>
+          <p:style>
+            <a:lnRef idx="2">
+              <a:schemeClr val="accent1">
+                <a:shade val="50000"/>
+              </a:schemeClr>
+            </a:lnRef>
+            <a:fillRef idx="1">
+              <a:schemeClr val="accent1"/>
+            </a:fillRef>
+            <a:effectRef idx="0">
+              <a:schemeClr val="accent1"/>
+            </a:effectRef>
+            <a:fontRef idx="minor">
+              <a:schemeClr val="lt1"/>
+            </a:fontRef>
+          </p:style>
+          <p:txBody>
+            <a:bodyPr wrap="square" rtlCol="0" anchor="ctr">
+              <a:noAutofit/>
+            </a:bodyPr>
+            <a:lstStyle/>
+            <a:p>
+              <a:pPr algn="ctr"/>
+              <a:endParaRPr lang="en-US" sz="2699" dirty="0">
+                <a:solidFill>
+                  <a:schemeClr val="bg1"/>
+                </a:solidFill>
+                <a:latin typeface="Quantum" pitchFamily="50" charset="0"/>
+              </a:endParaRPr>
+            </a:p>
+          </p:txBody>
+        </p:sp>
+        <p:sp>
+          <p:nvSpPr>
+            <p:cNvPr id="12" name="TextBox 11">
+              <a:extLst>
+                <a:ext uri="{FF2B5EF4-FFF2-40B4-BE49-F238E27FC236}">
+                  <a16:creationId xmlns:a16="http://schemas.microsoft.com/office/drawing/2014/main" id="{5B70A83D-8581-23D6-C1C1-F9C19F4E638E}"/>
+                </a:ext>
+              </a:extLst>
+            </p:cNvPr>
+            <p:cNvSpPr txBox="1"/>
+            <p:nvPr/>
+          </p:nvSpPr>
+          <p:spPr>
+            <a:xfrm>
+              <a:off x="974969" y="4168423"/>
+              <a:ext cx="3476490" cy="554673"/>
+            </a:xfrm>
+            <a:prstGeom prst="rect">
+              <a:avLst/>
+            </a:prstGeom>
+            <a:noFill/>
+            <a:ln>
+              <a:noFill/>
+            </a:ln>
+          </p:spPr>
+          <p:txBody>
+            <a:bodyPr wrap="square" rtlCol="0" anchor="ctr">
+              <a:spAutoFit/>
+            </a:bodyPr>
+            <a:lstStyle/>
+            <a:p>
+              <a:pPr algn="ctr"/>
+              <a:r>
+                <a:rPr lang="en-US" sz="2474" dirty="0">
+                  <a:solidFill>
+                    <a:schemeClr val="bg1"/>
+                  </a:solidFill>
+                  <a:latin typeface="Quantum" pitchFamily="50" charset="0"/>
+                </a:rPr>
+                <a:t>EXIT</a:t>
+              </a:r>
+            </a:p>
+          </p:txBody>
+        </p:sp>
+      </p:grpSp>
+      <p:sp>
+        <p:nvSpPr>
+          <p:cNvPr id="7" name="TextBox 6">
+            <a:extLst>
+              <a:ext uri="{FF2B5EF4-FFF2-40B4-BE49-F238E27FC236}">
+                <a16:creationId xmlns:a16="http://schemas.microsoft.com/office/drawing/2014/main" id="{39F98713-E2A7-896F-D164-1D18C93DC436}"/>
+              </a:ext>
+            </a:extLst>
+          </p:cNvPr>
+          <p:cNvSpPr txBox="1"/>
+          <p:nvPr/>
+        </p:nvSpPr>
+        <p:spPr>
+          <a:xfrm>
+            <a:off x="394700" y="1039586"/>
+            <a:ext cx="6078579" cy="853632"/>
+          </a:xfrm>
+          <a:prstGeom prst="rect">
+            <a:avLst/>
+          </a:prstGeom>
+          <a:noFill/>
+        </p:spPr>
+        <p:txBody>
+          <a:bodyPr wrap="square">
+            <a:spAutoFit/>
+          </a:bodyPr>
+          <a:lstStyle/>
+          <a:p>
+            <a:r>
+              <a:rPr lang="en-US" sz="4947" dirty="0">
+                <a:solidFill>
+                  <a:schemeClr val="bg1"/>
+                </a:solidFill>
+                <a:latin typeface="Gore Regular" panose="02000500000000000000" pitchFamily="2" charset="0"/>
+              </a:rPr>
+              <a:t>BUMBLE  JET</a:t>
+            </a:r>
+          </a:p>
+        </p:txBody>
+      </p:sp>
+    </p:spTree>
+    <p:extLst>
+      <p:ext uri="{BB962C8B-B14F-4D97-AF65-F5344CB8AC3E}">
+        <p14:creationId xmlns:p14="http://schemas.microsoft.com/office/powerpoint/2010/main" val="788909422"/>
+      </p:ext>
+    </p:extLst>
+  </p:cSld>
+  <p:clrMapOvr>
+    <a:masterClrMapping/>
+  </p:clrMapOvr>
+</p:sld>
+</file>
+
+<file path=ppt/slides/slide6.xml><?xml version="1.0" encoding="utf-8"?>
+<p:sld xmlns:a="http://schemas.openxmlformats.org/drawingml/2006/main" xmlns:r="http://schemas.openxmlformats.org/officeDocument/2006/relationships" xmlns:p="http://schemas.openxmlformats.org/presentationml/2006/main">
+  <p:cSld>
+    <p:bg>
+      <p:bgPr>
+        <a:solidFill>
+          <a:schemeClr val="bg1">
+            <a:alpha val="0"/>
+          </a:schemeClr>
+        </a:solidFill>
+        <a:effectLst/>
+      </p:bgPr>
+    </p:bg>
+    <p:spTree>
+      <p:nvGrpSpPr>
+        <p:cNvPr id="1" name=""/>
+        <p:cNvGrpSpPr/>
+        <p:nvPr/>
+      </p:nvGrpSpPr>
+      <p:grpSpPr>
+        <a:xfrm>
+          <a:off x="0" y="0"/>
+          <a:ext cx="0" cy="0"/>
+          <a:chOff x="0" y="0"/>
+          <a:chExt cx="0" cy="0"/>
+        </a:xfrm>
+      </p:grpSpPr>
+      <p:pic>
+        <p:nvPicPr>
+          <p:cNvPr id="18" name="Picture 17" descr="A person in a space suit&#10;&#10;Description automatically generated with medium confidence">
+            <a:extLst>
+              <a:ext uri="{FF2B5EF4-FFF2-40B4-BE49-F238E27FC236}">
+                <a16:creationId xmlns:a16="http://schemas.microsoft.com/office/drawing/2014/main" id="{5419F936-BBCA-134A-88E0-70739546547F}"/>
+              </a:ext>
+            </a:extLst>
+          </p:cNvPr>
+          <p:cNvPicPr>
+            <a:picLocks noChangeAspect="1"/>
+          </p:cNvPicPr>
+          <p:nvPr/>
+        </p:nvPicPr>
+        <p:blipFill>
+          <a:blip r:embed="rId2">
+            <a:extLst>
+              <a:ext uri="{28A0092B-C50C-407E-A947-70E740481C1C}">
+                <a14:useLocalDpi xmlns:a14="http://schemas.microsoft.com/office/drawing/2010/main" val="0"/>
+              </a:ext>
+            </a:extLst>
+          </a:blip>
+          <a:stretch>
+            <a:fillRect/>
+          </a:stretch>
+        </p:blipFill>
+        <p:spPr>
+          <a:xfrm>
+            <a:off x="0" y="-2525"/>
+            <a:ext cx="12192001" cy="6911103"/>
+          </a:xfrm>
+          <a:prstGeom prst="rect">
+            <a:avLst/>
+          </a:prstGeom>
+        </p:spPr>
+      </p:pic>
+      <p:sp>
+        <p:nvSpPr>
+          <p:cNvPr id="19" name="Freeform: Shape 18">
+            <a:extLst>
+              <a:ext uri="{FF2B5EF4-FFF2-40B4-BE49-F238E27FC236}">
+                <a16:creationId xmlns:a16="http://schemas.microsoft.com/office/drawing/2014/main" id="{7526B8A2-D3DE-0DCD-2FB7-65548CB16EF4}"/>
+              </a:ext>
+            </a:extLst>
+          </p:cNvPr>
+          <p:cNvSpPr/>
+          <p:nvPr/>
+        </p:nvSpPr>
+        <p:spPr>
+          <a:xfrm rot="11099126">
+            <a:off x="-277226" y="-385826"/>
+            <a:ext cx="8386300" cy="7645061"/>
+          </a:xfrm>
+          <a:custGeom>
+            <a:avLst/>
+            <a:gdLst>
+              <a:gd name="connsiteX0" fmla="*/ 0 w 11187193"/>
+              <a:gd name="connsiteY0" fmla="*/ 906569 h 10084385"/>
+              <a:gd name="connsiteX1" fmla="*/ 10392557 w 11187193"/>
+              <a:gd name="connsiteY1" fmla="*/ 0 h 10084385"/>
+              <a:gd name="connsiteX2" fmla="*/ 11187193 w 11187193"/>
+              <a:gd name="connsiteY2" fmla="*/ 9109407 h 10084385"/>
+              <a:gd name="connsiteX3" fmla="*/ 10414 w 11187193"/>
+              <a:gd name="connsiteY3" fmla="*/ 10084385 h 10084385"/>
+              <a:gd name="connsiteX4" fmla="*/ 0 w 11187193"/>
+              <a:gd name="connsiteY4" fmla="*/ 10084385 h 10084385"/>
+            </a:gdLst>
+            <a:ahLst/>
+            <a:cxnLst>
+              <a:cxn ang="0">
+                <a:pos x="connsiteX0" y="connsiteY0"/>
+              </a:cxn>
+              <a:cxn ang="0">
+                <a:pos x="connsiteX1" y="connsiteY1"/>
+              </a:cxn>
+              <a:cxn ang="0">
+                <a:pos x="connsiteX2" y="connsiteY2"/>
+              </a:cxn>
+              <a:cxn ang="0">
+                <a:pos x="connsiteX3" y="connsiteY3"/>
+              </a:cxn>
+              <a:cxn ang="0">
+                <a:pos x="connsiteX4" y="connsiteY4"/>
+              </a:cxn>
+            </a:cxnLst>
+            <a:rect l="l" t="t" r="r" b="b"/>
+            <a:pathLst>
+              <a:path w="11187193" h="10084385">
+                <a:moveTo>
+                  <a:pt x="0" y="906569"/>
+                </a:moveTo>
+                <a:lnTo>
+                  <a:pt x="10392557" y="0"/>
+                </a:lnTo>
+                <a:lnTo>
+                  <a:pt x="11187193" y="9109407"/>
+                </a:lnTo>
+                <a:lnTo>
+                  <a:pt x="10414" y="10084385"/>
+                </a:lnTo>
+                <a:lnTo>
+                  <a:pt x="0" y="10084385"/>
+                </a:lnTo>
+                <a:close/>
+              </a:path>
+            </a:pathLst>
+          </a:custGeom>
+          <a:gradFill flip="none" rotWithShape="1">
+            <a:gsLst>
+              <a:gs pos="0">
+                <a:srgbClr val="7B7C7E">
+                  <a:alpha val="12000"/>
+                </a:srgbClr>
+              </a:gs>
+              <a:gs pos="76000">
+                <a:schemeClr val="tx1">
+                  <a:alpha val="64000"/>
+                </a:schemeClr>
+              </a:gs>
+            </a:gsLst>
+            <a:lin ang="0" scaled="1"/>
+            <a:tileRect/>
+          </a:gradFill>
+          <a:ln>
+            <a:noFill/>
+          </a:ln>
+        </p:spPr>
+        <p:style>
+          <a:lnRef idx="2">
+            <a:schemeClr val="dk1">
+              <a:shade val="50000"/>
+            </a:schemeClr>
+          </a:lnRef>
+          <a:fillRef idx="1">
+            <a:schemeClr val="dk1"/>
+          </a:fillRef>
+          <a:effectRef idx="0">
+            <a:schemeClr val="dk1"/>
+          </a:effectRef>
+          <a:fontRef idx="minor">
+            <a:schemeClr val="lt1"/>
+          </a:fontRef>
+        </p:style>
+        <p:txBody>
+          <a:bodyPr wrap="square" rtlCol="0" anchor="ctr">
+            <a:noAutofit/>
+          </a:bodyPr>
+          <a:lstStyle/>
+          <a:p>
+            <a:pPr algn="ctr"/>
+            <a:endParaRPr lang="en-US" sz="2159" dirty="0"/>
+          </a:p>
+        </p:txBody>
+      </p:sp>
+      <p:sp>
+        <p:nvSpPr>
+          <p:cNvPr id="7" name="TextBox 6">
+            <a:extLst>
+              <a:ext uri="{FF2B5EF4-FFF2-40B4-BE49-F238E27FC236}">
+                <a16:creationId xmlns:a16="http://schemas.microsoft.com/office/drawing/2014/main" id="{39F98713-E2A7-896F-D164-1D18C93DC436}"/>
+              </a:ext>
+            </a:extLst>
+          </p:cNvPr>
+          <p:cNvSpPr txBox="1"/>
+          <p:nvPr/>
+        </p:nvSpPr>
+        <p:spPr>
+          <a:xfrm>
+            <a:off x="394700" y="1039586"/>
+            <a:ext cx="6078579" cy="853632"/>
+          </a:xfrm>
+          <a:prstGeom prst="rect">
+            <a:avLst/>
+          </a:prstGeom>
+          <a:noFill/>
+        </p:spPr>
+        <p:txBody>
+          <a:bodyPr wrap="square">
+            <a:spAutoFit/>
+          </a:bodyPr>
+          <a:lstStyle/>
+          <a:p>
+            <a:r>
+              <a:rPr lang="en-US" sz="4947" dirty="0">
+                <a:solidFill>
+                  <a:schemeClr val="bg1"/>
+                </a:solidFill>
+                <a:latin typeface="Gore Regular" panose="02000500000000000000" pitchFamily="2" charset="0"/>
+              </a:rPr>
+              <a:t>BUMBLE  JET</a:t>
+            </a:r>
+          </a:p>
+        </p:txBody>
+      </p:sp>
+    </p:spTree>
+    <p:extLst>
+      <p:ext uri="{BB962C8B-B14F-4D97-AF65-F5344CB8AC3E}">
+        <p14:creationId xmlns:p14="http://schemas.microsoft.com/office/powerpoint/2010/main" val="4128323716"/>
+      </p:ext>
+    </p:extLst>
+  </p:cSld>
+  <p:clrMapOvr>
+    <a:masterClrMapping/>
+  </p:clrMapOvr>
+</p:sld>
+</file>
+
+<file path=ppt/slides/slide7.xml><?xml version="1.0" encoding="utf-8"?>
 <p:sld xmlns:a="http://schemas.openxmlformats.org/drawingml/2006/main" xmlns:r="http://schemas.openxmlformats.org/officeDocument/2006/relationships" xmlns:p="http://schemas.openxmlformats.org/presentationml/2006/main">
   <p:cSld>
     <p:bg>
@@ -7606,8 +10308,8 @@
         </p:blipFill>
         <p:spPr>
           <a:xfrm>
-            <a:off x="0" y="0"/>
-            <a:ext cx="15240000" cy="9144000"/>
+            <a:off x="383789" y="1674"/>
+            <a:ext cx="11424422" cy="6854653"/>
           </a:xfrm>
           <a:prstGeom prst="rect">
             <a:avLst/>
@@ -7628,8 +10330,8 @@
         </p:nvSpPr>
         <p:spPr>
           <a:xfrm>
-            <a:off x="0" y="0"/>
-            <a:ext cx="15240000" cy="9144000"/>
+            <a:off x="383789" y="1674"/>
+            <a:ext cx="11424422" cy="6854653"/>
           </a:xfrm>
           <a:prstGeom prst="rect">
             <a:avLst/>
@@ -7664,7 +10366,7 @@
           <a:lstStyle/>
           <a:p>
             <a:pPr algn="ctr"/>
-            <a:endParaRPr lang="en-US" dirty="0"/>
+            <a:endParaRPr lang="en-US" sz="1124" dirty="0"/>
           </a:p>
         </p:txBody>
       </p:sp>
@@ -7681,7 +10383,7 @@
 </p:sld>
 </file>
 
-<file path=ppt/slides/slide6.xml><?xml version="1.0" encoding="utf-8"?>
+<file path=ppt/slides/slide8.xml><?xml version="1.0" encoding="utf-8"?>
 <p:sld xmlns:a="http://schemas.openxmlformats.org/drawingml/2006/main" xmlns:r="http://schemas.openxmlformats.org/officeDocument/2006/relationships" xmlns:p="http://schemas.openxmlformats.org/presentationml/2006/main">
   <p:cSld>
     <p:bg>
@@ -7735,8 +10437,8 @@
         </p:blipFill>
         <p:spPr>
           <a:xfrm>
-            <a:off x="0" y="0"/>
-            <a:ext cx="15240000" cy="9144000"/>
+            <a:off x="383789" y="1674"/>
+            <a:ext cx="11424422" cy="6854653"/>
           </a:xfrm>
           <a:prstGeom prst="rect">
             <a:avLst/>
@@ -7757,8 +10459,8 @@
         </p:nvSpPr>
         <p:spPr>
           <a:xfrm>
-            <a:off x="0" y="0"/>
-            <a:ext cx="15240000" cy="9144000"/>
+            <a:off x="383789" y="1674"/>
+            <a:ext cx="11424422" cy="6854653"/>
           </a:xfrm>
           <a:prstGeom prst="rect">
             <a:avLst/>
@@ -7793,7 +10495,7 @@
           <a:lstStyle/>
           <a:p>
             <a:pPr algn="ctr"/>
-            <a:endParaRPr lang="en-US" dirty="0"/>
+            <a:endParaRPr lang="en-US" sz="1124" dirty="0"/>
           </a:p>
         </p:txBody>
       </p:sp>
@@ -7810,7 +10512,7 @@
 </p:sld>
 </file>
 
-<file path=ppt/slides/slide7.xml><?xml version="1.0" encoding="utf-8"?>
+<file path=ppt/slides/slide9.xml><?xml version="1.0" encoding="utf-8"?>
 <p:sld xmlns:a="http://schemas.openxmlformats.org/drawingml/2006/main" xmlns:r="http://schemas.openxmlformats.org/officeDocument/2006/relationships" xmlns:p="http://schemas.openxmlformats.org/presentationml/2006/main">
   <p:cSld>
     <p:spTree>
@@ -7841,8 +10543,8 @@
         </p:nvGrpSpPr>
         <p:grpSpPr>
           <a:xfrm>
-            <a:off x="430029" y="2059970"/>
-            <a:ext cx="4885652" cy="888024"/>
+            <a:off x="706153" y="1545897"/>
+            <a:ext cx="3662451" cy="665693"/>
             <a:chOff x="952755" y="4111316"/>
             <a:chExt cx="3498704" cy="780510"/>
           </a:xfrm>
@@ -8096,7 +10798,7 @@
             <a:lstStyle/>
             <a:p>
               <a:pPr algn="ctr"/>
-              <a:endParaRPr lang="en-US" sz="3600" dirty="0">
+              <a:endParaRPr lang="en-US" sz="2699" dirty="0">
                 <a:solidFill>
                   <a:schemeClr val="bg1"/>
                 </a:solidFill>
@@ -8119,8 +10821,8 @@
           </p:nvSpPr>
           <p:spPr>
             <a:xfrm>
-              <a:off x="974969" y="4175246"/>
-              <a:ext cx="3476490" cy="541027"/>
+              <a:off x="974969" y="4168423"/>
+              <a:ext cx="3476490" cy="554673"/>
             </a:xfrm>
             <a:prstGeom prst="rect">
               <a:avLst/>
@@ -8138,7 +10840,7 @@
             <a:p>
               <a:pPr algn="ctr"/>
               <a:r>
-                <a:rPr lang="en-US" sz="3300" dirty="0">
+                <a:rPr lang="en-US" sz="2474" dirty="0">
                   <a:solidFill>
                     <a:schemeClr val="bg1"/>
                   </a:solidFill>
@@ -8164,8 +10866,8 @@
         </p:nvSpPr>
         <p:spPr>
           <a:xfrm>
-            <a:off x="430029" y="2988884"/>
-            <a:ext cx="4854633" cy="888024"/>
+            <a:off x="706154" y="2242243"/>
+            <a:ext cx="3639197" cy="665693"/>
           </a:xfrm>
           <a:custGeom>
             <a:avLst/>
@@ -8401,7 +11103,7 @@
           <a:lstStyle/>
           <a:p>
             <a:pPr algn="ctr"/>
-            <a:endParaRPr lang="en-US" sz="3600" dirty="0">
+            <a:endParaRPr lang="en-US" sz="2699" dirty="0">
               <a:solidFill>
                 <a:schemeClr val="tx1"/>
               </a:solidFill>
@@ -8424,8 +11126,8 @@
         </p:nvSpPr>
         <p:spPr>
           <a:xfrm>
-            <a:off x="3088135" y="1444417"/>
-            <a:ext cx="4854632" cy="615553"/>
+            <a:off x="2698760" y="1078638"/>
+            <a:ext cx="3639197" cy="473078"/>
           </a:xfrm>
           <a:prstGeom prst="rect">
             <a:avLst/>
@@ -8443,7 +11145,7 @@
           <a:p>
             <a:pPr algn="ctr"/>
             <a:r>
-              <a:rPr lang="en-US" sz="3300" dirty="0">
+              <a:rPr lang="en-US" sz="2474" dirty="0">
                 <a:latin typeface="Quantum" pitchFamily="50" charset="0"/>
               </a:rPr>
               <a:t>PLAY GAME </a:t>

</xml_diff>